<commit_message>
Lecture 6 done done done
</commit_message>
<xml_diff>
--- a/Lectures/Lecture 6 Linear models [Autosaved].pptx
+++ b/Lectures/Lecture 6 Linear models [Autosaved].pptx
@@ -1,11 +1,11 @@
 
 <file path=ppt/presentation.xml><?xml version="1.0" encoding="utf-8"?>
-<p:presentation xmlns:a="http://schemas.openxmlformats.org/drawingml/2006/main" xmlns:r="http://schemas.openxmlformats.org/officeDocument/2006/relationships" xmlns:p="http://schemas.openxmlformats.org/presentationml/2006/main" saveSubsetFonts="1">
+<p:presentation xmlns:a="http://schemas.openxmlformats.org/drawingml/2006/main" xmlns:r="http://schemas.openxmlformats.org/officeDocument/2006/relationships" xmlns:p="http://schemas.openxmlformats.org/presentationml/2006/main" showSpecialPlsOnTitleSld="0" saveSubsetFonts="1">
   <p:sldMasterIdLst>
     <p:sldMasterId id="2147483648" r:id="rId1"/>
   </p:sldMasterIdLst>
   <p:notesMasterIdLst>
-    <p:notesMasterId r:id="rId57"/>
+    <p:notesMasterId r:id="rId62"/>
   </p:notesMasterIdLst>
   <p:sldIdLst>
     <p:sldId id="256" r:id="rId2"/>
@@ -26,46 +26,51 @@
     <p:sldId id="697" r:id="rId17"/>
     <p:sldId id="695" r:id="rId18"/>
     <p:sldId id="693" r:id="rId19"/>
-    <p:sldId id="698" r:id="rId20"/>
-    <p:sldId id="699" r:id="rId21"/>
-    <p:sldId id="700" r:id="rId22"/>
-    <p:sldId id="703" r:id="rId23"/>
-    <p:sldId id="705" r:id="rId24"/>
-    <p:sldId id="707" r:id="rId25"/>
-    <p:sldId id="708" r:id="rId26"/>
-    <p:sldId id="710" r:id="rId27"/>
-    <p:sldId id="711" r:id="rId28"/>
-    <p:sldId id="706" r:id="rId29"/>
-    <p:sldId id="712" r:id="rId30"/>
-    <p:sldId id="718" r:id="rId31"/>
-    <p:sldId id="413" r:id="rId32"/>
-    <p:sldId id="723" r:id="rId33"/>
-    <p:sldId id="724" r:id="rId34"/>
-    <p:sldId id="726" r:id="rId35"/>
-    <p:sldId id="704" r:id="rId36"/>
-    <p:sldId id="713" r:id="rId37"/>
-    <p:sldId id="715" r:id="rId38"/>
-    <p:sldId id="714" r:id="rId39"/>
-    <p:sldId id="716" r:id="rId40"/>
-    <p:sldId id="717" r:id="rId41"/>
-    <p:sldId id="719" r:id="rId42"/>
-    <p:sldId id="720" r:id="rId43"/>
-    <p:sldId id="721" r:id="rId44"/>
-    <p:sldId id="725" r:id="rId45"/>
-    <p:sldId id="727" r:id="rId46"/>
-    <p:sldId id="728" r:id="rId47"/>
-    <p:sldId id="729" r:id="rId48"/>
-    <p:sldId id="730" r:id="rId49"/>
-    <p:sldId id="722" r:id="rId50"/>
-    <p:sldId id="731" r:id="rId51"/>
-    <p:sldId id="732" r:id="rId52"/>
-    <p:sldId id="733" r:id="rId53"/>
-    <p:sldId id="734" r:id="rId54"/>
-    <p:sldId id="735" r:id="rId55"/>
-    <p:sldId id="736" r:id="rId56"/>
+    <p:sldId id="741" r:id="rId20"/>
+    <p:sldId id="698" r:id="rId21"/>
+    <p:sldId id="699" r:id="rId22"/>
+    <p:sldId id="700" r:id="rId23"/>
+    <p:sldId id="703" r:id="rId24"/>
+    <p:sldId id="705" r:id="rId25"/>
+    <p:sldId id="707" r:id="rId26"/>
+    <p:sldId id="708" r:id="rId27"/>
+    <p:sldId id="710" r:id="rId28"/>
+    <p:sldId id="711" r:id="rId29"/>
+    <p:sldId id="706" r:id="rId30"/>
+    <p:sldId id="712" r:id="rId31"/>
+    <p:sldId id="740" r:id="rId32"/>
+    <p:sldId id="718" r:id="rId33"/>
+    <p:sldId id="413" r:id="rId34"/>
+    <p:sldId id="723" r:id="rId35"/>
+    <p:sldId id="724" r:id="rId36"/>
+    <p:sldId id="726" r:id="rId37"/>
+    <p:sldId id="739" r:id="rId38"/>
+    <p:sldId id="704" r:id="rId39"/>
+    <p:sldId id="713" r:id="rId40"/>
+    <p:sldId id="715" r:id="rId41"/>
+    <p:sldId id="714" r:id="rId42"/>
+    <p:sldId id="716" r:id="rId43"/>
+    <p:sldId id="717" r:id="rId44"/>
+    <p:sldId id="719" r:id="rId45"/>
+    <p:sldId id="738" r:id="rId46"/>
+    <p:sldId id="720" r:id="rId47"/>
+    <p:sldId id="721" r:id="rId48"/>
+    <p:sldId id="725" r:id="rId49"/>
+    <p:sldId id="727" r:id="rId50"/>
+    <p:sldId id="728" r:id="rId51"/>
+    <p:sldId id="729" r:id="rId52"/>
+    <p:sldId id="730" r:id="rId53"/>
+    <p:sldId id="737" r:id="rId54"/>
+    <p:sldId id="722" r:id="rId55"/>
+    <p:sldId id="731" r:id="rId56"/>
+    <p:sldId id="732" r:id="rId57"/>
+    <p:sldId id="733" r:id="rId58"/>
+    <p:sldId id="734" r:id="rId59"/>
+    <p:sldId id="735" r:id="rId60"/>
+    <p:sldId id="736" r:id="rId61"/>
   </p:sldIdLst>
   <p:sldSz cx="12192000" cy="6858000"/>
-  <p:notesSz cx="6858000" cy="9144000"/>
+  <p:notesSz cx="7102475" cy="10234613"/>
   <p:defaultTextStyle>
     <a:defPPr>
       <a:defRPr lang="en-US"/>
@@ -204,17 +209,17 @@
         <p:spPr>
           <a:xfrm>
             <a:off x="0" y="0"/>
-            <a:ext cx="2971800" cy="458788"/>
+            <a:ext cx="3077739" cy="513508"/>
           </a:xfrm>
           <a:prstGeom prst="rect">
             <a:avLst/>
           </a:prstGeom>
         </p:spPr>
         <p:txBody>
-          <a:bodyPr vert="horz" lIns="91440" tIns="45720" rIns="91440" bIns="45720" rtlCol="0"/>
+          <a:bodyPr vert="horz" lIns="99066" tIns="49533" rIns="99066" bIns="49533" rtlCol="0"/>
           <a:lstStyle>
             <a:lvl1pPr algn="l">
-              <a:defRPr sz="1200"/>
+              <a:defRPr sz="1300"/>
             </a:lvl1pPr>
           </a:lstStyle>
           <a:p>
@@ -234,24 +239,24 @@
         </p:nvSpPr>
         <p:spPr>
           <a:xfrm>
-            <a:off x="3884613" y="0"/>
-            <a:ext cx="2971800" cy="458788"/>
+            <a:off x="4023092" y="0"/>
+            <a:ext cx="3077739" cy="513508"/>
           </a:xfrm>
           <a:prstGeom prst="rect">
             <a:avLst/>
           </a:prstGeom>
         </p:spPr>
         <p:txBody>
-          <a:bodyPr vert="horz" lIns="91440" tIns="45720" rIns="91440" bIns="45720" rtlCol="0"/>
+          <a:bodyPr vert="horz" lIns="99066" tIns="49533" rIns="99066" bIns="49533" rtlCol="0"/>
           <a:lstStyle>
             <a:lvl1pPr algn="r">
-              <a:defRPr sz="1200"/>
+              <a:defRPr sz="1300"/>
             </a:lvl1pPr>
           </a:lstStyle>
           <a:p>
             <a:fld id="{9CF176CD-15D1-4787-BBAA-B7F61FF9E394}" type="datetimeFigureOut">
               <a:rPr lang="en-GB" smtClean="0"/>
-              <a:t>05/04/2025</a:t>
+              <a:t>07/04/2025</a:t>
             </a:fld>
             <a:endParaRPr lang="en-GB"/>
           </a:p>
@@ -269,8 +274,8 @@
         </p:nvSpPr>
         <p:spPr>
           <a:xfrm>
-            <a:off x="685800" y="1143000"/>
-            <a:ext cx="5486400" cy="3086100"/>
+            <a:off x="481013" y="1279525"/>
+            <a:ext cx="6140450" cy="3454400"/>
           </a:xfrm>
           <a:prstGeom prst="rect">
             <a:avLst/>
@@ -283,7 +288,7 @@
           </a:ln>
         </p:spPr>
         <p:txBody>
-          <a:bodyPr vert="horz" lIns="91440" tIns="45720" rIns="91440" bIns="45720" rtlCol="0" anchor="ctr"/>
+          <a:bodyPr vert="horz" lIns="99066" tIns="49533" rIns="99066" bIns="49533" rtlCol="0" anchor="ctr"/>
           <a:lstStyle/>
           <a:p>
             <a:endParaRPr lang="en-GB"/>
@@ -302,15 +307,15 @@
         </p:nvSpPr>
         <p:spPr>
           <a:xfrm>
-            <a:off x="685800" y="4400550"/>
-            <a:ext cx="5486400" cy="3600450"/>
+            <a:off x="710248" y="4925407"/>
+            <a:ext cx="5681980" cy="4029879"/>
           </a:xfrm>
           <a:prstGeom prst="rect">
             <a:avLst/>
           </a:prstGeom>
         </p:spPr>
         <p:txBody>
-          <a:bodyPr vert="horz" lIns="91440" tIns="45720" rIns="91440" bIns="45720" rtlCol="0"/>
+          <a:bodyPr vert="horz" lIns="99066" tIns="49533" rIns="99066" bIns="49533" rtlCol="0"/>
           <a:lstStyle/>
           <a:p>
             <a:pPr lvl="0"/>
@@ -362,18 +367,18 @@
         </p:nvSpPr>
         <p:spPr>
           <a:xfrm>
-            <a:off x="0" y="8685213"/>
-            <a:ext cx="2971800" cy="458787"/>
+            <a:off x="0" y="9721107"/>
+            <a:ext cx="3077739" cy="513507"/>
           </a:xfrm>
           <a:prstGeom prst="rect">
             <a:avLst/>
           </a:prstGeom>
         </p:spPr>
         <p:txBody>
-          <a:bodyPr vert="horz" lIns="91440" tIns="45720" rIns="91440" bIns="45720" rtlCol="0" anchor="b"/>
+          <a:bodyPr vert="horz" lIns="99066" tIns="49533" rIns="99066" bIns="49533" rtlCol="0" anchor="b"/>
           <a:lstStyle>
             <a:lvl1pPr algn="l">
-              <a:defRPr sz="1200"/>
+              <a:defRPr sz="1300"/>
             </a:lvl1pPr>
           </a:lstStyle>
           <a:p>
@@ -393,18 +398,18 @@
         </p:nvSpPr>
         <p:spPr>
           <a:xfrm>
-            <a:off x="3884613" y="8685213"/>
-            <a:ext cx="2971800" cy="458787"/>
+            <a:off x="4023092" y="9721107"/>
+            <a:ext cx="3077739" cy="513507"/>
           </a:xfrm>
           <a:prstGeom prst="rect">
             <a:avLst/>
           </a:prstGeom>
         </p:spPr>
         <p:txBody>
-          <a:bodyPr vert="horz" lIns="91440" tIns="45720" rIns="91440" bIns="45720" rtlCol="0" anchor="b"/>
+          <a:bodyPr vert="horz" lIns="99066" tIns="49533" rIns="99066" bIns="49533" rtlCol="0" anchor="b"/>
           <a:lstStyle>
             <a:lvl1pPr algn="r">
-              <a:defRPr sz="1200"/>
+              <a:defRPr sz="1300"/>
             </a:lvl1pPr>
           </a:lstStyle>
           <a:p>
@@ -737,9 +742,9 @@
           <a:bodyPr/>
           <a:lstStyle/>
           <a:p>
-            <a:fld id="{633AF1EE-65BA-4140-B6B9-7F82C437F84A}" type="datetimeFigureOut">
+            <a:fld id="{C56CA8F5-E68A-4115-9C25-E96C286CB035}" type="datetime1">
               <a:rPr lang="en-GB" smtClean="0"/>
-              <a:t>05/04/2025</a:t>
+              <a:t>07/04/2025</a:t>
             </a:fld>
             <a:endParaRPr lang="en-GB"/>
           </a:p>
@@ -907,9 +912,9 @@
           <a:bodyPr/>
           <a:lstStyle/>
           <a:p>
-            <a:fld id="{633AF1EE-65BA-4140-B6B9-7F82C437F84A}" type="datetimeFigureOut">
+            <a:fld id="{7FD65654-1D4B-4B33-B8CE-F5581D9C13AC}" type="datetime1">
               <a:rPr lang="en-GB" smtClean="0"/>
-              <a:t>05/04/2025</a:t>
+              <a:t>07/04/2025</a:t>
             </a:fld>
             <a:endParaRPr lang="en-GB"/>
           </a:p>
@@ -1087,9 +1092,9 @@
           <a:bodyPr/>
           <a:lstStyle/>
           <a:p>
-            <a:fld id="{633AF1EE-65BA-4140-B6B9-7F82C437F84A}" type="datetimeFigureOut">
+            <a:fld id="{50B3557C-D1F8-4213-9381-806C9A51FC91}" type="datetime1">
               <a:rPr lang="en-GB" smtClean="0"/>
-              <a:t>05/04/2025</a:t>
+              <a:t>07/04/2025</a:t>
             </a:fld>
             <a:endParaRPr lang="en-GB"/>
           </a:p>
@@ -1257,9 +1262,9 @@
           <a:bodyPr/>
           <a:lstStyle/>
           <a:p>
-            <a:fld id="{633AF1EE-65BA-4140-B6B9-7F82C437F84A}" type="datetimeFigureOut">
+            <a:fld id="{5EAB202B-C763-46C3-A636-9DFD853B4605}" type="datetime1">
               <a:rPr lang="en-GB" smtClean="0"/>
-              <a:t>05/04/2025</a:t>
+              <a:t>07/04/2025</a:t>
             </a:fld>
             <a:endParaRPr lang="en-GB"/>
           </a:p>
@@ -1503,9 +1508,9 @@
           <a:bodyPr/>
           <a:lstStyle/>
           <a:p>
-            <a:fld id="{633AF1EE-65BA-4140-B6B9-7F82C437F84A}" type="datetimeFigureOut">
+            <a:fld id="{D381E87C-49EE-449B-BBE1-C8D9F03709E3}" type="datetime1">
               <a:rPr lang="en-GB" smtClean="0"/>
-              <a:t>05/04/2025</a:t>
+              <a:t>07/04/2025</a:t>
             </a:fld>
             <a:endParaRPr lang="en-GB"/>
           </a:p>
@@ -1735,9 +1740,9 @@
           <a:bodyPr/>
           <a:lstStyle/>
           <a:p>
-            <a:fld id="{633AF1EE-65BA-4140-B6B9-7F82C437F84A}" type="datetimeFigureOut">
+            <a:fld id="{E72DF79F-283F-4921-8EFE-03DC0706D514}" type="datetime1">
               <a:rPr lang="en-GB" smtClean="0"/>
-              <a:t>05/04/2025</a:t>
+              <a:t>07/04/2025</a:t>
             </a:fld>
             <a:endParaRPr lang="en-GB"/>
           </a:p>
@@ -2102,9 +2107,9 @@
           <a:bodyPr/>
           <a:lstStyle/>
           <a:p>
-            <a:fld id="{633AF1EE-65BA-4140-B6B9-7F82C437F84A}" type="datetimeFigureOut">
+            <a:fld id="{FAB6B75B-49C2-4C52-A9AA-29208F1CA2A2}" type="datetime1">
               <a:rPr lang="en-GB" smtClean="0"/>
-              <a:t>05/04/2025</a:t>
+              <a:t>07/04/2025</a:t>
             </a:fld>
             <a:endParaRPr lang="en-GB"/>
           </a:p>
@@ -2220,9 +2225,9 @@
           <a:bodyPr/>
           <a:lstStyle/>
           <a:p>
-            <a:fld id="{633AF1EE-65BA-4140-B6B9-7F82C437F84A}" type="datetimeFigureOut">
+            <a:fld id="{1338CB34-9D44-4B11-81FA-362E39680C1C}" type="datetime1">
               <a:rPr lang="en-GB" smtClean="0"/>
-              <a:t>05/04/2025</a:t>
+              <a:t>07/04/2025</a:t>
             </a:fld>
             <a:endParaRPr lang="en-GB"/>
           </a:p>
@@ -2315,9 +2320,9 @@
           <a:bodyPr/>
           <a:lstStyle/>
           <a:p>
-            <a:fld id="{633AF1EE-65BA-4140-B6B9-7F82C437F84A}" type="datetimeFigureOut">
+            <a:fld id="{A4CEA9AC-502E-4271-B4D2-4510E701B0BB}" type="datetime1">
               <a:rPr lang="en-GB" smtClean="0"/>
-              <a:t>05/04/2025</a:t>
+              <a:t>07/04/2025</a:t>
             </a:fld>
             <a:endParaRPr lang="en-GB"/>
           </a:p>
@@ -2592,9 +2597,9 @@
           <a:bodyPr/>
           <a:lstStyle/>
           <a:p>
-            <a:fld id="{633AF1EE-65BA-4140-B6B9-7F82C437F84A}" type="datetimeFigureOut">
+            <a:fld id="{5CDFC0ED-09ED-410F-BE71-C5A0E5CAF45C}" type="datetime1">
               <a:rPr lang="en-GB" smtClean="0"/>
-              <a:t>05/04/2025</a:t>
+              <a:t>07/04/2025</a:t>
             </a:fld>
             <a:endParaRPr lang="en-GB"/>
           </a:p>
@@ -2845,9 +2850,9 @@
           <a:bodyPr/>
           <a:lstStyle/>
           <a:p>
-            <a:fld id="{633AF1EE-65BA-4140-B6B9-7F82C437F84A}" type="datetimeFigureOut">
+            <a:fld id="{3BB4F426-D937-485B-A737-9052C677CC14}" type="datetime1">
               <a:rPr lang="en-GB" smtClean="0"/>
-              <a:t>05/04/2025</a:t>
+              <a:t>07/04/2025</a:t>
             </a:fld>
             <a:endParaRPr lang="en-GB"/>
           </a:p>
@@ -3058,9 +3063,9 @@
             </a:lvl1pPr>
           </a:lstStyle>
           <a:p>
-            <a:fld id="{633AF1EE-65BA-4140-B6B9-7F82C437F84A}" type="datetimeFigureOut">
+            <a:fld id="{5029E2CA-F4BC-40A0-B78C-A9A7478F92E3}" type="datetime1">
               <a:rPr lang="en-GB" smtClean="0"/>
-              <a:t>05/04/2025</a:t>
+              <a:t>07/04/2025</a:t>
             </a:fld>
             <a:endParaRPr lang="en-GB"/>
           </a:p>
@@ -3165,6 +3170,7 @@
     <p:sldLayoutId id="2147483658" r:id="rId10"/>
     <p:sldLayoutId id="2147483659" r:id="rId11"/>
   </p:sldLayoutIdLst>
+  <p:hf hdr="0" ftr="0" dt="0"/>
   <p:txStyles>
     <p:titleStyle>
       <a:lvl1pPr algn="l" defTabSz="914400" rtl="0" eaLnBrk="1" latinLnBrk="0" hangingPunct="1">
@@ -3676,6 +3682,35 @@
           </a:prstGeom>
         </p:spPr>
       </p:pic>
+      <p:sp>
+        <p:nvSpPr>
+          <p:cNvPr id="5" name="Slide Number Placeholder 4">
+            <a:extLst>
+              <a:ext uri="{FF2B5EF4-FFF2-40B4-BE49-F238E27FC236}">
+                <a16:creationId xmlns:a16="http://schemas.microsoft.com/office/drawing/2014/main" id="{A1E026EB-9F58-98DB-5AA2-A60EC65977DA}"/>
+              </a:ext>
+            </a:extLst>
+          </p:cNvPr>
+          <p:cNvSpPr>
+            <a:spLocks noGrp="1"/>
+          </p:cNvSpPr>
+          <p:nvPr>
+            <p:ph type="sldNum" sz="quarter" idx="12"/>
+          </p:nvPr>
+        </p:nvSpPr>
+        <p:spPr/>
+        <p:txBody>
+          <a:bodyPr/>
+          <a:lstStyle/>
+          <a:p>
+            <a:fld id="{E0DC7AD3-7C2E-418B-8082-788996B615FB}" type="slidenum">
+              <a:rPr lang="en-GB" smtClean="0"/>
+              <a:t>10</a:t>
+            </a:fld>
+            <a:endParaRPr lang="en-GB"/>
+          </a:p>
+        </p:txBody>
+      </p:sp>
     </p:spTree>
     <p:extLst>
       <p:ext uri="{BB962C8B-B14F-4D97-AF65-F5344CB8AC3E}">
@@ -4123,6 +4158,35 @@
           </a:graphicData>
         </a:graphic>
       </p:graphicFrame>
+      <p:sp>
+        <p:nvSpPr>
+          <p:cNvPr id="10" name="Slide Number Placeholder 9">
+            <a:extLst>
+              <a:ext uri="{FF2B5EF4-FFF2-40B4-BE49-F238E27FC236}">
+                <a16:creationId xmlns:a16="http://schemas.microsoft.com/office/drawing/2014/main" id="{90E707B1-1FB5-14CB-BC14-979104818AEE}"/>
+              </a:ext>
+            </a:extLst>
+          </p:cNvPr>
+          <p:cNvSpPr>
+            <a:spLocks noGrp="1"/>
+          </p:cNvSpPr>
+          <p:nvPr>
+            <p:ph type="sldNum" sz="quarter" idx="12"/>
+          </p:nvPr>
+        </p:nvSpPr>
+        <p:spPr/>
+        <p:txBody>
+          <a:bodyPr/>
+          <a:lstStyle/>
+          <a:p>
+            <a:fld id="{E0DC7AD3-7C2E-418B-8082-788996B615FB}" type="slidenum">
+              <a:rPr lang="en-GB" smtClean="0"/>
+              <a:t>11</a:t>
+            </a:fld>
+            <a:endParaRPr lang="en-GB"/>
+          </a:p>
+        </p:txBody>
+      </p:sp>
     </p:spTree>
     <p:extLst>
       <p:ext uri="{BB962C8B-B14F-4D97-AF65-F5344CB8AC3E}">
@@ -4510,6 +4574,35 @@
               <a:effectLst/>
               <a:latin typeface="Consolas" panose="020B0609020204030204" pitchFamily="49" charset="0"/>
             </a:endParaRPr>
+          </a:p>
+        </p:txBody>
+      </p:sp>
+      <p:sp>
+        <p:nvSpPr>
+          <p:cNvPr id="5" name="Slide Number Placeholder 4">
+            <a:extLst>
+              <a:ext uri="{FF2B5EF4-FFF2-40B4-BE49-F238E27FC236}">
+                <a16:creationId xmlns:a16="http://schemas.microsoft.com/office/drawing/2014/main" id="{90345E5B-607F-A7B2-2196-5B82B7E25375}"/>
+              </a:ext>
+            </a:extLst>
+          </p:cNvPr>
+          <p:cNvSpPr>
+            <a:spLocks noGrp="1"/>
+          </p:cNvSpPr>
+          <p:nvPr>
+            <p:ph type="sldNum" sz="quarter" idx="12"/>
+          </p:nvPr>
+        </p:nvSpPr>
+        <p:spPr/>
+        <p:txBody>
+          <a:bodyPr/>
+          <a:lstStyle/>
+          <a:p>
+            <a:fld id="{E0DC7AD3-7C2E-418B-8082-788996B615FB}" type="slidenum">
+              <a:rPr lang="en-GB" smtClean="0"/>
+              <a:t>12</a:t>
+            </a:fld>
+            <a:endParaRPr lang="en-GB"/>
           </a:p>
         </p:txBody>
       </p:sp>
@@ -4889,6 +4982,35 @@
               <a:t>of the parameters</a:t>
             </a:r>
             <a:endParaRPr lang="he-IL" dirty="0"/>
+          </a:p>
+        </p:txBody>
+      </p:sp>
+      <p:sp>
+        <p:nvSpPr>
+          <p:cNvPr id="7" name="Slide Number Placeholder 6">
+            <a:extLst>
+              <a:ext uri="{FF2B5EF4-FFF2-40B4-BE49-F238E27FC236}">
+                <a16:creationId xmlns:a16="http://schemas.microsoft.com/office/drawing/2014/main" id="{C4058120-9437-06DE-8E3D-283930537100}"/>
+              </a:ext>
+            </a:extLst>
+          </p:cNvPr>
+          <p:cNvSpPr>
+            <a:spLocks noGrp="1"/>
+          </p:cNvSpPr>
+          <p:nvPr>
+            <p:ph type="sldNum" sz="quarter" idx="12"/>
+          </p:nvPr>
+        </p:nvSpPr>
+        <p:spPr/>
+        <p:txBody>
+          <a:bodyPr/>
+          <a:lstStyle/>
+          <a:p>
+            <a:fld id="{E0DC7AD3-7C2E-418B-8082-788996B615FB}" type="slidenum">
+              <a:rPr lang="en-GB" smtClean="0"/>
+              <a:t>13</a:t>
+            </a:fld>
+            <a:endParaRPr lang="en-GB"/>
           </a:p>
         </p:txBody>
       </p:sp>
@@ -5368,6 +5490,35 @@
               <a:t>Lines:</a:t>
             </a:r>
             <a:endParaRPr lang="he-IL" dirty="0"/>
+          </a:p>
+        </p:txBody>
+      </p:sp>
+      <p:sp>
+        <p:nvSpPr>
+          <p:cNvPr id="11" name="Slide Number Placeholder 10">
+            <a:extLst>
+              <a:ext uri="{FF2B5EF4-FFF2-40B4-BE49-F238E27FC236}">
+                <a16:creationId xmlns:a16="http://schemas.microsoft.com/office/drawing/2014/main" id="{E98FCFF3-8019-28B0-B0F8-815604557A58}"/>
+              </a:ext>
+            </a:extLst>
+          </p:cNvPr>
+          <p:cNvSpPr>
+            <a:spLocks noGrp="1"/>
+          </p:cNvSpPr>
+          <p:nvPr>
+            <p:ph type="sldNum" sz="quarter" idx="12"/>
+          </p:nvPr>
+        </p:nvSpPr>
+        <p:spPr/>
+        <p:txBody>
+          <a:bodyPr/>
+          <a:lstStyle/>
+          <a:p>
+            <a:fld id="{E0DC7AD3-7C2E-418B-8082-788996B615FB}" type="slidenum">
+              <a:rPr lang="en-GB" smtClean="0"/>
+              <a:t>14</a:t>
+            </a:fld>
+            <a:endParaRPr lang="en-GB"/>
           </a:p>
         </p:txBody>
       </p:sp>
@@ -6822,6 +6973,35 @@
           </a:p>
         </p:txBody>
       </p:sp>
+      <p:sp>
+        <p:nvSpPr>
+          <p:cNvPr id="5" name="Slide Number Placeholder 4">
+            <a:extLst>
+              <a:ext uri="{FF2B5EF4-FFF2-40B4-BE49-F238E27FC236}">
+                <a16:creationId xmlns:a16="http://schemas.microsoft.com/office/drawing/2014/main" id="{16561406-1F28-DDA4-BE65-898A5F4EDBA7}"/>
+              </a:ext>
+            </a:extLst>
+          </p:cNvPr>
+          <p:cNvSpPr>
+            <a:spLocks noGrp="1"/>
+          </p:cNvSpPr>
+          <p:nvPr>
+            <p:ph type="sldNum" sz="quarter" idx="12"/>
+          </p:nvPr>
+        </p:nvSpPr>
+        <p:spPr/>
+        <p:txBody>
+          <a:bodyPr/>
+          <a:lstStyle/>
+          <a:p>
+            <a:fld id="{E0DC7AD3-7C2E-418B-8082-788996B615FB}" type="slidenum">
+              <a:rPr lang="en-GB" smtClean="0"/>
+              <a:t>15</a:t>
+            </a:fld>
+            <a:endParaRPr lang="en-GB"/>
+          </a:p>
+        </p:txBody>
+      </p:sp>
     </p:spTree>
     <p:extLst>
       <p:ext uri="{BB962C8B-B14F-4D97-AF65-F5344CB8AC3E}">
@@ -8223,6 +8403,35 @@
               <a:t>Create the lines</a:t>
             </a:r>
             <a:endParaRPr lang="he-IL" dirty="0"/>
+          </a:p>
+        </p:txBody>
+      </p:sp>
+      <p:sp>
+        <p:nvSpPr>
+          <p:cNvPr id="8" name="Slide Number Placeholder 7">
+            <a:extLst>
+              <a:ext uri="{FF2B5EF4-FFF2-40B4-BE49-F238E27FC236}">
+                <a16:creationId xmlns:a16="http://schemas.microsoft.com/office/drawing/2014/main" id="{416DC57C-BFEA-8D3D-DEBE-72FAC2666C61}"/>
+              </a:ext>
+            </a:extLst>
+          </p:cNvPr>
+          <p:cNvSpPr>
+            <a:spLocks noGrp="1"/>
+          </p:cNvSpPr>
+          <p:nvPr>
+            <p:ph type="sldNum" sz="quarter" idx="12"/>
+          </p:nvPr>
+        </p:nvSpPr>
+        <p:spPr/>
+        <p:txBody>
+          <a:bodyPr/>
+          <a:lstStyle/>
+          <a:p>
+            <a:fld id="{E0DC7AD3-7C2E-418B-8082-788996B615FB}" type="slidenum">
+              <a:rPr lang="en-GB" smtClean="0"/>
+              <a:t>16</a:t>
+            </a:fld>
+            <a:endParaRPr lang="en-GB"/>
           </a:p>
         </p:txBody>
       </p:sp>
@@ -9545,6 +9754,35 @@
           </a:graphicData>
         </a:graphic>
       </p:graphicFrame>
+      <p:sp>
+        <p:nvSpPr>
+          <p:cNvPr id="5" name="Slide Number Placeholder 4">
+            <a:extLst>
+              <a:ext uri="{FF2B5EF4-FFF2-40B4-BE49-F238E27FC236}">
+                <a16:creationId xmlns:a16="http://schemas.microsoft.com/office/drawing/2014/main" id="{091FF775-DFB5-CF01-BC6C-4E206668168E}"/>
+              </a:ext>
+            </a:extLst>
+          </p:cNvPr>
+          <p:cNvSpPr>
+            <a:spLocks noGrp="1"/>
+          </p:cNvSpPr>
+          <p:nvPr>
+            <p:ph type="sldNum" sz="quarter" idx="12"/>
+          </p:nvPr>
+        </p:nvSpPr>
+        <p:spPr/>
+        <p:txBody>
+          <a:bodyPr/>
+          <a:lstStyle/>
+          <a:p>
+            <a:fld id="{E0DC7AD3-7C2E-418B-8082-788996B615FB}" type="slidenum">
+              <a:rPr lang="en-GB" smtClean="0"/>
+              <a:t>17</a:t>
+            </a:fld>
+            <a:endParaRPr lang="en-GB"/>
+          </a:p>
+        </p:txBody>
+      </p:sp>
     </p:spTree>
     <p:extLst>
       <p:ext uri="{BB962C8B-B14F-4D97-AF65-F5344CB8AC3E}">
@@ -10860,6 +11098,35 @@
           </a:p>
         </p:txBody>
       </p:sp>
+      <p:sp>
+        <p:nvSpPr>
+          <p:cNvPr id="19" name="Slide Number Placeholder 18">
+            <a:extLst>
+              <a:ext uri="{FF2B5EF4-FFF2-40B4-BE49-F238E27FC236}">
+                <a16:creationId xmlns:a16="http://schemas.microsoft.com/office/drawing/2014/main" id="{29F2D3D1-344A-6385-A964-39B29BEEF8B2}"/>
+              </a:ext>
+            </a:extLst>
+          </p:cNvPr>
+          <p:cNvSpPr>
+            <a:spLocks noGrp="1"/>
+          </p:cNvSpPr>
+          <p:nvPr>
+            <p:ph type="sldNum" sz="quarter" idx="12"/>
+          </p:nvPr>
+        </p:nvSpPr>
+        <p:spPr/>
+        <p:txBody>
+          <a:bodyPr/>
+          <a:lstStyle/>
+          <a:p>
+            <a:fld id="{E0DC7AD3-7C2E-418B-8082-788996B615FB}" type="slidenum">
+              <a:rPr lang="en-GB" smtClean="0"/>
+              <a:t>18</a:t>
+            </a:fld>
+            <a:endParaRPr lang="en-GB"/>
+          </a:p>
+        </p:txBody>
+      </p:sp>
     </p:spTree>
     <p:extLst>
       <p:ext uri="{BB962C8B-B14F-4D97-AF65-F5344CB8AC3E}">
@@ -11271,6 +11538,268 @@
   <p:cSld>
     <p:spTree>
       <p:nvGrpSpPr>
+        <p:cNvPr id="1" name="">
+          <a:extLst>
+            <a:ext uri="{FF2B5EF4-FFF2-40B4-BE49-F238E27FC236}">
+              <a16:creationId xmlns:a16="http://schemas.microsoft.com/office/drawing/2014/main" id="{4EF3D3E4-EBB9-3894-5D79-E18C11AEEECB}"/>
+            </a:ext>
+          </a:extLst>
+        </p:cNvPr>
+        <p:cNvGrpSpPr/>
+        <p:nvPr/>
+      </p:nvGrpSpPr>
+      <p:grpSpPr>
+        <a:xfrm>
+          <a:off x="0" y="0"/>
+          <a:ext cx="0" cy="0"/>
+          <a:chOff x="0" y="0"/>
+          <a:chExt cx="0" cy="0"/>
+        </a:xfrm>
+      </p:grpSpPr>
+      <p:sp>
+        <p:nvSpPr>
+          <p:cNvPr id="6" name="Title 5">
+            <a:extLst>
+              <a:ext uri="{FF2B5EF4-FFF2-40B4-BE49-F238E27FC236}">
+                <a16:creationId xmlns:a16="http://schemas.microsoft.com/office/drawing/2014/main" id="{454DB85F-7B3A-7F1D-553A-C06D86E19447}"/>
+              </a:ext>
+            </a:extLst>
+          </p:cNvPr>
+          <p:cNvSpPr>
+            <a:spLocks noGrp="1"/>
+          </p:cNvSpPr>
+          <p:nvPr>
+            <p:ph type="title"/>
+          </p:nvPr>
+        </p:nvSpPr>
+        <p:spPr/>
+        <p:txBody>
+          <a:bodyPr/>
+          <a:lstStyle/>
+          <a:p>
+            <a:endParaRPr lang="en-IL"/>
+          </a:p>
+        </p:txBody>
+      </p:sp>
+      <p:sp>
+        <p:nvSpPr>
+          <p:cNvPr id="7" name="Text Placeholder 6">
+            <a:extLst>
+              <a:ext uri="{FF2B5EF4-FFF2-40B4-BE49-F238E27FC236}">
+                <a16:creationId xmlns:a16="http://schemas.microsoft.com/office/drawing/2014/main" id="{378D40A1-E021-5D86-91F0-E15A49DB18D6}"/>
+              </a:ext>
+            </a:extLst>
+          </p:cNvPr>
+          <p:cNvSpPr>
+            <a:spLocks noGrp="1"/>
+          </p:cNvSpPr>
+          <p:nvPr>
+            <p:ph type="body" idx="1"/>
+          </p:nvPr>
+        </p:nvSpPr>
+        <p:spPr/>
+        <p:txBody>
+          <a:bodyPr>
+            <a:normAutofit fontScale="85000" lnSpcReduction="10000"/>
+          </a:bodyPr>
+          <a:lstStyle/>
+          <a:p>
+            <a:pPr algn="ctr"/>
+            <a:r>
+              <a:rPr lang="en-US" sz="7200" dirty="0"/>
+              <a:t>6D Posterior Predictive Testing</a:t>
+            </a:r>
+            <a:endParaRPr lang="en-IL" sz="7200" dirty="0"/>
+          </a:p>
+        </p:txBody>
+      </p:sp>
+      <p:sp>
+        <p:nvSpPr>
+          <p:cNvPr id="5" name="Slide Number Placeholder 4">
+            <a:extLst>
+              <a:ext uri="{FF2B5EF4-FFF2-40B4-BE49-F238E27FC236}">
+                <a16:creationId xmlns:a16="http://schemas.microsoft.com/office/drawing/2014/main" id="{08308849-1ABC-6F1E-D589-E44BBFB6604F}"/>
+              </a:ext>
+            </a:extLst>
+          </p:cNvPr>
+          <p:cNvSpPr>
+            <a:spLocks noGrp="1"/>
+          </p:cNvSpPr>
+          <p:nvPr>
+            <p:ph type="sldNum" sz="quarter" idx="12"/>
+          </p:nvPr>
+        </p:nvSpPr>
+        <p:spPr/>
+        <p:txBody>
+          <a:bodyPr/>
+          <a:lstStyle/>
+          <a:p>
+            <a:pPr>
+              <a:defRPr/>
+            </a:pPr>
+            <a:fld id="{3469EAC8-EFAD-49DA-A425-6225312A328A}" type="slidenum">
+              <a:rPr lang="he-IL" altLang="en-US" smtClean="0"/>
+              <a:pPr>
+                <a:defRPr/>
+              </a:pPr>
+              <a:t>19</a:t>
+            </a:fld>
+            <a:r>
+              <a:rPr lang="en-US" altLang="en-US"/>
+              <a:t> /  72</a:t>
+            </a:r>
+          </a:p>
+        </p:txBody>
+      </p:sp>
+    </p:spTree>
+    <p:extLst>
+      <p:ext uri="{BB962C8B-B14F-4D97-AF65-F5344CB8AC3E}">
+        <p14:creationId xmlns:p14="http://schemas.microsoft.com/office/powerpoint/2010/main" val="2831627754"/>
+      </p:ext>
+    </p:extLst>
+  </p:cSld>
+  <p:clrMapOvr>
+    <a:masterClrMapping/>
+  </p:clrMapOvr>
+</p:sld>
+</file>
+
+<file path=ppt/slides/slide2.xml><?xml version="1.0" encoding="utf-8"?>
+<p:sld xmlns:a="http://schemas.openxmlformats.org/drawingml/2006/main" xmlns:r="http://schemas.openxmlformats.org/officeDocument/2006/relationships" xmlns:p="http://schemas.openxmlformats.org/presentationml/2006/main">
+  <p:cSld>
+    <p:spTree>
+      <p:nvGrpSpPr>
+        <p:cNvPr id="1" name="">
+          <a:extLst>
+            <a:ext uri="{FF2B5EF4-FFF2-40B4-BE49-F238E27FC236}">
+              <a16:creationId xmlns:a16="http://schemas.microsoft.com/office/drawing/2014/main" id="{67EAD03F-1386-FFFF-9FB8-3727CF8D4A37}"/>
+            </a:ext>
+          </a:extLst>
+        </p:cNvPr>
+        <p:cNvGrpSpPr/>
+        <p:nvPr/>
+      </p:nvGrpSpPr>
+      <p:grpSpPr>
+        <a:xfrm>
+          <a:off x="0" y="0"/>
+          <a:ext cx="0" cy="0"/>
+          <a:chOff x="0" y="0"/>
+          <a:chExt cx="0" cy="0"/>
+        </a:xfrm>
+      </p:grpSpPr>
+      <p:sp>
+        <p:nvSpPr>
+          <p:cNvPr id="6" name="Title 5">
+            <a:extLst>
+              <a:ext uri="{FF2B5EF4-FFF2-40B4-BE49-F238E27FC236}">
+                <a16:creationId xmlns:a16="http://schemas.microsoft.com/office/drawing/2014/main" id="{1BE10E59-0B27-D1E1-E8D2-67F19613D925}"/>
+              </a:ext>
+            </a:extLst>
+          </p:cNvPr>
+          <p:cNvSpPr>
+            <a:spLocks noGrp="1"/>
+          </p:cNvSpPr>
+          <p:nvPr>
+            <p:ph type="title"/>
+          </p:nvPr>
+        </p:nvSpPr>
+        <p:spPr/>
+        <p:txBody>
+          <a:bodyPr/>
+          <a:lstStyle/>
+          <a:p>
+            <a:endParaRPr lang="en-IL"/>
+          </a:p>
+        </p:txBody>
+      </p:sp>
+      <p:sp>
+        <p:nvSpPr>
+          <p:cNvPr id="7" name="Text Placeholder 6">
+            <a:extLst>
+              <a:ext uri="{FF2B5EF4-FFF2-40B4-BE49-F238E27FC236}">
+                <a16:creationId xmlns:a16="http://schemas.microsoft.com/office/drawing/2014/main" id="{A628FB38-F6C8-A105-F16D-64FC1B7EF341}"/>
+              </a:ext>
+            </a:extLst>
+          </p:cNvPr>
+          <p:cNvSpPr>
+            <a:spLocks noGrp="1"/>
+          </p:cNvSpPr>
+          <p:nvPr>
+            <p:ph type="body" idx="1"/>
+          </p:nvPr>
+        </p:nvSpPr>
+        <p:spPr/>
+        <p:txBody>
+          <a:bodyPr>
+            <a:normAutofit/>
+          </a:bodyPr>
+          <a:lstStyle/>
+          <a:p>
+            <a:pPr algn="ctr"/>
+            <a:r>
+              <a:rPr lang="en-US" sz="7200" dirty="0"/>
+              <a:t>6A Review</a:t>
+            </a:r>
+            <a:endParaRPr lang="en-IL" sz="7200" dirty="0"/>
+          </a:p>
+        </p:txBody>
+      </p:sp>
+      <p:sp>
+        <p:nvSpPr>
+          <p:cNvPr id="5" name="Slide Number Placeholder 4">
+            <a:extLst>
+              <a:ext uri="{FF2B5EF4-FFF2-40B4-BE49-F238E27FC236}">
+                <a16:creationId xmlns:a16="http://schemas.microsoft.com/office/drawing/2014/main" id="{ECDC25A1-06F1-03C0-D58C-B662FCCB45C1}"/>
+              </a:ext>
+            </a:extLst>
+          </p:cNvPr>
+          <p:cNvSpPr>
+            <a:spLocks noGrp="1"/>
+          </p:cNvSpPr>
+          <p:nvPr>
+            <p:ph type="sldNum" sz="quarter" idx="12"/>
+          </p:nvPr>
+        </p:nvSpPr>
+        <p:spPr/>
+        <p:txBody>
+          <a:bodyPr/>
+          <a:lstStyle/>
+          <a:p>
+            <a:pPr>
+              <a:defRPr/>
+            </a:pPr>
+            <a:fld id="{3469EAC8-EFAD-49DA-A425-6225312A328A}" type="slidenum">
+              <a:rPr lang="he-IL" altLang="en-US" smtClean="0"/>
+              <a:pPr>
+                <a:defRPr/>
+              </a:pPr>
+              <a:t>2</a:t>
+            </a:fld>
+            <a:r>
+              <a:rPr lang="en-US" altLang="en-US"/>
+              <a:t> /  72</a:t>
+            </a:r>
+          </a:p>
+        </p:txBody>
+      </p:sp>
+    </p:spTree>
+    <p:extLst>
+      <p:ext uri="{BB962C8B-B14F-4D97-AF65-F5344CB8AC3E}">
+        <p14:creationId xmlns:p14="http://schemas.microsoft.com/office/powerpoint/2010/main" val="324436810"/>
+      </p:ext>
+    </p:extLst>
+  </p:cSld>
+  <p:clrMapOvr>
+    <a:masterClrMapping/>
+  </p:clrMapOvr>
+</p:sld>
+</file>
+
+<file path=ppt/slides/slide20.xml><?xml version="1.0" encoding="utf-8"?>
+<p:sld xmlns:a="http://schemas.openxmlformats.org/drawingml/2006/main" xmlns:r="http://schemas.openxmlformats.org/officeDocument/2006/relationships" xmlns:p="http://schemas.openxmlformats.org/presentationml/2006/main">
+  <p:cSld>
+    <p:spTree>
+      <p:nvGrpSpPr>
         <p:cNvPr id="1" name=""/>
         <p:cNvGrpSpPr/>
         <p:nvPr/>
@@ -11937,6 +12466,35 @@
           </a:graphicData>
         </a:graphic>
       </p:graphicFrame>
+      <p:sp>
+        <p:nvSpPr>
+          <p:cNvPr id="14" name="Slide Number Placeholder 13">
+            <a:extLst>
+              <a:ext uri="{FF2B5EF4-FFF2-40B4-BE49-F238E27FC236}">
+                <a16:creationId xmlns:a16="http://schemas.microsoft.com/office/drawing/2014/main" id="{92F9CE6E-B302-4785-C579-B1A67EA41180}"/>
+              </a:ext>
+            </a:extLst>
+          </p:cNvPr>
+          <p:cNvSpPr>
+            <a:spLocks noGrp="1"/>
+          </p:cNvSpPr>
+          <p:nvPr>
+            <p:ph type="sldNum" sz="quarter" idx="12"/>
+          </p:nvPr>
+        </p:nvSpPr>
+        <p:spPr/>
+        <p:txBody>
+          <a:bodyPr/>
+          <a:lstStyle/>
+          <a:p>
+            <a:fld id="{E0DC7AD3-7C2E-418B-8082-788996B615FB}" type="slidenum">
+              <a:rPr lang="en-GB" smtClean="0"/>
+              <a:t>20</a:t>
+            </a:fld>
+            <a:endParaRPr lang="en-GB"/>
+          </a:p>
+        </p:txBody>
+      </p:sp>
     </p:spTree>
     <p:extLst>
       <p:ext uri="{BB962C8B-B14F-4D97-AF65-F5344CB8AC3E}">
@@ -12228,169 +12786,7 @@
 </p:sld>
 </file>
 
-<file path=ppt/slides/slide2.xml><?xml version="1.0" encoding="utf-8"?>
-<p:sld xmlns:a="http://schemas.openxmlformats.org/drawingml/2006/main" xmlns:r="http://schemas.openxmlformats.org/officeDocument/2006/relationships" xmlns:p="http://schemas.openxmlformats.org/presentationml/2006/main">
-  <p:cSld>
-    <p:spTree>
-      <p:nvGrpSpPr>
-        <p:cNvPr id="1" name="">
-          <a:extLst>
-            <a:ext uri="{FF2B5EF4-FFF2-40B4-BE49-F238E27FC236}">
-              <a16:creationId xmlns:a16="http://schemas.microsoft.com/office/drawing/2014/main" id="{67EAD03F-1386-FFFF-9FB8-3727CF8D4A37}"/>
-            </a:ext>
-          </a:extLst>
-        </p:cNvPr>
-        <p:cNvGrpSpPr/>
-        <p:nvPr/>
-      </p:nvGrpSpPr>
-      <p:grpSpPr>
-        <a:xfrm>
-          <a:off x="0" y="0"/>
-          <a:ext cx="0" cy="0"/>
-          <a:chOff x="0" y="0"/>
-          <a:chExt cx="0" cy="0"/>
-        </a:xfrm>
-      </p:grpSpPr>
-      <p:sp>
-        <p:nvSpPr>
-          <p:cNvPr id="6" name="Title 5">
-            <a:extLst>
-              <a:ext uri="{FF2B5EF4-FFF2-40B4-BE49-F238E27FC236}">
-                <a16:creationId xmlns:a16="http://schemas.microsoft.com/office/drawing/2014/main" id="{1BE10E59-0B27-D1E1-E8D2-67F19613D925}"/>
-              </a:ext>
-            </a:extLst>
-          </p:cNvPr>
-          <p:cNvSpPr>
-            <a:spLocks noGrp="1"/>
-          </p:cNvSpPr>
-          <p:nvPr>
-            <p:ph type="title"/>
-          </p:nvPr>
-        </p:nvSpPr>
-        <p:spPr/>
-        <p:txBody>
-          <a:bodyPr/>
-          <a:lstStyle/>
-          <a:p>
-            <a:endParaRPr lang="en-IL"/>
-          </a:p>
-        </p:txBody>
-      </p:sp>
-      <p:sp>
-        <p:nvSpPr>
-          <p:cNvPr id="7" name="Text Placeholder 6">
-            <a:extLst>
-              <a:ext uri="{FF2B5EF4-FFF2-40B4-BE49-F238E27FC236}">
-                <a16:creationId xmlns:a16="http://schemas.microsoft.com/office/drawing/2014/main" id="{A628FB38-F6C8-A105-F16D-64FC1B7EF341}"/>
-              </a:ext>
-            </a:extLst>
-          </p:cNvPr>
-          <p:cNvSpPr>
-            <a:spLocks noGrp="1"/>
-          </p:cNvSpPr>
-          <p:nvPr>
-            <p:ph type="body" idx="1"/>
-          </p:nvPr>
-        </p:nvSpPr>
-        <p:spPr/>
-        <p:txBody>
-          <a:bodyPr>
-            <a:normAutofit/>
-          </a:bodyPr>
-          <a:lstStyle/>
-          <a:p>
-            <a:pPr algn="ctr"/>
-            <a:r>
-              <a:rPr lang="en-US" sz="7200" dirty="0"/>
-              <a:t>5A Review</a:t>
-            </a:r>
-            <a:endParaRPr lang="en-IL" sz="7200" dirty="0"/>
-          </a:p>
-        </p:txBody>
-      </p:sp>
-      <p:sp>
-        <p:nvSpPr>
-          <p:cNvPr id="4" name="Footer Placeholder 3">
-            <a:extLst>
-              <a:ext uri="{FF2B5EF4-FFF2-40B4-BE49-F238E27FC236}">
-                <a16:creationId xmlns:a16="http://schemas.microsoft.com/office/drawing/2014/main" id="{02D08107-1062-6438-39DF-3EC98E8B4726}"/>
-              </a:ext>
-            </a:extLst>
-          </p:cNvPr>
-          <p:cNvSpPr>
-            <a:spLocks noGrp="1"/>
-          </p:cNvSpPr>
-          <p:nvPr>
-            <p:ph type="ftr" sz="quarter" idx="11"/>
-          </p:nvPr>
-        </p:nvSpPr>
-        <p:spPr/>
-        <p:txBody>
-          <a:bodyPr/>
-          <a:lstStyle/>
-          <a:p>
-            <a:pPr>
-              <a:defRPr/>
-            </a:pPr>
-            <a:r>
-              <a:rPr lang="en-US"/>
-              <a:t>Data analysis, 2022-1, Lecture 1</a:t>
-            </a:r>
-          </a:p>
-        </p:txBody>
-      </p:sp>
-      <p:sp>
-        <p:nvSpPr>
-          <p:cNvPr id="5" name="Slide Number Placeholder 4">
-            <a:extLst>
-              <a:ext uri="{FF2B5EF4-FFF2-40B4-BE49-F238E27FC236}">
-                <a16:creationId xmlns:a16="http://schemas.microsoft.com/office/drawing/2014/main" id="{ECDC25A1-06F1-03C0-D58C-B662FCCB45C1}"/>
-              </a:ext>
-            </a:extLst>
-          </p:cNvPr>
-          <p:cNvSpPr>
-            <a:spLocks noGrp="1"/>
-          </p:cNvSpPr>
-          <p:nvPr>
-            <p:ph type="sldNum" sz="quarter" idx="12"/>
-          </p:nvPr>
-        </p:nvSpPr>
-        <p:spPr/>
-        <p:txBody>
-          <a:bodyPr/>
-          <a:lstStyle/>
-          <a:p>
-            <a:pPr>
-              <a:defRPr/>
-            </a:pPr>
-            <a:fld id="{3469EAC8-EFAD-49DA-A425-6225312A328A}" type="slidenum">
-              <a:rPr lang="he-IL" altLang="en-US" smtClean="0"/>
-              <a:pPr>
-                <a:defRPr/>
-              </a:pPr>
-              <a:t>2</a:t>
-            </a:fld>
-            <a:r>
-              <a:rPr lang="en-US" altLang="en-US"/>
-              <a:t> /  72</a:t>
-            </a:r>
-          </a:p>
-        </p:txBody>
-      </p:sp>
-    </p:spTree>
-    <p:extLst>
-      <p:ext uri="{BB962C8B-B14F-4D97-AF65-F5344CB8AC3E}">
-        <p14:creationId xmlns:p14="http://schemas.microsoft.com/office/powerpoint/2010/main" val="324436810"/>
-      </p:ext>
-    </p:extLst>
-  </p:cSld>
-  <p:clrMapOvr>
-    <a:masterClrMapping/>
-  </p:clrMapOvr>
-</p:sld>
-</file>
-
-<file path=ppt/slides/slide20.xml><?xml version="1.0" encoding="utf-8"?>
+<file path=ppt/slides/slide21.xml><?xml version="1.0" encoding="utf-8"?>
 <p:sld xmlns:a="http://schemas.openxmlformats.org/drawingml/2006/main" xmlns:r="http://schemas.openxmlformats.org/officeDocument/2006/relationships" xmlns:p="http://schemas.openxmlformats.org/presentationml/2006/main">
   <p:cSld>
     <p:spTree>
@@ -13082,6 +13478,35 @@
           </a:prstGeom>
         </p:spPr>
       </p:pic>
+      <p:sp>
+        <p:nvSpPr>
+          <p:cNvPr id="4" name="Slide Number Placeholder 3">
+            <a:extLst>
+              <a:ext uri="{FF2B5EF4-FFF2-40B4-BE49-F238E27FC236}">
+                <a16:creationId xmlns:a16="http://schemas.microsoft.com/office/drawing/2014/main" id="{AE929B2A-5197-DCA7-7BED-9D0575767434}"/>
+              </a:ext>
+            </a:extLst>
+          </p:cNvPr>
+          <p:cNvSpPr>
+            <a:spLocks noGrp="1"/>
+          </p:cNvSpPr>
+          <p:nvPr>
+            <p:ph type="sldNum" sz="quarter" idx="12"/>
+          </p:nvPr>
+        </p:nvSpPr>
+        <p:spPr/>
+        <p:txBody>
+          <a:bodyPr/>
+          <a:lstStyle/>
+          <a:p>
+            <a:fld id="{E0DC7AD3-7C2E-418B-8082-788996B615FB}" type="slidenum">
+              <a:rPr lang="en-GB" smtClean="0"/>
+              <a:t>21</a:t>
+            </a:fld>
+            <a:endParaRPr lang="en-GB"/>
+          </a:p>
+        </p:txBody>
+      </p:sp>
     </p:spTree>
     <p:extLst>
       <p:ext uri="{BB962C8B-B14F-4D97-AF65-F5344CB8AC3E}">
@@ -13095,7 +13520,7 @@
 </p:sld>
 </file>
 
-<file path=ppt/slides/slide21.xml><?xml version="1.0" encoding="utf-8"?>
+<file path=ppt/slides/slide22.xml><?xml version="1.0" encoding="utf-8"?>
 <p:sld xmlns:a="http://schemas.openxmlformats.org/drawingml/2006/main" xmlns:r="http://schemas.openxmlformats.org/officeDocument/2006/relationships" xmlns:p="http://schemas.openxmlformats.org/presentationml/2006/main">
   <p:cSld>
     <p:spTree>
@@ -13217,6 +13642,35 @@
           </a:prstGeom>
         </p:spPr>
       </p:pic>
+      <p:sp>
+        <p:nvSpPr>
+          <p:cNvPr id="5" name="Slide Number Placeholder 4">
+            <a:extLst>
+              <a:ext uri="{FF2B5EF4-FFF2-40B4-BE49-F238E27FC236}">
+                <a16:creationId xmlns:a16="http://schemas.microsoft.com/office/drawing/2014/main" id="{F58FD0F6-B3C8-2676-793A-26354925181F}"/>
+              </a:ext>
+            </a:extLst>
+          </p:cNvPr>
+          <p:cNvSpPr>
+            <a:spLocks noGrp="1"/>
+          </p:cNvSpPr>
+          <p:nvPr>
+            <p:ph type="sldNum" sz="quarter" idx="12"/>
+          </p:nvPr>
+        </p:nvSpPr>
+        <p:spPr/>
+        <p:txBody>
+          <a:bodyPr/>
+          <a:lstStyle/>
+          <a:p>
+            <a:fld id="{E0DC7AD3-7C2E-418B-8082-788996B615FB}" type="slidenum">
+              <a:rPr lang="en-GB" smtClean="0"/>
+              <a:t>22</a:t>
+            </a:fld>
+            <a:endParaRPr lang="en-GB"/>
+          </a:p>
+        </p:txBody>
+      </p:sp>
     </p:spTree>
     <p:extLst>
       <p:ext uri="{BB962C8B-B14F-4D97-AF65-F5344CB8AC3E}">
@@ -13230,7 +13684,7 @@
 </p:sld>
 </file>
 
-<file path=ppt/slides/slide22.xml><?xml version="1.0" encoding="utf-8"?>
+<file path=ppt/slides/slide23.xml><?xml version="1.0" encoding="utf-8"?>
 <p:sld xmlns:a="http://schemas.openxmlformats.org/drawingml/2006/main" xmlns:r="http://schemas.openxmlformats.org/officeDocument/2006/relationships" xmlns:p="http://schemas.openxmlformats.org/presentationml/2006/main">
   <p:cSld>
     <p:spTree>
@@ -13359,6 +13813,35 @@
           </a:prstGeom>
         </p:spPr>
       </p:pic>
+      <p:sp>
+        <p:nvSpPr>
+          <p:cNvPr id="5" name="Slide Number Placeholder 4">
+            <a:extLst>
+              <a:ext uri="{FF2B5EF4-FFF2-40B4-BE49-F238E27FC236}">
+                <a16:creationId xmlns:a16="http://schemas.microsoft.com/office/drawing/2014/main" id="{D5788E7A-6F23-8333-708F-EB5320877AFD}"/>
+              </a:ext>
+            </a:extLst>
+          </p:cNvPr>
+          <p:cNvSpPr>
+            <a:spLocks noGrp="1"/>
+          </p:cNvSpPr>
+          <p:nvPr>
+            <p:ph type="sldNum" sz="quarter" idx="12"/>
+          </p:nvPr>
+        </p:nvSpPr>
+        <p:spPr/>
+        <p:txBody>
+          <a:bodyPr/>
+          <a:lstStyle/>
+          <a:p>
+            <a:fld id="{E0DC7AD3-7C2E-418B-8082-788996B615FB}" type="slidenum">
+              <a:rPr lang="en-GB" smtClean="0"/>
+              <a:t>23</a:t>
+            </a:fld>
+            <a:endParaRPr lang="en-GB"/>
+          </a:p>
+        </p:txBody>
+      </p:sp>
     </p:spTree>
     <p:extLst>
       <p:ext uri="{BB962C8B-B14F-4D97-AF65-F5344CB8AC3E}">
@@ -13372,7 +13855,7 @@
 </p:sld>
 </file>
 
-<file path=ppt/slides/slide23.xml><?xml version="1.0" encoding="utf-8"?>
+<file path=ppt/slides/slide24.xml><?xml version="1.0" encoding="utf-8"?>
 <p:sld xmlns:a="http://schemas.openxmlformats.org/drawingml/2006/main" xmlns:r="http://schemas.openxmlformats.org/officeDocument/2006/relationships" xmlns:p="http://schemas.openxmlformats.org/presentationml/2006/main">
   <p:cSld>
     <p:spTree>
@@ -13791,6 +14274,35 @@
               <a:t>is a probability distribution</a:t>
             </a:r>
             <a:endParaRPr lang="he-IL" sz="2400" dirty="0"/>
+          </a:p>
+        </p:txBody>
+      </p:sp>
+      <p:sp>
+        <p:nvSpPr>
+          <p:cNvPr id="6" name="Slide Number Placeholder 5">
+            <a:extLst>
+              <a:ext uri="{FF2B5EF4-FFF2-40B4-BE49-F238E27FC236}">
+                <a16:creationId xmlns:a16="http://schemas.microsoft.com/office/drawing/2014/main" id="{412CB6A4-8566-30C1-6D18-5B771E1836DD}"/>
+              </a:ext>
+            </a:extLst>
+          </p:cNvPr>
+          <p:cNvSpPr>
+            <a:spLocks noGrp="1"/>
+          </p:cNvSpPr>
+          <p:nvPr>
+            <p:ph type="sldNum" sz="quarter" idx="12"/>
+          </p:nvPr>
+        </p:nvSpPr>
+        <p:spPr/>
+        <p:txBody>
+          <a:bodyPr/>
+          <a:lstStyle/>
+          <a:p>
+            <a:fld id="{E0DC7AD3-7C2E-418B-8082-788996B615FB}" type="slidenum">
+              <a:rPr lang="en-GB" smtClean="0"/>
+              <a:t>24</a:t>
+            </a:fld>
+            <a:endParaRPr lang="en-GB"/>
           </a:p>
         </p:txBody>
       </p:sp>
@@ -14107,7 +14619,7 @@
 </p:sld>
 </file>
 
-<file path=ppt/slides/slide24.xml><?xml version="1.0" encoding="utf-8"?>
+<file path=ppt/slides/slide25.xml><?xml version="1.0" encoding="utf-8"?>
 <p:sld xmlns:a="http://schemas.openxmlformats.org/drawingml/2006/main" xmlns:r="http://schemas.openxmlformats.org/officeDocument/2006/relationships" xmlns:p="http://schemas.openxmlformats.org/presentationml/2006/main">
   <p:cSld>
     <p:spTree>
@@ -14299,6 +14811,35 @@
           </a:graphicData>
         </a:graphic>
       </p:graphicFrame>
+      <p:sp>
+        <p:nvSpPr>
+          <p:cNvPr id="6" name="Slide Number Placeholder 5">
+            <a:extLst>
+              <a:ext uri="{FF2B5EF4-FFF2-40B4-BE49-F238E27FC236}">
+                <a16:creationId xmlns:a16="http://schemas.microsoft.com/office/drawing/2014/main" id="{EFF0B1EE-317C-4D1D-63D3-D36AAB7F4576}"/>
+              </a:ext>
+            </a:extLst>
+          </p:cNvPr>
+          <p:cNvSpPr>
+            <a:spLocks noGrp="1"/>
+          </p:cNvSpPr>
+          <p:nvPr>
+            <p:ph type="sldNum" sz="quarter" idx="12"/>
+          </p:nvPr>
+        </p:nvSpPr>
+        <p:spPr/>
+        <p:txBody>
+          <a:bodyPr/>
+          <a:lstStyle/>
+          <a:p>
+            <a:fld id="{E0DC7AD3-7C2E-418B-8082-788996B615FB}" type="slidenum">
+              <a:rPr lang="en-GB" smtClean="0"/>
+              <a:t>25</a:t>
+            </a:fld>
+            <a:endParaRPr lang="en-GB"/>
+          </a:p>
+        </p:txBody>
+      </p:sp>
     </p:spTree>
     <p:extLst>
       <p:ext uri="{BB962C8B-B14F-4D97-AF65-F5344CB8AC3E}">
@@ -14390,7 +14931,7 @@
 </p:sld>
 </file>
 
-<file path=ppt/slides/slide25.xml><?xml version="1.0" encoding="utf-8"?>
+<file path=ppt/slides/slide26.xml><?xml version="1.0" encoding="utf-8"?>
 <p:sld xmlns:a="http://schemas.openxmlformats.org/drawingml/2006/main" xmlns:r="http://schemas.openxmlformats.org/officeDocument/2006/relationships" xmlns:p="http://schemas.openxmlformats.org/presentationml/2006/main">
   <p:cSld>
     <p:spTree>
@@ -15064,6 +15605,35 @@
           </a:p>
         </p:txBody>
       </p:sp>
+      <p:sp>
+        <p:nvSpPr>
+          <p:cNvPr id="4" name="Slide Number Placeholder 3">
+            <a:extLst>
+              <a:ext uri="{FF2B5EF4-FFF2-40B4-BE49-F238E27FC236}">
+                <a16:creationId xmlns:a16="http://schemas.microsoft.com/office/drawing/2014/main" id="{4965C880-FB5D-F14F-86CD-BB2B4B7CF0D5}"/>
+              </a:ext>
+            </a:extLst>
+          </p:cNvPr>
+          <p:cNvSpPr>
+            <a:spLocks noGrp="1"/>
+          </p:cNvSpPr>
+          <p:nvPr>
+            <p:ph type="sldNum" sz="quarter" idx="12"/>
+          </p:nvPr>
+        </p:nvSpPr>
+        <p:spPr/>
+        <p:txBody>
+          <a:bodyPr/>
+          <a:lstStyle/>
+          <a:p>
+            <a:fld id="{E0DC7AD3-7C2E-418B-8082-788996B615FB}" type="slidenum">
+              <a:rPr lang="en-GB" smtClean="0"/>
+              <a:t>26</a:t>
+            </a:fld>
+            <a:endParaRPr lang="en-GB"/>
+          </a:p>
+        </p:txBody>
+      </p:sp>
     </p:spTree>
     <p:extLst>
       <p:ext uri="{BB962C8B-B14F-4D97-AF65-F5344CB8AC3E}">
@@ -15077,7 +15647,7 @@
 </p:sld>
 </file>
 
-<file path=ppt/slides/slide26.xml><?xml version="1.0" encoding="utf-8"?>
+<file path=ppt/slides/slide27.xml><?xml version="1.0" encoding="utf-8"?>
 <p:sld xmlns:a="http://schemas.openxmlformats.org/drawingml/2006/main" xmlns:r="http://schemas.openxmlformats.org/officeDocument/2006/relationships" xmlns:p="http://schemas.openxmlformats.org/presentationml/2006/main">
   <p:cSld>
     <p:spTree>
@@ -15301,6 +15871,35 @@
           </a:prstGeom>
         </p:spPr>
       </p:pic>
+      <p:sp>
+        <p:nvSpPr>
+          <p:cNvPr id="6" name="Slide Number Placeholder 5">
+            <a:extLst>
+              <a:ext uri="{FF2B5EF4-FFF2-40B4-BE49-F238E27FC236}">
+                <a16:creationId xmlns:a16="http://schemas.microsoft.com/office/drawing/2014/main" id="{48DAD9FF-6861-DC36-9FCA-5033557C7935}"/>
+              </a:ext>
+            </a:extLst>
+          </p:cNvPr>
+          <p:cNvSpPr>
+            <a:spLocks noGrp="1"/>
+          </p:cNvSpPr>
+          <p:nvPr>
+            <p:ph type="sldNum" sz="quarter" idx="12"/>
+          </p:nvPr>
+        </p:nvSpPr>
+        <p:spPr/>
+        <p:txBody>
+          <a:bodyPr/>
+          <a:lstStyle/>
+          <a:p>
+            <a:fld id="{E0DC7AD3-7C2E-418B-8082-788996B615FB}" type="slidenum">
+              <a:rPr lang="en-GB" smtClean="0"/>
+              <a:t>27</a:t>
+            </a:fld>
+            <a:endParaRPr lang="en-GB"/>
+          </a:p>
+        </p:txBody>
+      </p:sp>
     </p:spTree>
     <p:extLst>
       <p:ext uri="{BB962C8B-B14F-4D97-AF65-F5344CB8AC3E}">
@@ -15314,7 +15913,7 @@
 </p:sld>
 </file>
 
-<file path=ppt/slides/slide27.xml><?xml version="1.0" encoding="utf-8"?>
+<file path=ppt/slides/slide28.xml><?xml version="1.0" encoding="utf-8"?>
 <p:sld xmlns:a="http://schemas.openxmlformats.org/drawingml/2006/main" xmlns:r="http://schemas.openxmlformats.org/officeDocument/2006/relationships" xmlns:p="http://schemas.openxmlformats.org/presentationml/2006/main">
   <p:cSld>
     <p:spTree>
@@ -15549,6 +16148,35 @@
           </a:p>
         </p:txBody>
       </p:sp>
+      <p:sp>
+        <p:nvSpPr>
+          <p:cNvPr id="3" name="Slide Number Placeholder 2">
+            <a:extLst>
+              <a:ext uri="{FF2B5EF4-FFF2-40B4-BE49-F238E27FC236}">
+                <a16:creationId xmlns:a16="http://schemas.microsoft.com/office/drawing/2014/main" id="{63086FE6-AA8B-1364-82BB-13C5B9D03AB9}"/>
+              </a:ext>
+            </a:extLst>
+          </p:cNvPr>
+          <p:cNvSpPr>
+            <a:spLocks noGrp="1"/>
+          </p:cNvSpPr>
+          <p:nvPr>
+            <p:ph type="sldNum" sz="quarter" idx="12"/>
+          </p:nvPr>
+        </p:nvSpPr>
+        <p:spPr/>
+        <p:txBody>
+          <a:bodyPr/>
+          <a:lstStyle/>
+          <a:p>
+            <a:fld id="{E0DC7AD3-7C2E-418B-8082-788996B615FB}" type="slidenum">
+              <a:rPr lang="en-GB" smtClean="0"/>
+              <a:t>28</a:t>
+            </a:fld>
+            <a:endParaRPr lang="en-GB"/>
+          </a:p>
+        </p:txBody>
+      </p:sp>
     </p:spTree>
     <p:extLst>
       <p:ext uri="{BB962C8B-B14F-4D97-AF65-F5344CB8AC3E}">
@@ -15562,7 +16190,7 @@
 </p:sld>
 </file>
 
-<file path=ppt/slides/slide28.xml><?xml version="1.0" encoding="utf-8"?>
+<file path=ppt/slides/slide29.xml><?xml version="1.0" encoding="utf-8"?>
 <p:sld xmlns:a="http://schemas.openxmlformats.org/drawingml/2006/main" xmlns:r="http://schemas.openxmlformats.org/officeDocument/2006/relationships" xmlns:p="http://schemas.openxmlformats.org/presentationml/2006/main">
   <p:cSld>
     <p:spTree>
@@ -16038,6 +16666,35 @@
               <a:buChar char="-"/>
             </a:pPr>
             <a:endParaRPr lang="en-US" dirty="0"/>
+          </a:p>
+        </p:txBody>
+      </p:sp>
+      <p:sp>
+        <p:nvSpPr>
+          <p:cNvPr id="5" name="Slide Number Placeholder 4">
+            <a:extLst>
+              <a:ext uri="{FF2B5EF4-FFF2-40B4-BE49-F238E27FC236}">
+                <a16:creationId xmlns:a16="http://schemas.microsoft.com/office/drawing/2014/main" id="{0591698A-69E0-E5D9-C392-338053680AB9}"/>
+              </a:ext>
+            </a:extLst>
+          </p:cNvPr>
+          <p:cNvSpPr>
+            <a:spLocks noGrp="1"/>
+          </p:cNvSpPr>
+          <p:nvPr>
+            <p:ph type="sldNum" sz="quarter" idx="12"/>
+          </p:nvPr>
+        </p:nvSpPr>
+        <p:spPr/>
+        <p:txBody>
+          <a:bodyPr/>
+          <a:lstStyle/>
+          <a:p>
+            <a:fld id="{E0DC7AD3-7C2E-418B-8082-788996B615FB}" type="slidenum">
+              <a:rPr lang="en-GB" smtClean="0"/>
+              <a:t>29</a:t>
+            </a:fld>
+            <a:endParaRPr lang="en-GB"/>
           </a:p>
         </p:txBody>
       </p:sp>
@@ -16356,7 +17013,138 @@
 </p:sld>
 </file>
 
-<file path=ppt/slides/slide29.xml><?xml version="1.0" encoding="utf-8"?>
+<file path=ppt/slides/slide3.xml><?xml version="1.0" encoding="utf-8"?>
+<p:sld xmlns:a="http://schemas.openxmlformats.org/drawingml/2006/main" xmlns:r="http://schemas.openxmlformats.org/officeDocument/2006/relationships" xmlns:p="http://schemas.openxmlformats.org/presentationml/2006/main">
+  <p:cSld>
+    <p:spTree>
+      <p:nvGrpSpPr>
+        <p:cNvPr id="1" name="">
+          <a:extLst>
+            <a:ext uri="{FF2B5EF4-FFF2-40B4-BE49-F238E27FC236}">
+              <a16:creationId xmlns:a16="http://schemas.microsoft.com/office/drawing/2014/main" id="{7D2870B0-ECC8-45AE-D4E3-676E55C85E21}"/>
+            </a:ext>
+          </a:extLst>
+        </p:cNvPr>
+        <p:cNvGrpSpPr/>
+        <p:nvPr/>
+      </p:nvGrpSpPr>
+      <p:grpSpPr>
+        <a:xfrm>
+          <a:off x="0" y="0"/>
+          <a:ext cx="0" cy="0"/>
+          <a:chOff x="0" y="0"/>
+          <a:chExt cx="0" cy="0"/>
+        </a:xfrm>
+      </p:grpSpPr>
+      <p:sp>
+        <p:nvSpPr>
+          <p:cNvPr id="6" name="Title 5">
+            <a:extLst>
+              <a:ext uri="{FF2B5EF4-FFF2-40B4-BE49-F238E27FC236}">
+                <a16:creationId xmlns:a16="http://schemas.microsoft.com/office/drawing/2014/main" id="{98F5C1D7-29ED-5239-D5EF-25540F0EAF04}"/>
+              </a:ext>
+            </a:extLst>
+          </p:cNvPr>
+          <p:cNvSpPr>
+            <a:spLocks noGrp="1"/>
+          </p:cNvSpPr>
+          <p:nvPr>
+            <p:ph type="title"/>
+          </p:nvPr>
+        </p:nvSpPr>
+        <p:spPr/>
+        <p:txBody>
+          <a:bodyPr/>
+          <a:lstStyle/>
+          <a:p>
+            <a:endParaRPr lang="en-IL"/>
+          </a:p>
+        </p:txBody>
+      </p:sp>
+      <p:sp>
+        <p:nvSpPr>
+          <p:cNvPr id="7" name="Text Placeholder 6">
+            <a:extLst>
+              <a:ext uri="{FF2B5EF4-FFF2-40B4-BE49-F238E27FC236}">
+                <a16:creationId xmlns:a16="http://schemas.microsoft.com/office/drawing/2014/main" id="{3F8DF6AA-C04D-BBD6-5DAD-76574ED319AD}"/>
+              </a:ext>
+            </a:extLst>
+          </p:cNvPr>
+          <p:cNvSpPr>
+            <a:spLocks noGrp="1"/>
+          </p:cNvSpPr>
+          <p:nvPr>
+            <p:ph type="body" idx="1"/>
+          </p:nvPr>
+        </p:nvSpPr>
+        <p:spPr/>
+        <p:txBody>
+          <a:bodyPr>
+            <a:normAutofit/>
+          </a:bodyPr>
+          <a:lstStyle/>
+          <a:p>
+            <a:pPr algn="ctr"/>
+            <a:r>
+              <a:rPr lang="en-US" sz="7200" dirty="0"/>
+              <a:t>6B Bivariate data</a:t>
+            </a:r>
+            <a:endParaRPr lang="en-IL" sz="7200" dirty="0"/>
+          </a:p>
+        </p:txBody>
+      </p:sp>
+      <p:sp>
+        <p:nvSpPr>
+          <p:cNvPr id="5" name="Slide Number Placeholder 4">
+            <a:extLst>
+              <a:ext uri="{FF2B5EF4-FFF2-40B4-BE49-F238E27FC236}">
+                <a16:creationId xmlns:a16="http://schemas.microsoft.com/office/drawing/2014/main" id="{FD297E67-480D-416E-8B4F-E8896A45DEAC}"/>
+              </a:ext>
+            </a:extLst>
+          </p:cNvPr>
+          <p:cNvSpPr>
+            <a:spLocks noGrp="1"/>
+          </p:cNvSpPr>
+          <p:nvPr>
+            <p:ph type="sldNum" sz="quarter" idx="12"/>
+          </p:nvPr>
+        </p:nvSpPr>
+        <p:spPr/>
+        <p:txBody>
+          <a:bodyPr/>
+          <a:lstStyle/>
+          <a:p>
+            <a:pPr>
+              <a:defRPr/>
+            </a:pPr>
+            <a:fld id="{3469EAC8-EFAD-49DA-A425-6225312A328A}" type="slidenum">
+              <a:rPr lang="he-IL" altLang="en-US" smtClean="0"/>
+              <a:pPr>
+                <a:defRPr/>
+              </a:pPr>
+              <a:t>3</a:t>
+            </a:fld>
+            <a:r>
+              <a:rPr lang="en-US" altLang="en-US"/>
+              <a:t> /  72</a:t>
+            </a:r>
+          </a:p>
+        </p:txBody>
+      </p:sp>
+    </p:spTree>
+    <p:extLst>
+      <p:ext uri="{BB962C8B-B14F-4D97-AF65-F5344CB8AC3E}">
+        <p14:creationId xmlns:p14="http://schemas.microsoft.com/office/powerpoint/2010/main" val="2529673646"/>
+      </p:ext>
+    </p:extLst>
+  </p:cSld>
+  <p:clrMapOvr>
+    <a:masterClrMapping/>
+  </p:clrMapOvr>
+</p:sld>
+</file>
+
+<file path=ppt/slides/slide30.xml><?xml version="1.0" encoding="utf-8"?>
 <p:sld xmlns:a="http://schemas.openxmlformats.org/drawingml/2006/main" xmlns:r="http://schemas.openxmlformats.org/officeDocument/2006/relationships" xmlns:p="http://schemas.openxmlformats.org/presentationml/2006/main">
   <p:cSld>
     <p:spTree>
@@ -16506,6 +17294,35 @@
           </a:prstGeom>
         </p:spPr>
       </p:pic>
+      <p:sp>
+        <p:nvSpPr>
+          <p:cNvPr id="6" name="Slide Number Placeholder 5">
+            <a:extLst>
+              <a:ext uri="{FF2B5EF4-FFF2-40B4-BE49-F238E27FC236}">
+                <a16:creationId xmlns:a16="http://schemas.microsoft.com/office/drawing/2014/main" id="{1164F879-7E48-51C6-94B5-43FB004A7029}"/>
+              </a:ext>
+            </a:extLst>
+          </p:cNvPr>
+          <p:cNvSpPr>
+            <a:spLocks noGrp="1"/>
+          </p:cNvSpPr>
+          <p:nvPr>
+            <p:ph type="sldNum" sz="quarter" idx="12"/>
+          </p:nvPr>
+        </p:nvSpPr>
+        <p:spPr/>
+        <p:txBody>
+          <a:bodyPr/>
+          <a:lstStyle/>
+          <a:p>
+            <a:fld id="{E0DC7AD3-7C2E-418B-8082-788996B615FB}" type="slidenum">
+              <a:rPr lang="en-GB" smtClean="0"/>
+              <a:t>30</a:t>
+            </a:fld>
+            <a:endParaRPr lang="en-GB"/>
+          </a:p>
+        </p:txBody>
+      </p:sp>
     </p:spTree>
     <p:extLst>
       <p:ext uri="{BB962C8B-B14F-4D97-AF65-F5344CB8AC3E}">
@@ -16519,7 +17336,7 @@
 </p:sld>
 </file>
 
-<file path=ppt/slides/slide3.xml><?xml version="1.0" encoding="utf-8"?>
+<file path=ppt/slides/slide31.xml><?xml version="1.0" encoding="utf-8"?>
 <p:sld xmlns:a="http://schemas.openxmlformats.org/drawingml/2006/main" xmlns:r="http://schemas.openxmlformats.org/officeDocument/2006/relationships" xmlns:p="http://schemas.openxmlformats.org/presentationml/2006/main">
   <p:cSld>
     <p:spTree>
@@ -16527,7 +17344,7 @@
         <p:cNvPr id="1" name="">
           <a:extLst>
             <a:ext uri="{FF2B5EF4-FFF2-40B4-BE49-F238E27FC236}">
-              <a16:creationId xmlns:a16="http://schemas.microsoft.com/office/drawing/2014/main" id="{7D2870B0-ECC8-45AE-D4E3-676E55C85E21}"/>
+              <a16:creationId xmlns:a16="http://schemas.microsoft.com/office/drawing/2014/main" id="{17D0CA1B-1DF7-FBB4-1B88-6A5F42EAA789}"/>
             </a:ext>
           </a:extLst>
         </p:cNvPr>
@@ -16547,7 +17364,7 @@
           <p:cNvPr id="6" name="Title 5">
             <a:extLst>
               <a:ext uri="{FF2B5EF4-FFF2-40B4-BE49-F238E27FC236}">
-                <a16:creationId xmlns:a16="http://schemas.microsoft.com/office/drawing/2014/main" id="{98F5C1D7-29ED-5239-D5EF-25540F0EAF04}"/>
+                <a16:creationId xmlns:a16="http://schemas.microsoft.com/office/drawing/2014/main" id="{1B5BCE9D-4DB9-9294-E769-3CA603E4710D}"/>
               </a:ext>
             </a:extLst>
           </p:cNvPr>
@@ -16572,7 +17389,7 @@
           <p:cNvPr id="7" name="Text Placeholder 6">
             <a:extLst>
               <a:ext uri="{FF2B5EF4-FFF2-40B4-BE49-F238E27FC236}">
-                <a16:creationId xmlns:a16="http://schemas.microsoft.com/office/drawing/2014/main" id="{3F8DF6AA-C04D-BBD6-5DAD-76574ED319AD}"/>
+                <a16:creationId xmlns:a16="http://schemas.microsoft.com/office/drawing/2014/main" id="{772D9533-D148-EC04-AC4A-A9E29A6F90F6}"/>
               </a:ext>
             </a:extLst>
           </p:cNvPr>
@@ -16593,40 +17410,9 @@
             <a:pPr algn="ctr"/>
             <a:r>
               <a:rPr lang="en-US" sz="7200" dirty="0"/>
-              <a:t>6A Linear Models</a:t>
+              <a:t>6E Bayesian workflow</a:t>
             </a:r>
             <a:endParaRPr lang="en-IL" sz="7200" dirty="0"/>
-          </a:p>
-        </p:txBody>
-      </p:sp>
-      <p:sp>
-        <p:nvSpPr>
-          <p:cNvPr id="4" name="Footer Placeholder 3">
-            <a:extLst>
-              <a:ext uri="{FF2B5EF4-FFF2-40B4-BE49-F238E27FC236}">
-                <a16:creationId xmlns:a16="http://schemas.microsoft.com/office/drawing/2014/main" id="{DDDEC8F3-85B1-A364-889B-C4D467DAD72A}"/>
-              </a:ext>
-            </a:extLst>
-          </p:cNvPr>
-          <p:cNvSpPr>
-            <a:spLocks noGrp="1"/>
-          </p:cNvSpPr>
-          <p:nvPr>
-            <p:ph type="ftr" sz="quarter" idx="11"/>
-          </p:nvPr>
-        </p:nvSpPr>
-        <p:spPr/>
-        <p:txBody>
-          <a:bodyPr/>
-          <a:lstStyle/>
-          <a:p>
-            <a:pPr>
-              <a:defRPr/>
-            </a:pPr>
-            <a:r>
-              <a:rPr lang="en-US"/>
-              <a:t>Data analysis, 2022-1, Lecture 1</a:t>
-            </a:r>
           </a:p>
         </p:txBody>
       </p:sp>
@@ -16635,7 +17421,7 @@
           <p:cNvPr id="5" name="Slide Number Placeholder 4">
             <a:extLst>
               <a:ext uri="{FF2B5EF4-FFF2-40B4-BE49-F238E27FC236}">
-                <a16:creationId xmlns:a16="http://schemas.microsoft.com/office/drawing/2014/main" id="{FD297E67-480D-416E-8B4F-E8896A45DEAC}"/>
+                <a16:creationId xmlns:a16="http://schemas.microsoft.com/office/drawing/2014/main" id="{9A9B9047-F078-9F8E-000E-FD5616552921}"/>
               </a:ext>
             </a:extLst>
           </p:cNvPr>
@@ -16659,7 +17445,7 @@
               <a:pPr>
                 <a:defRPr/>
               </a:pPr>
-              <a:t>3</a:t>
+              <a:t>31</a:t>
             </a:fld>
             <a:r>
               <a:rPr lang="en-US" altLang="en-US"/>
@@ -16671,7 +17457,7 @@
     </p:spTree>
     <p:extLst>
       <p:ext uri="{BB962C8B-B14F-4D97-AF65-F5344CB8AC3E}">
-        <p14:creationId xmlns:p14="http://schemas.microsoft.com/office/powerpoint/2010/main" val="2529673646"/>
+        <p14:creationId xmlns:p14="http://schemas.microsoft.com/office/powerpoint/2010/main" val="839568654"/>
       </p:ext>
     </p:extLst>
   </p:cSld>
@@ -16681,7 +17467,7 @@
 </p:sld>
 </file>
 
-<file path=ppt/slides/slide30.xml><?xml version="1.0" encoding="utf-8"?>
+<file path=ppt/slides/slide32.xml><?xml version="1.0" encoding="utf-8"?>
 <p:sld xmlns:a="http://schemas.openxmlformats.org/drawingml/2006/main" xmlns:r="http://schemas.openxmlformats.org/officeDocument/2006/relationships" xmlns:p="http://schemas.openxmlformats.org/presentationml/2006/main">
   <p:cSld>
     <p:spTree>
@@ -16752,6 +17538,35 @@
           </a:p>
         </p:txBody>
       </p:sp>
+      <p:sp>
+        <p:nvSpPr>
+          <p:cNvPr id="4" name="Slide Number Placeholder 3">
+            <a:extLst>
+              <a:ext uri="{FF2B5EF4-FFF2-40B4-BE49-F238E27FC236}">
+                <a16:creationId xmlns:a16="http://schemas.microsoft.com/office/drawing/2014/main" id="{DEC552D0-350E-6F0D-7B16-F696FED7F0AA}"/>
+              </a:ext>
+            </a:extLst>
+          </p:cNvPr>
+          <p:cNvSpPr>
+            <a:spLocks noGrp="1"/>
+          </p:cNvSpPr>
+          <p:nvPr>
+            <p:ph type="sldNum" sz="quarter" idx="12"/>
+          </p:nvPr>
+        </p:nvSpPr>
+        <p:spPr/>
+        <p:txBody>
+          <a:bodyPr/>
+          <a:lstStyle/>
+          <a:p>
+            <a:fld id="{E0DC7AD3-7C2E-418B-8082-788996B615FB}" type="slidenum">
+              <a:rPr lang="en-GB" smtClean="0"/>
+              <a:t>32</a:t>
+            </a:fld>
+            <a:endParaRPr lang="en-GB"/>
+          </a:p>
+        </p:txBody>
+      </p:sp>
     </p:spTree>
     <p:extLst>
       <p:ext uri="{BB962C8B-B14F-4D97-AF65-F5344CB8AC3E}">
@@ -16765,7 +17580,7 @@
 </p:sld>
 </file>
 
-<file path=ppt/slides/slide31.xml><?xml version="1.0" encoding="utf-8"?>
+<file path=ppt/slides/slide33.xml><?xml version="1.0" encoding="utf-8"?>
 <p:sld xmlns:a="http://schemas.openxmlformats.org/drawingml/2006/main" xmlns:r="http://schemas.openxmlformats.org/officeDocument/2006/relationships" xmlns:p="http://schemas.openxmlformats.org/presentationml/2006/main">
   <p:cSld>
     <p:spTree>
@@ -17778,6 +18593,35 @@
           </a:fontRef>
         </p:style>
       </p:cxnSp>
+      <p:sp>
+        <p:nvSpPr>
+          <p:cNvPr id="6" name="Slide Number Placeholder 5">
+            <a:extLst>
+              <a:ext uri="{FF2B5EF4-FFF2-40B4-BE49-F238E27FC236}">
+                <a16:creationId xmlns:a16="http://schemas.microsoft.com/office/drawing/2014/main" id="{13B0BC45-F4EA-8DA8-4ADB-C00400C6D45F}"/>
+              </a:ext>
+            </a:extLst>
+          </p:cNvPr>
+          <p:cNvSpPr>
+            <a:spLocks noGrp="1"/>
+          </p:cNvSpPr>
+          <p:nvPr>
+            <p:ph type="sldNum" sz="quarter" idx="12"/>
+          </p:nvPr>
+        </p:nvSpPr>
+        <p:spPr/>
+        <p:txBody>
+          <a:bodyPr/>
+          <a:lstStyle/>
+          <a:p>
+            <a:fld id="{E0DC7AD3-7C2E-418B-8082-788996B615FB}" type="slidenum">
+              <a:rPr lang="en-GB" smtClean="0"/>
+              <a:t>33</a:t>
+            </a:fld>
+            <a:endParaRPr lang="en-GB"/>
+          </a:p>
+        </p:txBody>
+      </p:sp>
     </p:spTree>
     <p:extLst>
       <p:ext uri="{BB962C8B-B14F-4D97-AF65-F5344CB8AC3E}">
@@ -18267,7 +19111,7 @@
 </p:sld>
 </file>
 
-<file path=ppt/slides/slide32.xml><?xml version="1.0" encoding="utf-8"?>
+<file path=ppt/slides/slide34.xml><?xml version="1.0" encoding="utf-8"?>
 <p:sld xmlns:a="http://schemas.openxmlformats.org/drawingml/2006/main" xmlns:r="http://schemas.openxmlformats.org/officeDocument/2006/relationships" xmlns:p="http://schemas.openxmlformats.org/presentationml/2006/main">
   <p:cSld>
     <p:spTree>
@@ -18755,6 +19599,35 @@
           </a:graphicData>
         </a:graphic>
       </p:graphicFrame>
+      <p:sp>
+        <p:nvSpPr>
+          <p:cNvPr id="4" name="Slide Number Placeholder 3">
+            <a:extLst>
+              <a:ext uri="{FF2B5EF4-FFF2-40B4-BE49-F238E27FC236}">
+                <a16:creationId xmlns:a16="http://schemas.microsoft.com/office/drawing/2014/main" id="{E788AA39-45C5-C0EB-44B1-453909C94798}"/>
+              </a:ext>
+            </a:extLst>
+          </p:cNvPr>
+          <p:cNvSpPr>
+            <a:spLocks noGrp="1"/>
+          </p:cNvSpPr>
+          <p:nvPr>
+            <p:ph type="sldNum" sz="quarter" idx="12"/>
+          </p:nvPr>
+        </p:nvSpPr>
+        <p:spPr/>
+        <p:txBody>
+          <a:bodyPr/>
+          <a:lstStyle/>
+          <a:p>
+            <a:fld id="{E0DC7AD3-7C2E-418B-8082-788996B615FB}" type="slidenum">
+              <a:rPr lang="en-GB" smtClean="0"/>
+              <a:t>34</a:t>
+            </a:fld>
+            <a:endParaRPr lang="en-GB"/>
+          </a:p>
+        </p:txBody>
+      </p:sp>
     </p:spTree>
     <p:extLst>
       <p:ext uri="{BB962C8B-B14F-4D97-AF65-F5344CB8AC3E}">
@@ -18768,7 +19641,7 @@
 </p:sld>
 </file>
 
-<file path=ppt/slides/slide33.xml><?xml version="1.0" encoding="utf-8"?>
+<file path=ppt/slides/slide35.xml><?xml version="1.0" encoding="utf-8"?>
 <p:sld xmlns:a="http://schemas.openxmlformats.org/drawingml/2006/main" xmlns:r="http://schemas.openxmlformats.org/officeDocument/2006/relationships" xmlns:p="http://schemas.openxmlformats.org/presentationml/2006/main">
   <p:cSld>
     <p:spTree>
@@ -18884,6 +19757,35 @@
           </a:prstGeom>
         </p:spPr>
       </p:pic>
+      <p:sp>
+        <p:nvSpPr>
+          <p:cNvPr id="5" name="Slide Number Placeholder 4">
+            <a:extLst>
+              <a:ext uri="{FF2B5EF4-FFF2-40B4-BE49-F238E27FC236}">
+                <a16:creationId xmlns:a16="http://schemas.microsoft.com/office/drawing/2014/main" id="{AB51E033-C01C-5B7F-7F50-44A1FEE43F29}"/>
+              </a:ext>
+            </a:extLst>
+          </p:cNvPr>
+          <p:cNvSpPr>
+            <a:spLocks noGrp="1"/>
+          </p:cNvSpPr>
+          <p:nvPr>
+            <p:ph type="sldNum" sz="quarter" idx="12"/>
+          </p:nvPr>
+        </p:nvSpPr>
+        <p:spPr/>
+        <p:txBody>
+          <a:bodyPr/>
+          <a:lstStyle/>
+          <a:p>
+            <a:fld id="{E0DC7AD3-7C2E-418B-8082-788996B615FB}" type="slidenum">
+              <a:rPr lang="en-GB" smtClean="0"/>
+              <a:t>35</a:t>
+            </a:fld>
+            <a:endParaRPr lang="en-GB"/>
+          </a:p>
+        </p:txBody>
+      </p:sp>
     </p:spTree>
     <p:extLst>
       <p:ext uri="{BB962C8B-B14F-4D97-AF65-F5344CB8AC3E}">
@@ -18897,7 +19799,7 @@
 </p:sld>
 </file>
 
-<file path=ppt/slides/slide34.xml><?xml version="1.0" encoding="utf-8"?>
+<file path=ppt/slides/slide36.xml><?xml version="1.0" encoding="utf-8"?>
 <p:sld xmlns:a="http://schemas.openxmlformats.org/drawingml/2006/main" xmlns:r="http://schemas.openxmlformats.org/officeDocument/2006/relationships" xmlns:p="http://schemas.openxmlformats.org/presentationml/2006/main">
   <p:cSld>
     <p:spTree>
@@ -19026,6 +19928,35 @@
           </a:prstGeom>
         </p:spPr>
       </p:pic>
+      <p:sp>
+        <p:nvSpPr>
+          <p:cNvPr id="5" name="Slide Number Placeholder 4">
+            <a:extLst>
+              <a:ext uri="{FF2B5EF4-FFF2-40B4-BE49-F238E27FC236}">
+                <a16:creationId xmlns:a16="http://schemas.microsoft.com/office/drawing/2014/main" id="{A2089E18-53B8-2712-0ED7-079B853ED95F}"/>
+              </a:ext>
+            </a:extLst>
+          </p:cNvPr>
+          <p:cNvSpPr>
+            <a:spLocks noGrp="1"/>
+          </p:cNvSpPr>
+          <p:nvPr>
+            <p:ph type="sldNum" sz="quarter" idx="12"/>
+          </p:nvPr>
+        </p:nvSpPr>
+        <p:spPr/>
+        <p:txBody>
+          <a:bodyPr/>
+          <a:lstStyle/>
+          <a:p>
+            <a:fld id="{E0DC7AD3-7C2E-418B-8082-788996B615FB}" type="slidenum">
+              <a:rPr lang="en-GB" smtClean="0"/>
+              <a:t>36</a:t>
+            </a:fld>
+            <a:endParaRPr lang="en-GB"/>
+          </a:p>
+        </p:txBody>
+      </p:sp>
     </p:spTree>
     <p:extLst>
       <p:ext uri="{BB962C8B-B14F-4D97-AF65-F5344CB8AC3E}">
@@ -19039,7 +19970,138 @@
 </p:sld>
 </file>
 
-<file path=ppt/slides/slide35.xml><?xml version="1.0" encoding="utf-8"?>
+<file path=ppt/slides/slide37.xml><?xml version="1.0" encoding="utf-8"?>
+<p:sld xmlns:a="http://schemas.openxmlformats.org/drawingml/2006/main" xmlns:r="http://schemas.openxmlformats.org/officeDocument/2006/relationships" xmlns:p="http://schemas.openxmlformats.org/presentationml/2006/main">
+  <p:cSld>
+    <p:spTree>
+      <p:nvGrpSpPr>
+        <p:cNvPr id="1" name="">
+          <a:extLst>
+            <a:ext uri="{FF2B5EF4-FFF2-40B4-BE49-F238E27FC236}">
+              <a16:creationId xmlns:a16="http://schemas.microsoft.com/office/drawing/2014/main" id="{5E4D8DED-3269-F06A-6862-E2FA978CB9C7}"/>
+            </a:ext>
+          </a:extLst>
+        </p:cNvPr>
+        <p:cNvGrpSpPr/>
+        <p:nvPr/>
+      </p:nvGrpSpPr>
+      <p:grpSpPr>
+        <a:xfrm>
+          <a:off x="0" y="0"/>
+          <a:ext cx="0" cy="0"/>
+          <a:chOff x="0" y="0"/>
+          <a:chExt cx="0" cy="0"/>
+        </a:xfrm>
+      </p:grpSpPr>
+      <p:sp>
+        <p:nvSpPr>
+          <p:cNvPr id="6" name="Title 5">
+            <a:extLst>
+              <a:ext uri="{FF2B5EF4-FFF2-40B4-BE49-F238E27FC236}">
+                <a16:creationId xmlns:a16="http://schemas.microsoft.com/office/drawing/2014/main" id="{CB7F4289-A5D8-2ADC-7570-B69C5EC668D9}"/>
+              </a:ext>
+            </a:extLst>
+          </p:cNvPr>
+          <p:cNvSpPr>
+            <a:spLocks noGrp="1"/>
+          </p:cNvSpPr>
+          <p:nvPr>
+            <p:ph type="title"/>
+          </p:nvPr>
+        </p:nvSpPr>
+        <p:spPr/>
+        <p:txBody>
+          <a:bodyPr/>
+          <a:lstStyle/>
+          <a:p>
+            <a:endParaRPr lang="en-IL"/>
+          </a:p>
+        </p:txBody>
+      </p:sp>
+      <p:sp>
+        <p:nvSpPr>
+          <p:cNvPr id="7" name="Text Placeholder 6">
+            <a:extLst>
+              <a:ext uri="{FF2B5EF4-FFF2-40B4-BE49-F238E27FC236}">
+                <a16:creationId xmlns:a16="http://schemas.microsoft.com/office/drawing/2014/main" id="{9F998436-78F7-5974-7E94-385F12459291}"/>
+              </a:ext>
+            </a:extLst>
+          </p:cNvPr>
+          <p:cNvSpPr>
+            <a:spLocks noGrp="1"/>
+          </p:cNvSpPr>
+          <p:nvPr>
+            <p:ph type="body" idx="1"/>
+          </p:nvPr>
+        </p:nvSpPr>
+        <p:spPr/>
+        <p:txBody>
+          <a:bodyPr>
+            <a:normAutofit fontScale="92500"/>
+          </a:bodyPr>
+          <a:lstStyle/>
+          <a:p>
+            <a:pPr algn="ctr"/>
+            <a:r>
+              <a:rPr lang="en-US" sz="7200" dirty="0"/>
+              <a:t>6F Generalized Linear Models</a:t>
+            </a:r>
+            <a:endParaRPr lang="en-IL" sz="7200" dirty="0"/>
+          </a:p>
+        </p:txBody>
+      </p:sp>
+      <p:sp>
+        <p:nvSpPr>
+          <p:cNvPr id="5" name="Slide Number Placeholder 4">
+            <a:extLst>
+              <a:ext uri="{FF2B5EF4-FFF2-40B4-BE49-F238E27FC236}">
+                <a16:creationId xmlns:a16="http://schemas.microsoft.com/office/drawing/2014/main" id="{26B0BEE2-9032-DE42-6E44-8F0C77D80600}"/>
+              </a:ext>
+            </a:extLst>
+          </p:cNvPr>
+          <p:cNvSpPr>
+            <a:spLocks noGrp="1"/>
+          </p:cNvSpPr>
+          <p:nvPr>
+            <p:ph type="sldNum" sz="quarter" idx="12"/>
+          </p:nvPr>
+        </p:nvSpPr>
+        <p:spPr/>
+        <p:txBody>
+          <a:bodyPr/>
+          <a:lstStyle/>
+          <a:p>
+            <a:pPr>
+              <a:defRPr/>
+            </a:pPr>
+            <a:fld id="{3469EAC8-EFAD-49DA-A425-6225312A328A}" type="slidenum">
+              <a:rPr lang="he-IL" altLang="en-US" smtClean="0"/>
+              <a:pPr>
+                <a:defRPr/>
+              </a:pPr>
+              <a:t>37</a:t>
+            </a:fld>
+            <a:r>
+              <a:rPr lang="en-US" altLang="en-US"/>
+              <a:t> /  72</a:t>
+            </a:r>
+          </a:p>
+        </p:txBody>
+      </p:sp>
+    </p:spTree>
+    <p:extLst>
+      <p:ext uri="{BB962C8B-B14F-4D97-AF65-F5344CB8AC3E}">
+        <p14:creationId xmlns:p14="http://schemas.microsoft.com/office/powerpoint/2010/main" val="3446483250"/>
+      </p:ext>
+    </p:extLst>
+  </p:cSld>
+  <p:clrMapOvr>
+    <a:masterClrMapping/>
+  </p:clrMapOvr>
+</p:sld>
+</file>
+
+<file path=ppt/slides/slide38.xml><?xml version="1.0" encoding="utf-8"?>
 <p:sld xmlns:a="http://schemas.openxmlformats.org/drawingml/2006/main" xmlns:r="http://schemas.openxmlformats.org/officeDocument/2006/relationships" xmlns:p="http://schemas.openxmlformats.org/presentationml/2006/main">
   <p:cSld>
     <p:spTree>
@@ -19368,6 +20430,35 @@
           </a:graphicData>
         </a:graphic>
       </p:graphicFrame>
+      <p:sp>
+        <p:nvSpPr>
+          <p:cNvPr id="3" name="Slide Number Placeholder 2">
+            <a:extLst>
+              <a:ext uri="{FF2B5EF4-FFF2-40B4-BE49-F238E27FC236}">
+                <a16:creationId xmlns:a16="http://schemas.microsoft.com/office/drawing/2014/main" id="{1B20568F-027C-D895-79CC-7C2263A3BAE9}"/>
+              </a:ext>
+            </a:extLst>
+          </p:cNvPr>
+          <p:cNvSpPr>
+            <a:spLocks noGrp="1"/>
+          </p:cNvSpPr>
+          <p:nvPr>
+            <p:ph type="sldNum" sz="quarter" idx="12"/>
+          </p:nvPr>
+        </p:nvSpPr>
+        <p:spPr/>
+        <p:txBody>
+          <a:bodyPr/>
+          <a:lstStyle/>
+          <a:p>
+            <a:fld id="{E0DC7AD3-7C2E-418B-8082-788996B615FB}" type="slidenum">
+              <a:rPr lang="en-GB" smtClean="0"/>
+              <a:t>38</a:t>
+            </a:fld>
+            <a:endParaRPr lang="en-GB"/>
+          </a:p>
+        </p:txBody>
+      </p:sp>
     </p:spTree>
     <p:extLst>
       <p:ext uri="{BB962C8B-B14F-4D97-AF65-F5344CB8AC3E}">
@@ -19381,7 +20472,7 @@
 </p:sld>
 </file>
 
-<file path=ppt/slides/slide36.xml><?xml version="1.0" encoding="utf-8"?>
+<file path=ppt/slides/slide39.xml><?xml version="1.0" encoding="utf-8"?>
 <p:sld xmlns:a="http://schemas.openxmlformats.org/drawingml/2006/main" xmlns:r="http://schemas.openxmlformats.org/officeDocument/2006/relationships" xmlns:p="http://schemas.openxmlformats.org/presentationml/2006/main">
   <p:cSld>
     <p:spTree>
@@ -19703,6 +20794,35 @@
           </a:graphicData>
         </a:graphic>
       </p:graphicFrame>
+      <p:sp>
+        <p:nvSpPr>
+          <p:cNvPr id="9" name="Slide Number Placeholder 8">
+            <a:extLst>
+              <a:ext uri="{FF2B5EF4-FFF2-40B4-BE49-F238E27FC236}">
+                <a16:creationId xmlns:a16="http://schemas.microsoft.com/office/drawing/2014/main" id="{21FAC234-35B5-0979-DEDC-9B97431C0D88}"/>
+              </a:ext>
+            </a:extLst>
+          </p:cNvPr>
+          <p:cNvSpPr>
+            <a:spLocks noGrp="1"/>
+          </p:cNvSpPr>
+          <p:nvPr>
+            <p:ph type="sldNum" sz="quarter" idx="12"/>
+          </p:nvPr>
+        </p:nvSpPr>
+        <p:spPr/>
+        <p:txBody>
+          <a:bodyPr/>
+          <a:lstStyle/>
+          <a:p>
+            <a:fld id="{E0DC7AD3-7C2E-418B-8082-788996B615FB}" type="slidenum">
+              <a:rPr lang="en-GB" smtClean="0"/>
+              <a:t>39</a:t>
+            </a:fld>
+            <a:endParaRPr lang="en-GB"/>
+          </a:p>
+        </p:txBody>
+      </p:sp>
     </p:spTree>
     <p:extLst>
       <p:ext uri="{BB962C8B-B14F-4D97-AF65-F5344CB8AC3E}">
@@ -19716,7 +20836,388 @@
 </p:sld>
 </file>
 
-<file path=ppt/slides/slide37.xml><?xml version="1.0" encoding="utf-8"?>
+<file path=ppt/slides/slide4.xml><?xml version="1.0" encoding="utf-8"?>
+<p:sld xmlns:a="http://schemas.openxmlformats.org/drawingml/2006/main" xmlns:r="http://schemas.openxmlformats.org/officeDocument/2006/relationships" xmlns:p="http://schemas.openxmlformats.org/presentationml/2006/main">
+  <p:cSld>
+    <p:spTree>
+      <p:nvGrpSpPr>
+        <p:cNvPr id="1" name=""/>
+        <p:cNvGrpSpPr/>
+        <p:nvPr/>
+      </p:nvGrpSpPr>
+      <p:grpSpPr>
+        <a:xfrm>
+          <a:off x="0" y="0"/>
+          <a:ext cx="0" cy="0"/>
+          <a:chOff x="0" y="0"/>
+          <a:chExt cx="0" cy="0"/>
+        </a:xfrm>
+      </p:grpSpPr>
+      <p:sp>
+        <p:nvSpPr>
+          <p:cNvPr id="2" name="Title 1"/>
+          <p:cNvSpPr>
+            <a:spLocks noGrp="1"/>
+          </p:cNvSpPr>
+          <p:nvPr>
+            <p:ph type="title"/>
+          </p:nvPr>
+        </p:nvSpPr>
+        <p:spPr/>
+        <p:txBody>
+          <a:bodyPr/>
+          <a:lstStyle/>
+          <a:p>
+            <a:r>
+              <a:rPr lang="en-US" dirty="0"/>
+              <a:t>Some bivariate data</a:t>
+            </a:r>
+          </a:p>
+        </p:txBody>
+      </p:sp>
+      <p:sp>
+        <p:nvSpPr>
+          <p:cNvPr id="3" name="Content Placeholder 2"/>
+          <p:cNvSpPr>
+            <a:spLocks noGrp="1"/>
+          </p:cNvSpPr>
+          <p:nvPr>
+            <p:ph idx="1"/>
+          </p:nvPr>
+        </p:nvSpPr>
+        <p:spPr>
+          <a:xfrm>
+            <a:off x="1981200" y="1268414"/>
+            <a:ext cx="3754760" cy="3672755"/>
+          </a:xfrm>
+        </p:spPr>
+        <p:txBody>
+          <a:bodyPr>
+            <a:normAutofit fontScale="92500" lnSpcReduction="20000"/>
+          </a:bodyPr>
+          <a:lstStyle/>
+          <a:p>
+            <a:r>
+              <a:rPr lang="en-US" dirty="0"/>
+              <a:t>x: independent variable</a:t>
+            </a:r>
+          </a:p>
+          <a:p>
+            <a:r>
+              <a:rPr lang="en-US" dirty="0"/>
+              <a:t>y: dependent variable</a:t>
+            </a:r>
+          </a:p>
+          <a:p>
+            <a:endParaRPr lang="en-US" dirty="0"/>
+          </a:p>
+          <a:p>
+            <a:r>
+              <a:rPr lang="en-US" dirty="0"/>
+              <a:t>Sometimes this makes sense</a:t>
+            </a:r>
+          </a:p>
+          <a:p>
+            <a:pPr lvl="1"/>
+            <a:r>
+              <a:rPr lang="en-US" dirty="0"/>
+              <a:t>Age is affecting cerebellar volume</a:t>
+            </a:r>
+          </a:p>
+          <a:p>
+            <a:r>
+              <a:rPr lang="en-US" dirty="0"/>
+              <a:t>Sometimes it’s arbitrary</a:t>
+            </a:r>
+          </a:p>
+          <a:p>
+            <a:pPr lvl="1"/>
+            <a:r>
+              <a:rPr lang="en-US" dirty="0"/>
+              <a:t>Cerebral volume and cerebellar volume</a:t>
+            </a:r>
+          </a:p>
+        </p:txBody>
+      </p:sp>
+      <p:sp>
+        <p:nvSpPr>
+          <p:cNvPr id="5" name="Slide Number Placeholder 4"/>
+          <p:cNvSpPr>
+            <a:spLocks noGrp="1"/>
+          </p:cNvSpPr>
+          <p:nvPr>
+            <p:ph type="sldNum" sz="quarter" idx="12"/>
+          </p:nvPr>
+        </p:nvSpPr>
+        <p:spPr/>
+        <p:txBody>
+          <a:bodyPr/>
+          <a:lstStyle/>
+          <a:p>
+            <a:fld id="{2C16C311-76E6-4493-A800-03F6BFB61D22}" type="slidenum">
+              <a:rPr lang="he-IL" smtClean="0"/>
+              <a:pPr/>
+              <a:t>4</a:t>
+            </a:fld>
+            <a:r>
+              <a:rPr lang="en-CA"/>
+              <a:t>/76</a:t>
+            </a:r>
+            <a:endParaRPr lang="en-US" dirty="0"/>
+          </a:p>
+        </p:txBody>
+      </p:sp>
+      <p:pic>
+        <p:nvPicPr>
+          <p:cNvPr id="1077250" name="Picture 2">
+            <a:extLst>
+              <a:ext uri="{FF2B5EF4-FFF2-40B4-BE49-F238E27FC236}">
+                <a16:creationId xmlns:a16="http://schemas.microsoft.com/office/drawing/2014/main" id="{F8F84E2A-054F-63C1-B266-52EC3A825F76}"/>
+              </a:ext>
+            </a:extLst>
+          </p:cNvPr>
+          <p:cNvPicPr>
+            <a:picLocks noChangeAspect="1" noChangeArrowheads="1"/>
+          </p:cNvPicPr>
+          <p:nvPr/>
+        </p:nvPicPr>
+        <p:blipFill>
+          <a:blip r:embed="rId2" cstate="email">
+            <a:extLst>
+              <a:ext uri="{28A0092B-C50C-407E-A947-70E740481C1C}">
+                <a14:useLocalDpi xmlns:a14="http://schemas.microsoft.com/office/drawing/2010/main" val="0"/>
+              </a:ext>
+            </a:extLst>
+          </a:blip>
+          <a:srcRect/>
+          <a:stretch>
+            <a:fillRect/>
+          </a:stretch>
+        </p:blipFill>
+        <p:spPr bwMode="auto">
+          <a:xfrm>
+            <a:off x="5903075" y="1560734"/>
+            <a:ext cx="4456951" cy="3528739"/>
+          </a:xfrm>
+          <a:prstGeom prst="rect">
+            <a:avLst/>
+          </a:prstGeom>
+          <a:noFill/>
+          <a:extLst>
+            <a:ext uri="{909E8E84-426E-40DD-AFC4-6F175D3DCCD1}">
+              <a14:hiddenFill xmlns:a14="http://schemas.microsoft.com/office/drawing/2010/main">
+                <a:solidFill>
+                  <a:srgbClr val="FFFFFF"/>
+                </a:solidFill>
+              </a14:hiddenFill>
+            </a:ext>
+          </a:extLst>
+        </p:spPr>
+      </p:pic>
+    </p:spTree>
+    <p:extLst>
+      <p:ext uri="{BB962C8B-B14F-4D97-AF65-F5344CB8AC3E}">
+        <p14:creationId xmlns:p14="http://schemas.microsoft.com/office/powerpoint/2010/main" val="1946333332"/>
+      </p:ext>
+    </p:extLst>
+  </p:cSld>
+  <p:clrMapOvr>
+    <a:masterClrMapping/>
+  </p:clrMapOvr>
+  <p:timing>
+    <p:tnLst>
+      <p:par>
+        <p:cTn id="1" dur="indefinite" restart="never" nodeType="tmRoot">
+          <p:childTnLst>
+            <p:seq concurrent="1" nextAc="seek">
+              <p:cTn id="2" dur="indefinite" nodeType="mainSeq">
+                <p:childTnLst>
+                  <p:par>
+                    <p:cTn id="3" fill="hold">
+                      <p:stCondLst>
+                        <p:cond delay="indefinite"/>
+                      </p:stCondLst>
+                      <p:childTnLst>
+                        <p:par>
+                          <p:cTn id="4" fill="hold">
+                            <p:stCondLst>
+                              <p:cond delay="0"/>
+                            </p:stCondLst>
+                            <p:childTnLst>
+                              <p:par>
+                                <p:cTn id="5" presetID="1" presetClass="entr" presetSubtype="0" fill="hold" nodeType="clickEffect">
+                                  <p:stCondLst>
+                                    <p:cond delay="0"/>
+                                  </p:stCondLst>
+                                  <p:childTnLst>
+                                    <p:set>
+                                      <p:cBhvr>
+                                        <p:cTn id="6" dur="1" fill="hold">
+                                          <p:stCondLst>
+                                            <p:cond delay="0"/>
+                                          </p:stCondLst>
+                                        </p:cTn>
+                                        <p:tgtEl>
+                                          <p:spTgt spid="3">
+                                            <p:txEl>
+                                              <p:pRg st="3" end="3"/>
+                                            </p:txEl>
+                                          </p:spTgt>
+                                        </p:tgtEl>
+                                        <p:attrNameLst>
+                                          <p:attrName>style.visibility</p:attrName>
+                                        </p:attrNameLst>
+                                      </p:cBhvr>
+                                      <p:to>
+                                        <p:strVal val="visible"/>
+                                      </p:to>
+                                    </p:set>
+                                  </p:childTnLst>
+                                </p:cTn>
+                              </p:par>
+                              <p:par>
+                                <p:cTn id="7" presetID="1" presetClass="entr" presetSubtype="0" fill="hold" nodeType="withEffect">
+                                  <p:stCondLst>
+                                    <p:cond delay="0"/>
+                                  </p:stCondLst>
+                                  <p:childTnLst>
+                                    <p:set>
+                                      <p:cBhvr>
+                                        <p:cTn id="8" dur="1" fill="hold">
+                                          <p:stCondLst>
+                                            <p:cond delay="0"/>
+                                          </p:stCondLst>
+                                        </p:cTn>
+                                        <p:tgtEl>
+                                          <p:spTgt spid="3">
+                                            <p:txEl>
+                                              <p:pRg st="4" end="4"/>
+                                            </p:txEl>
+                                          </p:spTgt>
+                                        </p:tgtEl>
+                                        <p:attrNameLst>
+                                          <p:attrName>style.visibility</p:attrName>
+                                        </p:attrNameLst>
+                                      </p:cBhvr>
+                                      <p:to>
+                                        <p:strVal val="visible"/>
+                                      </p:to>
+                                    </p:set>
+                                  </p:childTnLst>
+                                </p:cTn>
+                              </p:par>
+                            </p:childTnLst>
+                          </p:cTn>
+                        </p:par>
+                      </p:childTnLst>
+                    </p:cTn>
+                  </p:par>
+                  <p:par>
+                    <p:cTn id="9" fill="hold">
+                      <p:stCondLst>
+                        <p:cond delay="indefinite"/>
+                      </p:stCondLst>
+                      <p:childTnLst>
+                        <p:par>
+                          <p:cTn id="10" fill="hold">
+                            <p:stCondLst>
+                              <p:cond delay="0"/>
+                            </p:stCondLst>
+                            <p:childTnLst>
+                              <p:par>
+                                <p:cTn id="11" presetID="1" presetClass="entr" presetSubtype="0" fill="hold" nodeType="clickEffect">
+                                  <p:stCondLst>
+                                    <p:cond delay="0"/>
+                                  </p:stCondLst>
+                                  <p:childTnLst>
+                                    <p:set>
+                                      <p:cBhvr>
+                                        <p:cTn id="12" dur="1" fill="hold">
+                                          <p:stCondLst>
+                                            <p:cond delay="0"/>
+                                          </p:stCondLst>
+                                        </p:cTn>
+                                        <p:tgtEl>
+                                          <p:spTgt spid="3">
+                                            <p:txEl>
+                                              <p:pRg st="5" end="5"/>
+                                            </p:txEl>
+                                          </p:spTgt>
+                                        </p:tgtEl>
+                                        <p:attrNameLst>
+                                          <p:attrName>style.visibility</p:attrName>
+                                        </p:attrNameLst>
+                                      </p:cBhvr>
+                                      <p:to>
+                                        <p:strVal val="visible"/>
+                                      </p:to>
+                                    </p:set>
+                                  </p:childTnLst>
+                                </p:cTn>
+                              </p:par>
+                              <p:par>
+                                <p:cTn id="13" presetID="1" presetClass="entr" presetSubtype="0" fill="hold" nodeType="withEffect">
+                                  <p:stCondLst>
+                                    <p:cond delay="0"/>
+                                  </p:stCondLst>
+                                  <p:childTnLst>
+                                    <p:set>
+                                      <p:cBhvr>
+                                        <p:cTn id="14" dur="1" fill="hold">
+                                          <p:stCondLst>
+                                            <p:cond delay="0"/>
+                                          </p:stCondLst>
+                                        </p:cTn>
+                                        <p:tgtEl>
+                                          <p:spTgt spid="3">
+                                            <p:txEl>
+                                              <p:pRg st="6" end="6"/>
+                                            </p:txEl>
+                                          </p:spTgt>
+                                        </p:tgtEl>
+                                        <p:attrNameLst>
+                                          <p:attrName>style.visibility</p:attrName>
+                                        </p:attrNameLst>
+                                      </p:cBhvr>
+                                      <p:to>
+                                        <p:strVal val="visible"/>
+                                      </p:to>
+                                    </p:set>
+                                  </p:childTnLst>
+                                </p:cTn>
+                              </p:par>
+                            </p:childTnLst>
+                          </p:cTn>
+                        </p:par>
+                      </p:childTnLst>
+                    </p:cTn>
+                  </p:par>
+                </p:childTnLst>
+              </p:cTn>
+              <p:prevCondLst>
+                <p:cond evt="onPrev" delay="0">
+                  <p:tgtEl>
+                    <p:sldTgt/>
+                  </p:tgtEl>
+                </p:cond>
+              </p:prevCondLst>
+              <p:nextCondLst>
+                <p:cond evt="onNext" delay="0">
+                  <p:tgtEl>
+                    <p:sldTgt/>
+                  </p:tgtEl>
+                </p:cond>
+              </p:nextCondLst>
+            </p:seq>
+          </p:childTnLst>
+        </p:cTn>
+      </p:par>
+    </p:tnLst>
+  </p:timing>
+</p:sld>
+</file>
+
+<file path=ppt/slides/slide40.xml><?xml version="1.0" encoding="utf-8"?>
 <p:sld xmlns:a="http://schemas.openxmlformats.org/drawingml/2006/main" xmlns:r="http://schemas.openxmlformats.org/officeDocument/2006/relationships" xmlns:p="http://schemas.openxmlformats.org/presentationml/2006/main">
   <p:cSld>
     <p:spTree>
@@ -19866,6 +21367,35 @@
           </a:prstGeom>
         </p:spPr>
       </p:pic>
+      <p:sp>
+        <p:nvSpPr>
+          <p:cNvPr id="2" name="Slide Number Placeholder 1">
+            <a:extLst>
+              <a:ext uri="{FF2B5EF4-FFF2-40B4-BE49-F238E27FC236}">
+                <a16:creationId xmlns:a16="http://schemas.microsoft.com/office/drawing/2014/main" id="{96B0FB3A-028F-6F0C-C6FF-EFED8C13D9B6}"/>
+              </a:ext>
+            </a:extLst>
+          </p:cNvPr>
+          <p:cNvSpPr>
+            <a:spLocks noGrp="1"/>
+          </p:cNvSpPr>
+          <p:nvPr>
+            <p:ph type="sldNum" sz="quarter" idx="12"/>
+          </p:nvPr>
+        </p:nvSpPr>
+        <p:spPr/>
+        <p:txBody>
+          <a:bodyPr/>
+          <a:lstStyle/>
+          <a:p>
+            <a:fld id="{E0DC7AD3-7C2E-418B-8082-788996B615FB}" type="slidenum">
+              <a:rPr lang="en-GB" smtClean="0"/>
+              <a:t>40</a:t>
+            </a:fld>
+            <a:endParaRPr lang="en-GB"/>
+          </a:p>
+        </p:txBody>
+      </p:sp>
     </p:spTree>
     <p:extLst>
       <p:ext uri="{BB962C8B-B14F-4D97-AF65-F5344CB8AC3E}">
@@ -19879,7 +21409,7 @@
 </p:sld>
 </file>
 
-<file path=ppt/slides/slide38.xml><?xml version="1.0" encoding="utf-8"?>
+<file path=ppt/slides/slide41.xml><?xml version="1.0" encoding="utf-8"?>
 <p:sld xmlns:a="http://schemas.openxmlformats.org/drawingml/2006/main" xmlns:r="http://schemas.openxmlformats.org/officeDocument/2006/relationships" xmlns:p="http://schemas.openxmlformats.org/presentationml/2006/main">
   <p:cSld>
     <p:spTree>
@@ -20713,6 +22243,35 @@
           </p:graphicFrame>
         </mc:Fallback>
       </mc:AlternateContent>
+      <p:sp>
+        <p:nvSpPr>
+          <p:cNvPr id="2" name="Slide Number Placeholder 1">
+            <a:extLst>
+              <a:ext uri="{FF2B5EF4-FFF2-40B4-BE49-F238E27FC236}">
+                <a16:creationId xmlns:a16="http://schemas.microsoft.com/office/drawing/2014/main" id="{430916C6-2446-8541-6C7E-945EC845C271}"/>
+              </a:ext>
+            </a:extLst>
+          </p:cNvPr>
+          <p:cNvSpPr>
+            <a:spLocks noGrp="1"/>
+          </p:cNvSpPr>
+          <p:nvPr>
+            <p:ph type="sldNum" sz="quarter" idx="12"/>
+          </p:nvPr>
+        </p:nvSpPr>
+        <p:spPr/>
+        <p:txBody>
+          <a:bodyPr/>
+          <a:lstStyle/>
+          <a:p>
+            <a:fld id="{E0DC7AD3-7C2E-418B-8082-788996B615FB}" type="slidenum">
+              <a:rPr lang="en-GB" smtClean="0"/>
+              <a:t>41</a:t>
+            </a:fld>
+            <a:endParaRPr lang="en-GB"/>
+          </a:p>
+        </p:txBody>
+      </p:sp>
     </p:spTree>
     <p:extLst>
       <p:ext uri="{BB962C8B-B14F-4D97-AF65-F5344CB8AC3E}">
@@ -20726,7 +22285,7 @@
 </p:sld>
 </file>
 
-<file path=ppt/slides/slide39.xml><?xml version="1.0" encoding="utf-8"?>
+<file path=ppt/slides/slide42.xml><?xml version="1.0" encoding="utf-8"?>
 <p:sld xmlns:a="http://schemas.openxmlformats.org/drawingml/2006/main" xmlns:r="http://schemas.openxmlformats.org/officeDocument/2006/relationships" xmlns:p="http://schemas.openxmlformats.org/presentationml/2006/main">
   <p:cSld>
     <p:spTree>
@@ -20877,6 +22436,35 @@
           </a:prstGeom>
         </p:spPr>
       </p:pic>
+      <p:sp>
+        <p:nvSpPr>
+          <p:cNvPr id="3" name="Slide Number Placeholder 2">
+            <a:extLst>
+              <a:ext uri="{FF2B5EF4-FFF2-40B4-BE49-F238E27FC236}">
+                <a16:creationId xmlns:a16="http://schemas.microsoft.com/office/drawing/2014/main" id="{3FF3DE82-1842-B888-D9E4-5100344EFAB3}"/>
+              </a:ext>
+            </a:extLst>
+          </p:cNvPr>
+          <p:cNvSpPr>
+            <a:spLocks noGrp="1"/>
+          </p:cNvSpPr>
+          <p:nvPr>
+            <p:ph type="sldNum" sz="quarter" idx="12"/>
+          </p:nvPr>
+        </p:nvSpPr>
+        <p:spPr/>
+        <p:txBody>
+          <a:bodyPr/>
+          <a:lstStyle/>
+          <a:p>
+            <a:fld id="{E0DC7AD3-7C2E-418B-8082-788996B615FB}" type="slidenum">
+              <a:rPr lang="en-GB" smtClean="0"/>
+              <a:t>42</a:t>
+            </a:fld>
+            <a:endParaRPr lang="en-GB"/>
+          </a:p>
+        </p:txBody>
+      </p:sp>
     </p:spTree>
     <p:extLst>
       <p:ext uri="{BB962C8B-B14F-4D97-AF65-F5344CB8AC3E}">
@@ -20890,415 +22478,7 @@
 </p:sld>
 </file>
 
-<file path=ppt/slides/slide4.xml><?xml version="1.0" encoding="utf-8"?>
-<p:sld xmlns:a="http://schemas.openxmlformats.org/drawingml/2006/main" xmlns:r="http://schemas.openxmlformats.org/officeDocument/2006/relationships" xmlns:p="http://schemas.openxmlformats.org/presentationml/2006/main">
-  <p:cSld>
-    <p:spTree>
-      <p:nvGrpSpPr>
-        <p:cNvPr id="1" name=""/>
-        <p:cNvGrpSpPr/>
-        <p:nvPr/>
-      </p:nvGrpSpPr>
-      <p:grpSpPr>
-        <a:xfrm>
-          <a:off x="0" y="0"/>
-          <a:ext cx="0" cy="0"/>
-          <a:chOff x="0" y="0"/>
-          <a:chExt cx="0" cy="0"/>
-        </a:xfrm>
-      </p:grpSpPr>
-      <p:sp>
-        <p:nvSpPr>
-          <p:cNvPr id="2" name="Title 1"/>
-          <p:cNvSpPr>
-            <a:spLocks noGrp="1"/>
-          </p:cNvSpPr>
-          <p:nvPr>
-            <p:ph type="title"/>
-          </p:nvPr>
-        </p:nvSpPr>
-        <p:spPr/>
-        <p:txBody>
-          <a:bodyPr/>
-          <a:lstStyle/>
-          <a:p>
-            <a:r>
-              <a:rPr lang="en-US" dirty="0"/>
-              <a:t>Some bivariate data</a:t>
-            </a:r>
-          </a:p>
-        </p:txBody>
-      </p:sp>
-      <p:sp>
-        <p:nvSpPr>
-          <p:cNvPr id="3" name="Content Placeholder 2"/>
-          <p:cNvSpPr>
-            <a:spLocks noGrp="1"/>
-          </p:cNvSpPr>
-          <p:nvPr>
-            <p:ph idx="1"/>
-          </p:nvPr>
-        </p:nvSpPr>
-        <p:spPr>
-          <a:xfrm>
-            <a:off x="1981200" y="1268414"/>
-            <a:ext cx="3754760" cy="3672755"/>
-          </a:xfrm>
-        </p:spPr>
-        <p:txBody>
-          <a:bodyPr>
-            <a:normAutofit fontScale="92500" lnSpcReduction="20000"/>
-          </a:bodyPr>
-          <a:lstStyle/>
-          <a:p>
-            <a:r>
-              <a:rPr lang="en-US" dirty="0"/>
-              <a:t>x: independent variable</a:t>
-            </a:r>
-          </a:p>
-          <a:p>
-            <a:r>
-              <a:rPr lang="en-US" dirty="0"/>
-              <a:t>y: dependent variable</a:t>
-            </a:r>
-          </a:p>
-          <a:p>
-            <a:endParaRPr lang="en-US" dirty="0"/>
-          </a:p>
-          <a:p>
-            <a:r>
-              <a:rPr lang="en-US" dirty="0"/>
-              <a:t>Sometimes this makes sense</a:t>
-            </a:r>
-          </a:p>
-          <a:p>
-            <a:pPr lvl="1"/>
-            <a:r>
-              <a:rPr lang="en-US" dirty="0"/>
-              <a:t>Age is affecting cerebellar volume</a:t>
-            </a:r>
-          </a:p>
-          <a:p>
-            <a:r>
-              <a:rPr lang="en-US" dirty="0"/>
-              <a:t>Sometimes it’s arbitrary</a:t>
-            </a:r>
-          </a:p>
-          <a:p>
-            <a:pPr lvl="1"/>
-            <a:r>
-              <a:rPr lang="en-US" dirty="0"/>
-              <a:t>Cerebral volume and cerebellar volume</a:t>
-            </a:r>
-          </a:p>
-        </p:txBody>
-      </p:sp>
-      <p:sp>
-        <p:nvSpPr>
-          <p:cNvPr id="4" name="Footer Placeholder 3"/>
-          <p:cNvSpPr>
-            <a:spLocks noGrp="1"/>
-          </p:cNvSpPr>
-          <p:nvPr>
-            <p:ph type="ftr" sz="quarter" idx="11"/>
-          </p:nvPr>
-        </p:nvSpPr>
-        <p:spPr/>
-        <p:txBody>
-          <a:bodyPr/>
-          <a:lstStyle/>
-          <a:p>
-            <a:r>
-              <a:rPr lang="en-US"/>
-              <a:t>Data analysis, Semester </a:t>
-            </a:r>
-            <a:r>
-              <a:rPr lang="en-150"/>
-              <a:t>2020-2</a:t>
-            </a:r>
-            <a:endParaRPr lang="en-US" dirty="0"/>
-          </a:p>
-        </p:txBody>
-      </p:sp>
-      <p:sp>
-        <p:nvSpPr>
-          <p:cNvPr id="5" name="Slide Number Placeholder 4"/>
-          <p:cNvSpPr>
-            <a:spLocks noGrp="1"/>
-          </p:cNvSpPr>
-          <p:nvPr>
-            <p:ph type="sldNum" sz="quarter" idx="12"/>
-          </p:nvPr>
-        </p:nvSpPr>
-        <p:spPr/>
-        <p:txBody>
-          <a:bodyPr/>
-          <a:lstStyle/>
-          <a:p>
-            <a:fld id="{2C16C311-76E6-4493-A800-03F6BFB61D22}" type="slidenum">
-              <a:rPr lang="he-IL" smtClean="0"/>
-              <a:pPr/>
-              <a:t>4</a:t>
-            </a:fld>
-            <a:r>
-              <a:rPr lang="en-CA"/>
-              <a:t>/76</a:t>
-            </a:r>
-            <a:endParaRPr lang="en-US" dirty="0"/>
-          </a:p>
-        </p:txBody>
-      </p:sp>
-      <p:pic>
-        <p:nvPicPr>
-          <p:cNvPr id="1077250" name="Picture 2">
-            <a:extLst>
-              <a:ext uri="{FF2B5EF4-FFF2-40B4-BE49-F238E27FC236}">
-                <a16:creationId xmlns:a16="http://schemas.microsoft.com/office/drawing/2014/main" id="{F8F84E2A-054F-63C1-B266-52EC3A825F76}"/>
-              </a:ext>
-            </a:extLst>
-          </p:cNvPr>
-          <p:cNvPicPr>
-            <a:picLocks noChangeAspect="1" noChangeArrowheads="1"/>
-          </p:cNvPicPr>
-          <p:nvPr/>
-        </p:nvPicPr>
-        <p:blipFill>
-          <a:blip r:embed="rId2" cstate="email">
-            <a:extLst>
-              <a:ext uri="{28A0092B-C50C-407E-A947-70E740481C1C}">
-                <a14:useLocalDpi xmlns:a14="http://schemas.microsoft.com/office/drawing/2010/main" val="0"/>
-              </a:ext>
-            </a:extLst>
-          </a:blip>
-          <a:srcRect/>
-          <a:stretch>
-            <a:fillRect/>
-          </a:stretch>
-        </p:blipFill>
-        <p:spPr bwMode="auto">
-          <a:xfrm>
-            <a:off x="5903075" y="1560734"/>
-            <a:ext cx="4456951" cy="3528739"/>
-          </a:xfrm>
-          <a:prstGeom prst="rect">
-            <a:avLst/>
-          </a:prstGeom>
-          <a:noFill/>
-          <a:extLst>
-            <a:ext uri="{909E8E84-426E-40DD-AFC4-6F175D3DCCD1}">
-              <a14:hiddenFill xmlns:a14="http://schemas.microsoft.com/office/drawing/2010/main">
-                <a:solidFill>
-                  <a:srgbClr val="FFFFFF"/>
-                </a:solidFill>
-              </a14:hiddenFill>
-            </a:ext>
-          </a:extLst>
-        </p:spPr>
-      </p:pic>
-    </p:spTree>
-    <p:extLst>
-      <p:ext uri="{BB962C8B-B14F-4D97-AF65-F5344CB8AC3E}">
-        <p14:creationId xmlns:p14="http://schemas.microsoft.com/office/powerpoint/2010/main" val="1946333332"/>
-      </p:ext>
-    </p:extLst>
-  </p:cSld>
-  <p:clrMapOvr>
-    <a:masterClrMapping/>
-  </p:clrMapOvr>
-  <p:timing>
-    <p:tnLst>
-      <p:par>
-        <p:cTn id="1" dur="indefinite" restart="never" nodeType="tmRoot">
-          <p:childTnLst>
-            <p:seq concurrent="1" nextAc="seek">
-              <p:cTn id="2" dur="indefinite" nodeType="mainSeq">
-                <p:childTnLst>
-                  <p:par>
-                    <p:cTn id="3" fill="hold">
-                      <p:stCondLst>
-                        <p:cond delay="indefinite"/>
-                      </p:stCondLst>
-                      <p:childTnLst>
-                        <p:par>
-                          <p:cTn id="4" fill="hold">
-                            <p:stCondLst>
-                              <p:cond delay="0"/>
-                            </p:stCondLst>
-                            <p:childTnLst>
-                              <p:par>
-                                <p:cTn id="5" presetID="1" presetClass="entr" presetSubtype="0" fill="hold" nodeType="clickEffect">
-                                  <p:stCondLst>
-                                    <p:cond delay="0"/>
-                                  </p:stCondLst>
-                                  <p:childTnLst>
-                                    <p:set>
-                                      <p:cBhvr>
-                                        <p:cTn id="6" dur="1" fill="hold">
-                                          <p:stCondLst>
-                                            <p:cond delay="0"/>
-                                          </p:stCondLst>
-                                        </p:cTn>
-                                        <p:tgtEl>
-                                          <p:spTgt spid="3">
-                                            <p:txEl>
-                                              <p:pRg st="3" end="3"/>
-                                            </p:txEl>
-                                          </p:spTgt>
-                                        </p:tgtEl>
-                                        <p:attrNameLst>
-                                          <p:attrName>style.visibility</p:attrName>
-                                        </p:attrNameLst>
-                                      </p:cBhvr>
-                                      <p:to>
-                                        <p:strVal val="visible"/>
-                                      </p:to>
-                                    </p:set>
-                                  </p:childTnLst>
-                                </p:cTn>
-                              </p:par>
-                              <p:par>
-                                <p:cTn id="7" presetID="1" presetClass="entr" presetSubtype="0" fill="hold" nodeType="withEffect">
-                                  <p:stCondLst>
-                                    <p:cond delay="0"/>
-                                  </p:stCondLst>
-                                  <p:childTnLst>
-                                    <p:set>
-                                      <p:cBhvr>
-                                        <p:cTn id="8" dur="1" fill="hold">
-                                          <p:stCondLst>
-                                            <p:cond delay="0"/>
-                                          </p:stCondLst>
-                                        </p:cTn>
-                                        <p:tgtEl>
-                                          <p:spTgt spid="3">
-                                            <p:txEl>
-                                              <p:pRg st="4" end="4"/>
-                                            </p:txEl>
-                                          </p:spTgt>
-                                        </p:tgtEl>
-                                        <p:attrNameLst>
-                                          <p:attrName>style.visibility</p:attrName>
-                                        </p:attrNameLst>
-                                      </p:cBhvr>
-                                      <p:to>
-                                        <p:strVal val="visible"/>
-                                      </p:to>
-                                    </p:set>
-                                  </p:childTnLst>
-                                </p:cTn>
-                              </p:par>
-                            </p:childTnLst>
-                          </p:cTn>
-                        </p:par>
-                      </p:childTnLst>
-                    </p:cTn>
-                  </p:par>
-                  <p:par>
-                    <p:cTn id="9" fill="hold">
-                      <p:stCondLst>
-                        <p:cond delay="indefinite"/>
-                      </p:stCondLst>
-                      <p:childTnLst>
-                        <p:par>
-                          <p:cTn id="10" fill="hold">
-                            <p:stCondLst>
-                              <p:cond delay="0"/>
-                            </p:stCondLst>
-                            <p:childTnLst>
-                              <p:par>
-                                <p:cTn id="11" presetID="1" presetClass="entr" presetSubtype="0" fill="hold" nodeType="clickEffect">
-                                  <p:stCondLst>
-                                    <p:cond delay="0"/>
-                                  </p:stCondLst>
-                                  <p:childTnLst>
-                                    <p:set>
-                                      <p:cBhvr>
-                                        <p:cTn id="12" dur="1" fill="hold">
-                                          <p:stCondLst>
-                                            <p:cond delay="0"/>
-                                          </p:stCondLst>
-                                        </p:cTn>
-                                        <p:tgtEl>
-                                          <p:spTgt spid="3">
-                                            <p:txEl>
-                                              <p:pRg st="5" end="5"/>
-                                            </p:txEl>
-                                          </p:spTgt>
-                                        </p:tgtEl>
-                                        <p:attrNameLst>
-                                          <p:attrName>style.visibility</p:attrName>
-                                        </p:attrNameLst>
-                                      </p:cBhvr>
-                                      <p:to>
-                                        <p:strVal val="visible"/>
-                                      </p:to>
-                                    </p:set>
-                                  </p:childTnLst>
-                                </p:cTn>
-                              </p:par>
-                              <p:par>
-                                <p:cTn id="13" presetID="1" presetClass="entr" presetSubtype="0" fill="hold" nodeType="withEffect">
-                                  <p:stCondLst>
-                                    <p:cond delay="0"/>
-                                  </p:stCondLst>
-                                  <p:childTnLst>
-                                    <p:set>
-                                      <p:cBhvr>
-                                        <p:cTn id="14" dur="1" fill="hold">
-                                          <p:stCondLst>
-                                            <p:cond delay="0"/>
-                                          </p:stCondLst>
-                                        </p:cTn>
-                                        <p:tgtEl>
-                                          <p:spTgt spid="3">
-                                            <p:txEl>
-                                              <p:pRg st="6" end="6"/>
-                                            </p:txEl>
-                                          </p:spTgt>
-                                        </p:tgtEl>
-                                        <p:attrNameLst>
-                                          <p:attrName>style.visibility</p:attrName>
-                                        </p:attrNameLst>
-                                      </p:cBhvr>
-                                      <p:to>
-                                        <p:strVal val="visible"/>
-                                      </p:to>
-                                    </p:set>
-                                  </p:childTnLst>
-                                </p:cTn>
-                              </p:par>
-                            </p:childTnLst>
-                          </p:cTn>
-                        </p:par>
-                      </p:childTnLst>
-                    </p:cTn>
-                  </p:par>
-                </p:childTnLst>
-              </p:cTn>
-              <p:prevCondLst>
-                <p:cond evt="onPrev" delay="0">
-                  <p:tgtEl>
-                    <p:sldTgt/>
-                  </p:tgtEl>
-                </p:cond>
-              </p:prevCondLst>
-              <p:nextCondLst>
-                <p:cond evt="onNext" delay="0">
-                  <p:tgtEl>
-                    <p:sldTgt/>
-                  </p:tgtEl>
-                </p:cond>
-              </p:nextCondLst>
-            </p:seq>
-          </p:childTnLst>
-        </p:cTn>
-      </p:par>
-    </p:tnLst>
-  </p:timing>
-</p:sld>
-</file>
-
-<file path=ppt/slides/slide40.xml><?xml version="1.0" encoding="utf-8"?>
+<file path=ppt/slides/slide43.xml><?xml version="1.0" encoding="utf-8"?>
 <p:sld xmlns:a="http://schemas.openxmlformats.org/drawingml/2006/main" xmlns:r="http://schemas.openxmlformats.org/officeDocument/2006/relationships" xmlns:p="http://schemas.openxmlformats.org/presentationml/2006/main">
   <p:cSld>
     <p:spTree>
@@ -22779,6 +23959,35 @@
           </a:p>
         </p:txBody>
       </p:sp>
+      <p:sp>
+        <p:nvSpPr>
+          <p:cNvPr id="3" name="Slide Number Placeholder 2">
+            <a:extLst>
+              <a:ext uri="{FF2B5EF4-FFF2-40B4-BE49-F238E27FC236}">
+                <a16:creationId xmlns:a16="http://schemas.microsoft.com/office/drawing/2014/main" id="{C557D273-D564-AE41-E6BB-7E47C0774924}"/>
+              </a:ext>
+            </a:extLst>
+          </p:cNvPr>
+          <p:cNvSpPr>
+            <a:spLocks noGrp="1"/>
+          </p:cNvSpPr>
+          <p:nvPr>
+            <p:ph type="sldNum" sz="quarter" idx="12"/>
+          </p:nvPr>
+        </p:nvSpPr>
+        <p:spPr/>
+        <p:txBody>
+          <a:bodyPr/>
+          <a:lstStyle/>
+          <a:p>
+            <a:fld id="{E0DC7AD3-7C2E-418B-8082-788996B615FB}" type="slidenum">
+              <a:rPr lang="en-GB" smtClean="0"/>
+              <a:t>43</a:t>
+            </a:fld>
+            <a:endParaRPr lang="en-GB"/>
+          </a:p>
+        </p:txBody>
+      </p:sp>
     </p:spTree>
     <p:extLst>
       <p:ext uri="{BB962C8B-B14F-4D97-AF65-F5344CB8AC3E}">
@@ -22792,7 +24001,7 @@
 </p:sld>
 </file>
 
-<file path=ppt/slides/slide41.xml><?xml version="1.0" encoding="utf-8"?>
+<file path=ppt/slides/slide44.xml><?xml version="1.0" encoding="utf-8"?>
 <p:sld xmlns:a="http://schemas.openxmlformats.org/drawingml/2006/main" xmlns:r="http://schemas.openxmlformats.org/officeDocument/2006/relationships" xmlns:p="http://schemas.openxmlformats.org/presentationml/2006/main">
   <p:cSld>
     <p:spTree>
@@ -22864,6 +24073,35 @@
           </a:prstGeom>
         </p:spPr>
       </p:pic>
+      <p:sp>
+        <p:nvSpPr>
+          <p:cNvPr id="4" name="Slide Number Placeholder 3">
+            <a:extLst>
+              <a:ext uri="{FF2B5EF4-FFF2-40B4-BE49-F238E27FC236}">
+                <a16:creationId xmlns:a16="http://schemas.microsoft.com/office/drawing/2014/main" id="{CDC1E791-539F-AD6A-52D2-283249024DF8}"/>
+              </a:ext>
+            </a:extLst>
+          </p:cNvPr>
+          <p:cNvSpPr>
+            <a:spLocks noGrp="1"/>
+          </p:cNvSpPr>
+          <p:nvPr>
+            <p:ph type="sldNum" sz="quarter" idx="12"/>
+          </p:nvPr>
+        </p:nvSpPr>
+        <p:spPr/>
+        <p:txBody>
+          <a:bodyPr/>
+          <a:lstStyle/>
+          <a:p>
+            <a:fld id="{E0DC7AD3-7C2E-418B-8082-788996B615FB}" type="slidenum">
+              <a:rPr lang="en-GB" smtClean="0"/>
+              <a:t>44</a:t>
+            </a:fld>
+            <a:endParaRPr lang="en-GB"/>
+          </a:p>
+        </p:txBody>
+      </p:sp>
     </p:spTree>
     <p:extLst>
       <p:ext uri="{BB962C8B-B14F-4D97-AF65-F5344CB8AC3E}">
@@ -22877,7 +24115,138 @@
 </p:sld>
 </file>
 
-<file path=ppt/slides/slide42.xml><?xml version="1.0" encoding="utf-8"?>
+<file path=ppt/slides/slide45.xml><?xml version="1.0" encoding="utf-8"?>
+<p:sld xmlns:a="http://schemas.openxmlformats.org/drawingml/2006/main" xmlns:r="http://schemas.openxmlformats.org/officeDocument/2006/relationships" xmlns:p="http://schemas.openxmlformats.org/presentationml/2006/main">
+  <p:cSld>
+    <p:spTree>
+      <p:nvGrpSpPr>
+        <p:cNvPr id="1" name="">
+          <a:extLst>
+            <a:ext uri="{FF2B5EF4-FFF2-40B4-BE49-F238E27FC236}">
+              <a16:creationId xmlns:a16="http://schemas.microsoft.com/office/drawing/2014/main" id="{C0E18DEB-30E7-245E-76FF-9F805218D82B}"/>
+            </a:ext>
+          </a:extLst>
+        </p:cNvPr>
+        <p:cNvGrpSpPr/>
+        <p:nvPr/>
+      </p:nvGrpSpPr>
+      <p:grpSpPr>
+        <a:xfrm>
+          <a:off x="0" y="0"/>
+          <a:ext cx="0" cy="0"/>
+          <a:chOff x="0" y="0"/>
+          <a:chExt cx="0" cy="0"/>
+        </a:xfrm>
+      </p:grpSpPr>
+      <p:sp>
+        <p:nvSpPr>
+          <p:cNvPr id="6" name="Title 5">
+            <a:extLst>
+              <a:ext uri="{FF2B5EF4-FFF2-40B4-BE49-F238E27FC236}">
+                <a16:creationId xmlns:a16="http://schemas.microsoft.com/office/drawing/2014/main" id="{5AE10D42-7507-FD85-2466-FA0E7A63DC93}"/>
+              </a:ext>
+            </a:extLst>
+          </p:cNvPr>
+          <p:cNvSpPr>
+            <a:spLocks noGrp="1"/>
+          </p:cNvSpPr>
+          <p:nvPr>
+            <p:ph type="title"/>
+          </p:nvPr>
+        </p:nvSpPr>
+        <p:spPr/>
+        <p:txBody>
+          <a:bodyPr/>
+          <a:lstStyle/>
+          <a:p>
+            <a:endParaRPr lang="en-IL"/>
+          </a:p>
+        </p:txBody>
+      </p:sp>
+      <p:sp>
+        <p:nvSpPr>
+          <p:cNvPr id="7" name="Text Placeholder 6">
+            <a:extLst>
+              <a:ext uri="{FF2B5EF4-FFF2-40B4-BE49-F238E27FC236}">
+                <a16:creationId xmlns:a16="http://schemas.microsoft.com/office/drawing/2014/main" id="{F57B8F42-53A1-5FF0-A252-8B6FA9388EBC}"/>
+              </a:ext>
+            </a:extLst>
+          </p:cNvPr>
+          <p:cNvSpPr>
+            <a:spLocks noGrp="1"/>
+          </p:cNvSpPr>
+          <p:nvPr>
+            <p:ph type="body" idx="1"/>
+          </p:nvPr>
+        </p:nvSpPr>
+        <p:spPr/>
+        <p:txBody>
+          <a:bodyPr>
+            <a:normAutofit/>
+          </a:bodyPr>
+          <a:lstStyle/>
+          <a:p>
+            <a:pPr algn="ctr"/>
+            <a:r>
+              <a:rPr lang="en-US" sz="7200" dirty="0"/>
+              <a:t>6G Robust Regression</a:t>
+            </a:r>
+            <a:endParaRPr lang="en-IL" sz="7200" dirty="0"/>
+          </a:p>
+        </p:txBody>
+      </p:sp>
+      <p:sp>
+        <p:nvSpPr>
+          <p:cNvPr id="5" name="Slide Number Placeholder 4">
+            <a:extLst>
+              <a:ext uri="{FF2B5EF4-FFF2-40B4-BE49-F238E27FC236}">
+                <a16:creationId xmlns:a16="http://schemas.microsoft.com/office/drawing/2014/main" id="{F0C9554C-C247-1C49-111A-2262574B985F}"/>
+              </a:ext>
+            </a:extLst>
+          </p:cNvPr>
+          <p:cNvSpPr>
+            <a:spLocks noGrp="1"/>
+          </p:cNvSpPr>
+          <p:nvPr>
+            <p:ph type="sldNum" sz="quarter" idx="12"/>
+          </p:nvPr>
+        </p:nvSpPr>
+        <p:spPr/>
+        <p:txBody>
+          <a:bodyPr/>
+          <a:lstStyle/>
+          <a:p>
+            <a:pPr>
+              <a:defRPr/>
+            </a:pPr>
+            <a:fld id="{3469EAC8-EFAD-49DA-A425-6225312A328A}" type="slidenum">
+              <a:rPr lang="he-IL" altLang="en-US" smtClean="0"/>
+              <a:pPr>
+                <a:defRPr/>
+              </a:pPr>
+              <a:t>45</a:t>
+            </a:fld>
+            <a:r>
+              <a:rPr lang="en-US" altLang="en-US"/>
+              <a:t> /  72</a:t>
+            </a:r>
+          </a:p>
+        </p:txBody>
+      </p:sp>
+    </p:spTree>
+    <p:extLst>
+      <p:ext uri="{BB962C8B-B14F-4D97-AF65-F5344CB8AC3E}">
+        <p14:creationId xmlns:p14="http://schemas.microsoft.com/office/powerpoint/2010/main" val="2574380570"/>
+      </p:ext>
+    </p:extLst>
+  </p:cSld>
+  <p:clrMapOvr>
+    <a:masterClrMapping/>
+  </p:clrMapOvr>
+</p:sld>
+</file>
+
+<file path=ppt/slides/slide46.xml><?xml version="1.0" encoding="utf-8"?>
 <p:sld xmlns:a="http://schemas.openxmlformats.org/drawingml/2006/main" xmlns:r="http://schemas.openxmlformats.org/officeDocument/2006/relationships" xmlns:p="http://schemas.openxmlformats.org/presentationml/2006/main">
   <p:cSld>
     <p:spTree>
@@ -22961,6 +24330,35 @@
           </a:prstGeom>
         </p:spPr>
       </p:pic>
+      <p:sp>
+        <p:nvSpPr>
+          <p:cNvPr id="4" name="Slide Number Placeholder 3">
+            <a:extLst>
+              <a:ext uri="{FF2B5EF4-FFF2-40B4-BE49-F238E27FC236}">
+                <a16:creationId xmlns:a16="http://schemas.microsoft.com/office/drawing/2014/main" id="{65D5F5A1-6842-467F-7240-5C78ABC31EAB}"/>
+              </a:ext>
+            </a:extLst>
+          </p:cNvPr>
+          <p:cNvSpPr>
+            <a:spLocks noGrp="1"/>
+          </p:cNvSpPr>
+          <p:nvPr>
+            <p:ph type="sldNum" sz="quarter" idx="12"/>
+          </p:nvPr>
+        </p:nvSpPr>
+        <p:spPr/>
+        <p:txBody>
+          <a:bodyPr/>
+          <a:lstStyle/>
+          <a:p>
+            <a:fld id="{E0DC7AD3-7C2E-418B-8082-788996B615FB}" type="slidenum">
+              <a:rPr lang="en-GB" smtClean="0"/>
+              <a:t>46</a:t>
+            </a:fld>
+            <a:endParaRPr lang="en-GB"/>
+          </a:p>
+        </p:txBody>
+      </p:sp>
     </p:spTree>
     <p:extLst>
       <p:ext uri="{BB962C8B-B14F-4D97-AF65-F5344CB8AC3E}">
@@ -22974,7 +24372,7 @@
 </p:sld>
 </file>
 
-<file path=ppt/slides/slide43.xml><?xml version="1.0" encoding="utf-8"?>
+<file path=ppt/slides/slide47.xml><?xml version="1.0" encoding="utf-8"?>
 <p:sld xmlns:a="http://schemas.openxmlformats.org/drawingml/2006/main" xmlns:r="http://schemas.openxmlformats.org/officeDocument/2006/relationships" xmlns:p="http://schemas.openxmlformats.org/presentationml/2006/main">
   <p:cSld>
     <p:spTree>
@@ -23138,6 +24536,35 @@
           </a:prstGeom>
         </p:spPr>
       </p:pic>
+      <p:sp>
+        <p:nvSpPr>
+          <p:cNvPr id="5" name="Slide Number Placeholder 4">
+            <a:extLst>
+              <a:ext uri="{FF2B5EF4-FFF2-40B4-BE49-F238E27FC236}">
+                <a16:creationId xmlns:a16="http://schemas.microsoft.com/office/drawing/2014/main" id="{946C43D1-38C9-E83D-1F89-526CC377B402}"/>
+              </a:ext>
+            </a:extLst>
+          </p:cNvPr>
+          <p:cNvSpPr>
+            <a:spLocks noGrp="1"/>
+          </p:cNvSpPr>
+          <p:nvPr>
+            <p:ph type="sldNum" sz="quarter" idx="12"/>
+          </p:nvPr>
+        </p:nvSpPr>
+        <p:spPr/>
+        <p:txBody>
+          <a:bodyPr/>
+          <a:lstStyle/>
+          <a:p>
+            <a:fld id="{E0DC7AD3-7C2E-418B-8082-788996B615FB}" type="slidenum">
+              <a:rPr lang="en-GB" smtClean="0"/>
+              <a:t>47</a:t>
+            </a:fld>
+            <a:endParaRPr lang="en-GB"/>
+          </a:p>
+        </p:txBody>
+      </p:sp>
     </p:spTree>
     <p:extLst>
       <p:ext uri="{BB962C8B-B14F-4D97-AF65-F5344CB8AC3E}">
@@ -23151,7 +24578,7 @@
 </p:sld>
 </file>
 
-<file path=ppt/slides/slide44.xml><?xml version="1.0" encoding="utf-8"?>
+<file path=ppt/slides/slide48.xml><?xml version="1.0" encoding="utf-8"?>
 <p:sld xmlns:a="http://schemas.openxmlformats.org/drawingml/2006/main" xmlns:r="http://schemas.openxmlformats.org/officeDocument/2006/relationships" xmlns:p="http://schemas.openxmlformats.org/presentationml/2006/main">
   <p:cSld>
     <p:spTree>
@@ -23294,6 +24721,35 @@
           </a:prstGeom>
         </p:spPr>
       </p:pic>
+      <p:sp>
+        <p:nvSpPr>
+          <p:cNvPr id="5" name="Slide Number Placeholder 4">
+            <a:extLst>
+              <a:ext uri="{FF2B5EF4-FFF2-40B4-BE49-F238E27FC236}">
+                <a16:creationId xmlns:a16="http://schemas.microsoft.com/office/drawing/2014/main" id="{01D588A6-6972-AE77-EDA2-C070D6F95545}"/>
+              </a:ext>
+            </a:extLst>
+          </p:cNvPr>
+          <p:cNvSpPr>
+            <a:spLocks noGrp="1"/>
+          </p:cNvSpPr>
+          <p:nvPr>
+            <p:ph type="sldNum" sz="quarter" idx="12"/>
+          </p:nvPr>
+        </p:nvSpPr>
+        <p:spPr/>
+        <p:txBody>
+          <a:bodyPr/>
+          <a:lstStyle/>
+          <a:p>
+            <a:fld id="{E0DC7AD3-7C2E-418B-8082-788996B615FB}" type="slidenum">
+              <a:rPr lang="en-GB" smtClean="0"/>
+              <a:t>48</a:t>
+            </a:fld>
+            <a:endParaRPr lang="en-GB"/>
+          </a:p>
+        </p:txBody>
+      </p:sp>
     </p:spTree>
     <p:extLst>
       <p:ext uri="{BB962C8B-B14F-4D97-AF65-F5344CB8AC3E}">
@@ -23307,7 +24763,7 @@
 </p:sld>
 </file>
 
-<file path=ppt/slides/slide45.xml><?xml version="1.0" encoding="utf-8"?>
+<file path=ppt/slides/slide49.xml><?xml version="1.0" encoding="utf-8"?>
 <p:sld xmlns:a="http://schemas.openxmlformats.org/drawingml/2006/main" xmlns:r="http://schemas.openxmlformats.org/officeDocument/2006/relationships" xmlns:p="http://schemas.openxmlformats.org/presentationml/2006/main">
   <p:cSld>
     <p:spTree>
@@ -23422,6 +24878,35 @@
           </a:prstGeom>
         </p:spPr>
       </p:pic>
+      <p:sp>
+        <p:nvSpPr>
+          <p:cNvPr id="4" name="Slide Number Placeholder 3">
+            <a:extLst>
+              <a:ext uri="{FF2B5EF4-FFF2-40B4-BE49-F238E27FC236}">
+                <a16:creationId xmlns:a16="http://schemas.microsoft.com/office/drawing/2014/main" id="{77E1F6FD-D3F9-64ED-0991-B30A5894907D}"/>
+              </a:ext>
+            </a:extLst>
+          </p:cNvPr>
+          <p:cNvSpPr>
+            <a:spLocks noGrp="1"/>
+          </p:cNvSpPr>
+          <p:nvPr>
+            <p:ph type="sldNum" sz="quarter" idx="12"/>
+          </p:nvPr>
+        </p:nvSpPr>
+        <p:spPr/>
+        <p:txBody>
+          <a:bodyPr/>
+          <a:lstStyle/>
+          <a:p>
+            <a:fld id="{E0DC7AD3-7C2E-418B-8082-788996B615FB}" type="slidenum">
+              <a:rPr lang="en-GB" smtClean="0"/>
+              <a:t>49</a:t>
+            </a:fld>
+            <a:endParaRPr lang="en-GB"/>
+          </a:p>
+        </p:txBody>
+      </p:sp>
     </p:spTree>
     <p:extLst>
       <p:ext uri="{BB962C8B-B14F-4D97-AF65-F5344CB8AC3E}">
@@ -23435,7 +24920,203 @@
 </p:sld>
 </file>
 
-<file path=ppt/slides/slide46.xml><?xml version="1.0" encoding="utf-8"?>
+<file path=ppt/slides/slide5.xml><?xml version="1.0" encoding="utf-8"?>
+<p:sld xmlns:a="http://schemas.openxmlformats.org/drawingml/2006/main" xmlns:r="http://schemas.openxmlformats.org/officeDocument/2006/relationships" xmlns:p="http://schemas.openxmlformats.org/presentationml/2006/main">
+  <p:cSld>
+    <p:spTree>
+      <p:nvGrpSpPr>
+        <p:cNvPr id="1" name=""/>
+        <p:cNvGrpSpPr/>
+        <p:nvPr/>
+      </p:nvGrpSpPr>
+      <p:grpSpPr>
+        <a:xfrm>
+          <a:off x="0" y="0"/>
+          <a:ext cx="0" cy="0"/>
+          <a:chOff x="0" y="0"/>
+          <a:chExt cx="0" cy="0"/>
+        </a:xfrm>
+      </p:grpSpPr>
+      <p:sp>
+        <p:nvSpPr>
+          <p:cNvPr id="2" name="Title 1">
+            <a:extLst>
+              <a:ext uri="{FF2B5EF4-FFF2-40B4-BE49-F238E27FC236}">
+                <a16:creationId xmlns:a16="http://schemas.microsoft.com/office/drawing/2014/main" id="{53A9FA17-BAFB-559C-D92D-7BD703257A11}"/>
+              </a:ext>
+            </a:extLst>
+          </p:cNvPr>
+          <p:cNvSpPr>
+            <a:spLocks noGrp="1"/>
+          </p:cNvSpPr>
+          <p:nvPr>
+            <p:ph type="title"/>
+          </p:nvPr>
+        </p:nvSpPr>
+        <p:spPr/>
+        <p:txBody>
+          <a:bodyPr/>
+          <a:lstStyle/>
+          <a:p>
+            <a:r>
+              <a:rPr lang="en-US" dirty="0"/>
+              <a:t>Examples of bivariate data</a:t>
+            </a:r>
+            <a:endParaRPr lang="he-IL" dirty="0"/>
+          </a:p>
+        </p:txBody>
+      </p:sp>
+      <p:sp>
+        <p:nvSpPr>
+          <p:cNvPr id="4" name="Text Placeholder 3">
+            <a:extLst>
+              <a:ext uri="{FF2B5EF4-FFF2-40B4-BE49-F238E27FC236}">
+                <a16:creationId xmlns:a16="http://schemas.microsoft.com/office/drawing/2014/main" id="{BAFD69F2-30BB-3821-BDC6-C0BDF675AE54}"/>
+              </a:ext>
+            </a:extLst>
+          </p:cNvPr>
+          <p:cNvSpPr>
+            <a:spLocks noGrp="1"/>
+          </p:cNvSpPr>
+          <p:nvPr>
+            <p:ph type="body" idx="1"/>
+          </p:nvPr>
+        </p:nvSpPr>
+        <p:spPr/>
+        <p:txBody>
+          <a:bodyPr/>
+          <a:lstStyle/>
+          <a:p>
+            <a:r>
+              <a:rPr lang="en-US" dirty="0"/>
+              <a:t>May be linearly related</a:t>
+            </a:r>
+            <a:endParaRPr lang="he-IL" dirty="0"/>
+          </a:p>
+        </p:txBody>
+      </p:sp>
+      <p:sp>
+        <p:nvSpPr>
+          <p:cNvPr id="5" name="Content Placeholder 4">
+            <a:extLst>
+              <a:ext uri="{FF2B5EF4-FFF2-40B4-BE49-F238E27FC236}">
+                <a16:creationId xmlns:a16="http://schemas.microsoft.com/office/drawing/2014/main" id="{9992A0CF-6B82-31CF-A99E-4E5BD1A873ED}"/>
+              </a:ext>
+            </a:extLst>
+          </p:cNvPr>
+          <p:cNvSpPr>
+            <a:spLocks noGrp="1"/>
+          </p:cNvSpPr>
+          <p:nvPr>
+            <p:ph sz="half" idx="2"/>
+          </p:nvPr>
+        </p:nvSpPr>
+        <p:spPr/>
+        <p:txBody>
+          <a:bodyPr/>
+          <a:lstStyle/>
+          <a:p>
+            <a:endParaRPr lang="he-IL"/>
+          </a:p>
+        </p:txBody>
+      </p:sp>
+      <p:sp>
+        <p:nvSpPr>
+          <p:cNvPr id="6" name="Text Placeholder 5">
+            <a:extLst>
+              <a:ext uri="{FF2B5EF4-FFF2-40B4-BE49-F238E27FC236}">
+                <a16:creationId xmlns:a16="http://schemas.microsoft.com/office/drawing/2014/main" id="{754A56D3-24C1-D044-A411-E1FD14A74270}"/>
+              </a:ext>
+            </a:extLst>
+          </p:cNvPr>
+          <p:cNvSpPr>
+            <a:spLocks noGrp="1"/>
+          </p:cNvSpPr>
+          <p:nvPr>
+            <p:ph type="body" sz="quarter" idx="3"/>
+          </p:nvPr>
+        </p:nvSpPr>
+        <p:spPr/>
+        <p:txBody>
+          <a:bodyPr/>
+          <a:lstStyle/>
+          <a:p>
+            <a:r>
+              <a:rPr lang="en-US" dirty="0"/>
+              <a:t>Probably not linearly related</a:t>
+            </a:r>
+            <a:endParaRPr lang="he-IL" dirty="0"/>
+          </a:p>
+        </p:txBody>
+      </p:sp>
+      <p:sp>
+        <p:nvSpPr>
+          <p:cNvPr id="7" name="Content Placeholder 6">
+            <a:extLst>
+              <a:ext uri="{FF2B5EF4-FFF2-40B4-BE49-F238E27FC236}">
+                <a16:creationId xmlns:a16="http://schemas.microsoft.com/office/drawing/2014/main" id="{CB96A1CF-2B8A-7D99-B2AE-C57AA5A0A929}"/>
+              </a:ext>
+            </a:extLst>
+          </p:cNvPr>
+          <p:cNvSpPr>
+            <a:spLocks noGrp="1"/>
+          </p:cNvSpPr>
+          <p:nvPr>
+            <p:ph sz="quarter" idx="4"/>
+          </p:nvPr>
+        </p:nvSpPr>
+        <p:spPr/>
+        <p:txBody>
+          <a:bodyPr/>
+          <a:lstStyle/>
+          <a:p>
+            <a:endParaRPr lang="he-IL"/>
+          </a:p>
+        </p:txBody>
+      </p:sp>
+      <p:sp>
+        <p:nvSpPr>
+          <p:cNvPr id="3" name="Slide Number Placeholder 2">
+            <a:extLst>
+              <a:ext uri="{FF2B5EF4-FFF2-40B4-BE49-F238E27FC236}">
+                <a16:creationId xmlns:a16="http://schemas.microsoft.com/office/drawing/2014/main" id="{FC3FC173-D3E0-152A-9649-94CC386DFB4C}"/>
+              </a:ext>
+            </a:extLst>
+          </p:cNvPr>
+          <p:cNvSpPr>
+            <a:spLocks noGrp="1"/>
+          </p:cNvSpPr>
+          <p:nvPr>
+            <p:ph type="sldNum" sz="quarter" idx="12"/>
+          </p:nvPr>
+        </p:nvSpPr>
+        <p:spPr/>
+        <p:txBody>
+          <a:bodyPr/>
+          <a:lstStyle/>
+          <a:p>
+            <a:fld id="{E0DC7AD3-7C2E-418B-8082-788996B615FB}" type="slidenum">
+              <a:rPr lang="en-GB" smtClean="0"/>
+              <a:t>5</a:t>
+            </a:fld>
+            <a:endParaRPr lang="en-GB"/>
+          </a:p>
+        </p:txBody>
+      </p:sp>
+    </p:spTree>
+    <p:extLst>
+      <p:ext uri="{BB962C8B-B14F-4D97-AF65-F5344CB8AC3E}">
+        <p14:creationId xmlns:p14="http://schemas.microsoft.com/office/powerpoint/2010/main" val="519613525"/>
+      </p:ext>
+    </p:extLst>
+  </p:cSld>
+  <p:clrMapOvr>
+    <a:masterClrMapping/>
+  </p:clrMapOvr>
+</p:sld>
+</file>
+
+<file path=ppt/slides/slide50.xml><?xml version="1.0" encoding="utf-8"?>
 <p:sld xmlns:a="http://schemas.openxmlformats.org/drawingml/2006/main" xmlns:r="http://schemas.openxmlformats.org/officeDocument/2006/relationships" xmlns:p="http://schemas.openxmlformats.org/presentationml/2006/main">
   <p:cSld>
     <p:spTree>
@@ -23553,6 +25234,35 @@
           </a:prstGeom>
         </p:spPr>
       </p:pic>
+      <p:sp>
+        <p:nvSpPr>
+          <p:cNvPr id="3" name="Slide Number Placeholder 2">
+            <a:extLst>
+              <a:ext uri="{FF2B5EF4-FFF2-40B4-BE49-F238E27FC236}">
+                <a16:creationId xmlns:a16="http://schemas.microsoft.com/office/drawing/2014/main" id="{F54B3204-40E4-0BD6-B397-40A024196CFB}"/>
+              </a:ext>
+            </a:extLst>
+          </p:cNvPr>
+          <p:cNvSpPr>
+            <a:spLocks noGrp="1"/>
+          </p:cNvSpPr>
+          <p:nvPr>
+            <p:ph type="sldNum" sz="quarter" idx="12"/>
+          </p:nvPr>
+        </p:nvSpPr>
+        <p:spPr/>
+        <p:txBody>
+          <a:bodyPr/>
+          <a:lstStyle/>
+          <a:p>
+            <a:fld id="{E0DC7AD3-7C2E-418B-8082-788996B615FB}" type="slidenum">
+              <a:rPr lang="en-GB" smtClean="0"/>
+              <a:t>50</a:t>
+            </a:fld>
+            <a:endParaRPr lang="en-GB"/>
+          </a:p>
+        </p:txBody>
+      </p:sp>
     </p:spTree>
     <p:extLst>
       <p:ext uri="{BB962C8B-B14F-4D97-AF65-F5344CB8AC3E}">
@@ -23641,7 +25351,7 @@
 </p:sld>
 </file>
 
-<file path=ppt/slides/slide47.xml><?xml version="1.0" encoding="utf-8"?>
+<file path=ppt/slides/slide51.xml><?xml version="1.0" encoding="utf-8"?>
 <p:sld xmlns:a="http://schemas.openxmlformats.org/drawingml/2006/main" xmlns:r="http://schemas.openxmlformats.org/officeDocument/2006/relationships" xmlns:p="http://schemas.openxmlformats.org/presentationml/2006/main">
   <p:cSld>
     <p:spTree>
@@ -23781,6 +25491,35 @@
           </a:prstGeom>
         </p:spPr>
       </p:pic>
+      <p:sp>
+        <p:nvSpPr>
+          <p:cNvPr id="6" name="Slide Number Placeholder 5">
+            <a:extLst>
+              <a:ext uri="{FF2B5EF4-FFF2-40B4-BE49-F238E27FC236}">
+                <a16:creationId xmlns:a16="http://schemas.microsoft.com/office/drawing/2014/main" id="{558105D4-CA6A-8AFA-4B34-9B7B250DCB3D}"/>
+              </a:ext>
+            </a:extLst>
+          </p:cNvPr>
+          <p:cNvSpPr>
+            <a:spLocks noGrp="1"/>
+          </p:cNvSpPr>
+          <p:nvPr>
+            <p:ph type="sldNum" sz="quarter" idx="12"/>
+          </p:nvPr>
+        </p:nvSpPr>
+        <p:spPr/>
+        <p:txBody>
+          <a:bodyPr/>
+          <a:lstStyle/>
+          <a:p>
+            <a:fld id="{E0DC7AD3-7C2E-418B-8082-788996B615FB}" type="slidenum">
+              <a:rPr lang="en-GB" smtClean="0"/>
+              <a:t>51</a:t>
+            </a:fld>
+            <a:endParaRPr lang="en-GB"/>
+          </a:p>
+        </p:txBody>
+      </p:sp>
     </p:spTree>
     <p:extLst>
       <p:ext uri="{BB962C8B-B14F-4D97-AF65-F5344CB8AC3E}">
@@ -23794,7 +25533,7 @@
 </p:sld>
 </file>
 
-<file path=ppt/slides/slide48.xml><?xml version="1.0" encoding="utf-8"?>
+<file path=ppt/slides/slide52.xml><?xml version="1.0" encoding="utf-8"?>
 <p:sld xmlns:a="http://schemas.openxmlformats.org/drawingml/2006/main" xmlns:r="http://schemas.openxmlformats.org/officeDocument/2006/relationships" xmlns:p="http://schemas.openxmlformats.org/presentationml/2006/main">
   <p:cSld>
     <p:spTree>
@@ -23916,6 +25655,35 @@
           </a:prstGeom>
         </p:spPr>
       </p:pic>
+      <p:sp>
+        <p:nvSpPr>
+          <p:cNvPr id="3" name="Slide Number Placeholder 2">
+            <a:extLst>
+              <a:ext uri="{FF2B5EF4-FFF2-40B4-BE49-F238E27FC236}">
+                <a16:creationId xmlns:a16="http://schemas.microsoft.com/office/drawing/2014/main" id="{B4665D15-ADA0-8103-C842-619159B2DDBA}"/>
+              </a:ext>
+            </a:extLst>
+          </p:cNvPr>
+          <p:cNvSpPr>
+            <a:spLocks noGrp="1"/>
+          </p:cNvSpPr>
+          <p:nvPr>
+            <p:ph type="sldNum" sz="quarter" idx="12"/>
+          </p:nvPr>
+        </p:nvSpPr>
+        <p:spPr/>
+        <p:txBody>
+          <a:bodyPr/>
+          <a:lstStyle/>
+          <a:p>
+            <a:fld id="{E0DC7AD3-7C2E-418B-8082-788996B615FB}" type="slidenum">
+              <a:rPr lang="en-GB" smtClean="0"/>
+              <a:t>52</a:t>
+            </a:fld>
+            <a:endParaRPr lang="en-GB"/>
+          </a:p>
+        </p:txBody>
+      </p:sp>
     </p:spTree>
     <p:extLst>
       <p:ext uri="{BB962C8B-B14F-4D97-AF65-F5344CB8AC3E}">
@@ -23929,7 +25697,138 @@
 </p:sld>
 </file>
 
-<file path=ppt/slides/slide49.xml><?xml version="1.0" encoding="utf-8"?>
+<file path=ppt/slides/slide53.xml><?xml version="1.0" encoding="utf-8"?>
+<p:sld xmlns:a="http://schemas.openxmlformats.org/drawingml/2006/main" xmlns:r="http://schemas.openxmlformats.org/officeDocument/2006/relationships" xmlns:p="http://schemas.openxmlformats.org/presentationml/2006/main">
+  <p:cSld>
+    <p:spTree>
+      <p:nvGrpSpPr>
+        <p:cNvPr id="1" name="">
+          <a:extLst>
+            <a:ext uri="{FF2B5EF4-FFF2-40B4-BE49-F238E27FC236}">
+              <a16:creationId xmlns:a16="http://schemas.microsoft.com/office/drawing/2014/main" id="{7080BD1F-03D5-E47A-3281-A100C64EDC55}"/>
+            </a:ext>
+          </a:extLst>
+        </p:cNvPr>
+        <p:cNvGrpSpPr/>
+        <p:nvPr/>
+      </p:nvGrpSpPr>
+      <p:grpSpPr>
+        <a:xfrm>
+          <a:off x="0" y="0"/>
+          <a:ext cx="0" cy="0"/>
+          <a:chOff x="0" y="0"/>
+          <a:chExt cx="0" cy="0"/>
+        </a:xfrm>
+      </p:grpSpPr>
+      <p:sp>
+        <p:nvSpPr>
+          <p:cNvPr id="6" name="Title 5">
+            <a:extLst>
+              <a:ext uri="{FF2B5EF4-FFF2-40B4-BE49-F238E27FC236}">
+                <a16:creationId xmlns:a16="http://schemas.microsoft.com/office/drawing/2014/main" id="{9EE4F93A-17A8-7402-25E0-CC308A004A06}"/>
+              </a:ext>
+            </a:extLst>
+          </p:cNvPr>
+          <p:cNvSpPr>
+            <a:spLocks noGrp="1"/>
+          </p:cNvSpPr>
+          <p:nvPr>
+            <p:ph type="title"/>
+          </p:nvPr>
+        </p:nvSpPr>
+        <p:spPr/>
+        <p:txBody>
+          <a:bodyPr/>
+          <a:lstStyle/>
+          <a:p>
+            <a:endParaRPr lang="en-IL"/>
+          </a:p>
+        </p:txBody>
+      </p:sp>
+      <p:sp>
+        <p:nvSpPr>
+          <p:cNvPr id="7" name="Text Placeholder 6">
+            <a:extLst>
+              <a:ext uri="{FF2B5EF4-FFF2-40B4-BE49-F238E27FC236}">
+                <a16:creationId xmlns:a16="http://schemas.microsoft.com/office/drawing/2014/main" id="{088F5F15-DBC4-6943-4BF6-C86BBEAD87C4}"/>
+              </a:ext>
+            </a:extLst>
+          </p:cNvPr>
+          <p:cNvSpPr>
+            <a:spLocks noGrp="1"/>
+          </p:cNvSpPr>
+          <p:nvPr>
+            <p:ph type="body" idx="1"/>
+          </p:nvPr>
+        </p:nvSpPr>
+        <p:spPr/>
+        <p:txBody>
+          <a:bodyPr>
+            <a:normAutofit/>
+          </a:bodyPr>
+          <a:lstStyle/>
+          <a:p>
+            <a:pPr algn="ctr"/>
+            <a:r>
+              <a:rPr lang="en-US" sz="7200" dirty="0"/>
+              <a:t>6H Bivariate data</a:t>
+            </a:r>
+            <a:endParaRPr lang="en-IL" sz="7200" dirty="0"/>
+          </a:p>
+        </p:txBody>
+      </p:sp>
+      <p:sp>
+        <p:nvSpPr>
+          <p:cNvPr id="5" name="Slide Number Placeholder 4">
+            <a:extLst>
+              <a:ext uri="{FF2B5EF4-FFF2-40B4-BE49-F238E27FC236}">
+                <a16:creationId xmlns:a16="http://schemas.microsoft.com/office/drawing/2014/main" id="{331AF99F-5A42-64F8-CDE6-CDEEE9EF5F22}"/>
+              </a:ext>
+            </a:extLst>
+          </p:cNvPr>
+          <p:cNvSpPr>
+            <a:spLocks noGrp="1"/>
+          </p:cNvSpPr>
+          <p:nvPr>
+            <p:ph type="sldNum" sz="quarter" idx="12"/>
+          </p:nvPr>
+        </p:nvSpPr>
+        <p:spPr/>
+        <p:txBody>
+          <a:bodyPr/>
+          <a:lstStyle/>
+          <a:p>
+            <a:pPr>
+              <a:defRPr/>
+            </a:pPr>
+            <a:fld id="{3469EAC8-EFAD-49DA-A425-6225312A328A}" type="slidenum">
+              <a:rPr lang="he-IL" altLang="en-US" smtClean="0"/>
+              <a:pPr>
+                <a:defRPr/>
+              </a:pPr>
+              <a:t>53</a:t>
+            </a:fld>
+            <a:r>
+              <a:rPr lang="en-US" altLang="en-US"/>
+              <a:t> /  72</a:t>
+            </a:r>
+          </a:p>
+        </p:txBody>
+      </p:sp>
+    </p:spTree>
+    <p:extLst>
+      <p:ext uri="{BB962C8B-B14F-4D97-AF65-F5344CB8AC3E}">
+        <p14:creationId xmlns:p14="http://schemas.microsoft.com/office/powerpoint/2010/main" val="205639499"/>
+      </p:ext>
+    </p:extLst>
+  </p:cSld>
+  <p:clrMapOvr>
+    <a:masterClrMapping/>
+  </p:clrMapOvr>
+</p:sld>
+</file>
+
+<file path=ppt/slides/slide54.xml><?xml version="1.0" encoding="utf-8"?>
 <p:sld xmlns:a="http://schemas.openxmlformats.org/drawingml/2006/main" xmlns:r="http://schemas.openxmlformats.org/officeDocument/2006/relationships" xmlns:p="http://schemas.openxmlformats.org/presentationml/2006/main">
   <p:cSld>
     <p:spTree>
@@ -24066,6 +25965,35 @@
           </a:p>
         </p:txBody>
       </p:sp>
+      <p:sp>
+        <p:nvSpPr>
+          <p:cNvPr id="4" name="Slide Number Placeholder 3">
+            <a:extLst>
+              <a:ext uri="{FF2B5EF4-FFF2-40B4-BE49-F238E27FC236}">
+                <a16:creationId xmlns:a16="http://schemas.microsoft.com/office/drawing/2014/main" id="{706072E3-A9A7-74BD-383F-64817E4E2C7C}"/>
+              </a:ext>
+            </a:extLst>
+          </p:cNvPr>
+          <p:cNvSpPr>
+            <a:spLocks noGrp="1"/>
+          </p:cNvSpPr>
+          <p:nvPr>
+            <p:ph type="sldNum" sz="quarter" idx="12"/>
+          </p:nvPr>
+        </p:nvSpPr>
+        <p:spPr/>
+        <p:txBody>
+          <a:bodyPr/>
+          <a:lstStyle/>
+          <a:p>
+            <a:fld id="{E0DC7AD3-7C2E-418B-8082-788996B615FB}" type="slidenum">
+              <a:rPr lang="en-GB" smtClean="0"/>
+              <a:t>54</a:t>
+            </a:fld>
+            <a:endParaRPr lang="en-GB"/>
+          </a:p>
+        </p:txBody>
+      </p:sp>
     </p:spTree>
     <p:extLst>
       <p:ext uri="{BB962C8B-B14F-4D97-AF65-F5344CB8AC3E}">
@@ -24079,174 +26007,7 @@
 </p:sld>
 </file>
 
-<file path=ppt/slides/slide5.xml><?xml version="1.0" encoding="utf-8"?>
-<p:sld xmlns:a="http://schemas.openxmlformats.org/drawingml/2006/main" xmlns:r="http://schemas.openxmlformats.org/officeDocument/2006/relationships" xmlns:p="http://schemas.openxmlformats.org/presentationml/2006/main">
-  <p:cSld>
-    <p:spTree>
-      <p:nvGrpSpPr>
-        <p:cNvPr id="1" name=""/>
-        <p:cNvGrpSpPr/>
-        <p:nvPr/>
-      </p:nvGrpSpPr>
-      <p:grpSpPr>
-        <a:xfrm>
-          <a:off x="0" y="0"/>
-          <a:ext cx="0" cy="0"/>
-          <a:chOff x="0" y="0"/>
-          <a:chExt cx="0" cy="0"/>
-        </a:xfrm>
-      </p:grpSpPr>
-      <p:sp>
-        <p:nvSpPr>
-          <p:cNvPr id="2" name="Title 1">
-            <a:extLst>
-              <a:ext uri="{FF2B5EF4-FFF2-40B4-BE49-F238E27FC236}">
-                <a16:creationId xmlns:a16="http://schemas.microsoft.com/office/drawing/2014/main" id="{53A9FA17-BAFB-559C-D92D-7BD703257A11}"/>
-              </a:ext>
-            </a:extLst>
-          </p:cNvPr>
-          <p:cNvSpPr>
-            <a:spLocks noGrp="1"/>
-          </p:cNvSpPr>
-          <p:nvPr>
-            <p:ph type="title"/>
-          </p:nvPr>
-        </p:nvSpPr>
-        <p:spPr/>
-        <p:txBody>
-          <a:bodyPr/>
-          <a:lstStyle/>
-          <a:p>
-            <a:r>
-              <a:rPr lang="en-US" dirty="0"/>
-              <a:t>Examples of bivariate data</a:t>
-            </a:r>
-            <a:endParaRPr lang="he-IL" dirty="0"/>
-          </a:p>
-        </p:txBody>
-      </p:sp>
-      <p:sp>
-        <p:nvSpPr>
-          <p:cNvPr id="4" name="Text Placeholder 3">
-            <a:extLst>
-              <a:ext uri="{FF2B5EF4-FFF2-40B4-BE49-F238E27FC236}">
-                <a16:creationId xmlns:a16="http://schemas.microsoft.com/office/drawing/2014/main" id="{BAFD69F2-30BB-3821-BDC6-C0BDF675AE54}"/>
-              </a:ext>
-            </a:extLst>
-          </p:cNvPr>
-          <p:cNvSpPr>
-            <a:spLocks noGrp="1"/>
-          </p:cNvSpPr>
-          <p:nvPr>
-            <p:ph type="body" idx="1"/>
-          </p:nvPr>
-        </p:nvSpPr>
-        <p:spPr/>
-        <p:txBody>
-          <a:bodyPr/>
-          <a:lstStyle/>
-          <a:p>
-            <a:r>
-              <a:rPr lang="en-US" dirty="0"/>
-              <a:t>May be linearly related</a:t>
-            </a:r>
-            <a:endParaRPr lang="he-IL" dirty="0"/>
-          </a:p>
-        </p:txBody>
-      </p:sp>
-      <p:sp>
-        <p:nvSpPr>
-          <p:cNvPr id="5" name="Content Placeholder 4">
-            <a:extLst>
-              <a:ext uri="{FF2B5EF4-FFF2-40B4-BE49-F238E27FC236}">
-                <a16:creationId xmlns:a16="http://schemas.microsoft.com/office/drawing/2014/main" id="{9992A0CF-6B82-31CF-A99E-4E5BD1A873ED}"/>
-              </a:ext>
-            </a:extLst>
-          </p:cNvPr>
-          <p:cNvSpPr>
-            <a:spLocks noGrp="1"/>
-          </p:cNvSpPr>
-          <p:nvPr>
-            <p:ph sz="half" idx="2"/>
-          </p:nvPr>
-        </p:nvSpPr>
-        <p:spPr/>
-        <p:txBody>
-          <a:bodyPr/>
-          <a:lstStyle/>
-          <a:p>
-            <a:endParaRPr lang="he-IL"/>
-          </a:p>
-        </p:txBody>
-      </p:sp>
-      <p:sp>
-        <p:nvSpPr>
-          <p:cNvPr id="6" name="Text Placeholder 5">
-            <a:extLst>
-              <a:ext uri="{FF2B5EF4-FFF2-40B4-BE49-F238E27FC236}">
-                <a16:creationId xmlns:a16="http://schemas.microsoft.com/office/drawing/2014/main" id="{754A56D3-24C1-D044-A411-E1FD14A74270}"/>
-              </a:ext>
-            </a:extLst>
-          </p:cNvPr>
-          <p:cNvSpPr>
-            <a:spLocks noGrp="1"/>
-          </p:cNvSpPr>
-          <p:nvPr>
-            <p:ph type="body" sz="quarter" idx="3"/>
-          </p:nvPr>
-        </p:nvSpPr>
-        <p:spPr/>
-        <p:txBody>
-          <a:bodyPr/>
-          <a:lstStyle/>
-          <a:p>
-            <a:r>
-              <a:rPr lang="en-US" dirty="0"/>
-              <a:t>Probably not linearly related</a:t>
-            </a:r>
-            <a:endParaRPr lang="he-IL" dirty="0"/>
-          </a:p>
-        </p:txBody>
-      </p:sp>
-      <p:sp>
-        <p:nvSpPr>
-          <p:cNvPr id="7" name="Content Placeholder 6">
-            <a:extLst>
-              <a:ext uri="{FF2B5EF4-FFF2-40B4-BE49-F238E27FC236}">
-                <a16:creationId xmlns:a16="http://schemas.microsoft.com/office/drawing/2014/main" id="{CB96A1CF-2B8A-7D99-B2AE-C57AA5A0A929}"/>
-              </a:ext>
-            </a:extLst>
-          </p:cNvPr>
-          <p:cNvSpPr>
-            <a:spLocks noGrp="1"/>
-          </p:cNvSpPr>
-          <p:nvPr>
-            <p:ph sz="quarter" idx="4"/>
-          </p:nvPr>
-        </p:nvSpPr>
-        <p:spPr/>
-        <p:txBody>
-          <a:bodyPr/>
-          <a:lstStyle/>
-          <a:p>
-            <a:endParaRPr lang="he-IL"/>
-          </a:p>
-        </p:txBody>
-      </p:sp>
-    </p:spTree>
-    <p:extLst>
-      <p:ext uri="{BB962C8B-B14F-4D97-AF65-F5344CB8AC3E}">
-        <p14:creationId xmlns:p14="http://schemas.microsoft.com/office/powerpoint/2010/main" val="519613525"/>
-      </p:ext>
-    </p:extLst>
-  </p:cSld>
-  <p:clrMapOvr>
-    <a:masterClrMapping/>
-  </p:clrMapOvr>
-</p:sld>
-</file>
-
-<file path=ppt/slides/slide50.xml><?xml version="1.0" encoding="utf-8"?>
+<file path=ppt/slides/slide55.xml><?xml version="1.0" encoding="utf-8"?>
 <p:sld xmlns:a="http://schemas.openxmlformats.org/drawingml/2006/main" xmlns:r="http://schemas.openxmlformats.org/officeDocument/2006/relationships" xmlns:p="http://schemas.openxmlformats.org/presentationml/2006/main">
   <p:cSld>
     <p:spTree>
@@ -24368,6 +26129,35 @@
           </a:prstGeom>
         </p:spPr>
       </p:pic>
+      <p:sp>
+        <p:nvSpPr>
+          <p:cNvPr id="5" name="Slide Number Placeholder 4">
+            <a:extLst>
+              <a:ext uri="{FF2B5EF4-FFF2-40B4-BE49-F238E27FC236}">
+                <a16:creationId xmlns:a16="http://schemas.microsoft.com/office/drawing/2014/main" id="{84A7AE58-0F14-3B5E-C1FD-52419353A084}"/>
+              </a:ext>
+            </a:extLst>
+          </p:cNvPr>
+          <p:cNvSpPr>
+            <a:spLocks noGrp="1"/>
+          </p:cNvSpPr>
+          <p:nvPr>
+            <p:ph type="sldNum" sz="quarter" idx="12"/>
+          </p:nvPr>
+        </p:nvSpPr>
+        <p:spPr/>
+        <p:txBody>
+          <a:bodyPr/>
+          <a:lstStyle/>
+          <a:p>
+            <a:fld id="{E0DC7AD3-7C2E-418B-8082-788996B615FB}" type="slidenum">
+              <a:rPr lang="en-GB" smtClean="0"/>
+              <a:t>55</a:t>
+            </a:fld>
+            <a:endParaRPr lang="en-GB"/>
+          </a:p>
+        </p:txBody>
+      </p:sp>
     </p:spTree>
     <p:extLst>
       <p:ext uri="{BB962C8B-B14F-4D97-AF65-F5344CB8AC3E}">
@@ -24381,7 +26171,7 @@
 </p:sld>
 </file>
 
-<file path=ppt/slides/slide51.xml><?xml version="1.0" encoding="utf-8"?>
+<file path=ppt/slides/slide56.xml><?xml version="1.0" encoding="utf-8"?>
 <p:sld xmlns:a="http://schemas.openxmlformats.org/drawingml/2006/main" xmlns:r="http://schemas.openxmlformats.org/officeDocument/2006/relationships" xmlns:p="http://schemas.openxmlformats.org/presentationml/2006/main">
   <p:cSld>
     <p:spTree>
@@ -24498,6 +26288,35 @@
           </a:prstGeom>
         </p:spPr>
       </p:pic>
+      <p:sp>
+        <p:nvSpPr>
+          <p:cNvPr id="3" name="Slide Number Placeholder 2">
+            <a:extLst>
+              <a:ext uri="{FF2B5EF4-FFF2-40B4-BE49-F238E27FC236}">
+                <a16:creationId xmlns:a16="http://schemas.microsoft.com/office/drawing/2014/main" id="{AD5A88E5-220B-4B76-E9CF-B04B1BA78741}"/>
+              </a:ext>
+            </a:extLst>
+          </p:cNvPr>
+          <p:cNvSpPr>
+            <a:spLocks noGrp="1"/>
+          </p:cNvSpPr>
+          <p:nvPr>
+            <p:ph type="sldNum" sz="quarter" idx="12"/>
+          </p:nvPr>
+        </p:nvSpPr>
+        <p:spPr/>
+        <p:txBody>
+          <a:bodyPr/>
+          <a:lstStyle/>
+          <a:p>
+            <a:fld id="{E0DC7AD3-7C2E-418B-8082-788996B615FB}" type="slidenum">
+              <a:rPr lang="en-GB" smtClean="0"/>
+              <a:t>56</a:t>
+            </a:fld>
+            <a:endParaRPr lang="en-GB"/>
+          </a:p>
+        </p:txBody>
+      </p:sp>
     </p:spTree>
     <p:extLst>
       <p:ext uri="{BB962C8B-B14F-4D97-AF65-F5344CB8AC3E}">
@@ -24511,7 +26330,7 @@
 </p:sld>
 </file>
 
-<file path=ppt/slides/slide52.xml><?xml version="1.0" encoding="utf-8"?>
+<file path=ppt/slides/slide57.xml><?xml version="1.0" encoding="utf-8"?>
 <p:sld xmlns:a="http://schemas.openxmlformats.org/drawingml/2006/main" xmlns:r="http://schemas.openxmlformats.org/officeDocument/2006/relationships" xmlns:p="http://schemas.openxmlformats.org/presentationml/2006/main">
   <p:cSld>
     <p:spTree>
@@ -26891,6 +28710,35 @@
           <a:p>
             <a:pPr algn="ctr"/>
             <a:endParaRPr lang="en-IL"/>
+          </a:p>
+        </p:txBody>
+      </p:sp>
+      <p:sp>
+        <p:nvSpPr>
+          <p:cNvPr id="3" name="Slide Number Placeholder 2">
+            <a:extLst>
+              <a:ext uri="{FF2B5EF4-FFF2-40B4-BE49-F238E27FC236}">
+                <a16:creationId xmlns:a16="http://schemas.microsoft.com/office/drawing/2014/main" id="{766AD331-5749-52FF-B775-3F8827F162F8}"/>
+              </a:ext>
+            </a:extLst>
+          </p:cNvPr>
+          <p:cNvSpPr>
+            <a:spLocks noGrp="1"/>
+          </p:cNvSpPr>
+          <p:nvPr>
+            <p:ph type="sldNum" sz="quarter" idx="12"/>
+          </p:nvPr>
+        </p:nvSpPr>
+        <p:spPr/>
+        <p:txBody>
+          <a:bodyPr/>
+          <a:lstStyle/>
+          <a:p>
+            <a:fld id="{E0DC7AD3-7C2E-418B-8082-788996B615FB}" type="slidenum">
+              <a:rPr lang="en-GB" smtClean="0"/>
+              <a:t>57</a:t>
+            </a:fld>
+            <a:endParaRPr lang="en-GB"/>
           </a:p>
         </p:txBody>
       </p:sp>
@@ -27221,7 +29069,7 @@
 </p:sld>
 </file>
 
-<file path=ppt/slides/slide53.xml><?xml version="1.0" encoding="utf-8"?>
+<file path=ppt/slides/slide58.xml><?xml version="1.0" encoding="utf-8"?>
 <p:sld xmlns:a="http://schemas.openxmlformats.org/drawingml/2006/main" xmlns:r="http://schemas.openxmlformats.org/officeDocument/2006/relationships" xmlns:p="http://schemas.openxmlformats.org/presentationml/2006/main">
   <p:cSld>
     <p:spTree>
@@ -28450,6 +30298,35 @@
           </a:p>
         </p:txBody>
       </p:sp>
+      <p:sp>
+        <p:nvSpPr>
+          <p:cNvPr id="4" name="Slide Number Placeholder 3">
+            <a:extLst>
+              <a:ext uri="{FF2B5EF4-FFF2-40B4-BE49-F238E27FC236}">
+                <a16:creationId xmlns:a16="http://schemas.microsoft.com/office/drawing/2014/main" id="{08CF8BEA-7645-473E-F432-35592D2B3D2F}"/>
+              </a:ext>
+            </a:extLst>
+          </p:cNvPr>
+          <p:cNvSpPr>
+            <a:spLocks noGrp="1"/>
+          </p:cNvSpPr>
+          <p:nvPr>
+            <p:ph type="sldNum" sz="quarter" idx="12"/>
+          </p:nvPr>
+        </p:nvSpPr>
+        <p:spPr/>
+        <p:txBody>
+          <a:bodyPr/>
+          <a:lstStyle/>
+          <a:p>
+            <a:fld id="{E0DC7AD3-7C2E-418B-8082-788996B615FB}" type="slidenum">
+              <a:rPr lang="en-GB" smtClean="0"/>
+              <a:t>58</a:t>
+            </a:fld>
+            <a:endParaRPr lang="en-GB"/>
+          </a:p>
+        </p:txBody>
+      </p:sp>
     </p:spTree>
     <p:extLst>
       <p:ext uri="{BB962C8B-B14F-4D97-AF65-F5344CB8AC3E}">
@@ -28463,7 +30340,7 @@
 </p:sld>
 </file>
 
-<file path=ppt/slides/slide54.xml><?xml version="1.0" encoding="utf-8"?>
+<file path=ppt/slides/slide59.xml><?xml version="1.0" encoding="utf-8"?>
 <p:sld xmlns:a="http://schemas.openxmlformats.org/drawingml/2006/main" xmlns:r="http://schemas.openxmlformats.org/officeDocument/2006/relationships" xmlns:p="http://schemas.openxmlformats.org/presentationml/2006/main">
   <p:cSld>
     <p:spTree>
@@ -29110,48 +30987,12 @@
           </a:prstGeom>
         </p:spPr>
       </p:pic>
-    </p:spTree>
-    <p:extLst>
-      <p:ext uri="{BB962C8B-B14F-4D97-AF65-F5344CB8AC3E}">
-        <p14:creationId xmlns:p14="http://schemas.microsoft.com/office/powerpoint/2010/main" val="329621768"/>
-      </p:ext>
-    </p:extLst>
-  </p:cSld>
-  <p:clrMapOvr>
-    <a:masterClrMapping/>
-  </p:clrMapOvr>
-</p:sld>
-</file>
-
-<file path=ppt/slides/slide55.xml><?xml version="1.0" encoding="utf-8"?>
-<p:sld xmlns:a="http://schemas.openxmlformats.org/drawingml/2006/main" xmlns:r="http://schemas.openxmlformats.org/officeDocument/2006/relationships" xmlns:p="http://schemas.openxmlformats.org/presentationml/2006/main">
-  <p:cSld>
-    <p:spTree>
-      <p:nvGrpSpPr>
-        <p:cNvPr id="1" name="">
-          <a:extLst>
-            <a:ext uri="{FF2B5EF4-FFF2-40B4-BE49-F238E27FC236}">
-              <a16:creationId xmlns:a16="http://schemas.microsoft.com/office/drawing/2014/main" id="{08172FC2-DEF0-25DC-A752-C30C866F115F}"/>
-            </a:ext>
-          </a:extLst>
-        </p:cNvPr>
-        <p:cNvGrpSpPr/>
-        <p:nvPr/>
-      </p:nvGrpSpPr>
-      <p:grpSpPr>
-        <a:xfrm>
-          <a:off x="0" y="0"/>
-          <a:ext cx="0" cy="0"/>
-          <a:chOff x="0" y="0"/>
-          <a:chExt cx="0" cy="0"/>
-        </a:xfrm>
-      </p:grpSpPr>
       <p:sp>
         <p:nvSpPr>
-          <p:cNvPr id="2" name="Title 1">
+          <p:cNvPr id="4" name="Slide Number Placeholder 3">
             <a:extLst>
               <a:ext uri="{FF2B5EF4-FFF2-40B4-BE49-F238E27FC236}">
-                <a16:creationId xmlns:a16="http://schemas.microsoft.com/office/drawing/2014/main" id="{82486D9B-9BE2-2BB1-E0B6-D702E63185BD}"/>
+                <a16:creationId xmlns:a16="http://schemas.microsoft.com/office/drawing/2014/main" id="{D03FADE7-3148-8B77-2B99-117270DC4D22}"/>
               </a:ext>
             </a:extLst>
           </p:cNvPr>
@@ -29159,7 +31000,7 @@
             <a:spLocks noGrp="1"/>
           </p:cNvSpPr>
           <p:nvPr>
-            <p:ph type="title"/>
+            <p:ph type="sldNum" sz="quarter" idx="12"/>
           </p:nvPr>
         </p:nvSpPr>
         <p:spPr/>
@@ -29167,86 +31008,18 @@
           <a:bodyPr/>
           <a:lstStyle/>
           <a:p>
-            <a:r>
-              <a:rPr lang="en-US" dirty="0"/>
-              <a:t>The prediction includes uncertainty</a:t>
-            </a:r>
-            <a:endParaRPr lang="en-IL" dirty="0"/>
+            <a:fld id="{E0DC7AD3-7C2E-418B-8082-788996B615FB}" type="slidenum">
+              <a:rPr lang="en-GB" smtClean="0"/>
+              <a:t>59</a:t>
+            </a:fld>
+            <a:endParaRPr lang="en-GB"/>
           </a:p>
         </p:txBody>
       </p:sp>
-      <p:sp>
-        <p:nvSpPr>
-          <p:cNvPr id="3" name="Content Placeholder 2">
-            <a:extLst>
-              <a:ext uri="{FF2B5EF4-FFF2-40B4-BE49-F238E27FC236}">
-                <a16:creationId xmlns:a16="http://schemas.microsoft.com/office/drawing/2014/main" id="{D40EBE1A-7780-0752-8CD3-D7C5700BE502}"/>
-              </a:ext>
-            </a:extLst>
-          </p:cNvPr>
-          <p:cNvSpPr>
-            <a:spLocks noGrp="1"/>
-          </p:cNvSpPr>
-          <p:nvPr>
-            <p:ph idx="1"/>
-          </p:nvPr>
-        </p:nvSpPr>
-        <p:spPr>
-          <a:xfrm>
-            <a:off x="838200" y="1491328"/>
-            <a:ext cx="10515600" cy="720930"/>
-          </a:xfrm>
-        </p:spPr>
-        <p:txBody>
-          <a:bodyPr/>
-          <a:lstStyle/>
-          <a:p>
-            <a:r>
-              <a:rPr lang="en-US" dirty="0"/>
-              <a:t>Compare posterior predictive with </a:t>
-            </a:r>
-            <a:r>
-              <a:rPr lang="en-US"/>
-              <a:t>actual data</a:t>
-            </a:r>
-            <a:endParaRPr lang="en-IL" dirty="0"/>
-          </a:p>
-        </p:txBody>
-      </p:sp>
-      <p:pic>
-        <p:nvPicPr>
-          <p:cNvPr id="4" name="Picture 3">
-            <a:extLst>
-              <a:ext uri="{FF2B5EF4-FFF2-40B4-BE49-F238E27FC236}">
-                <a16:creationId xmlns:a16="http://schemas.microsoft.com/office/drawing/2014/main" id="{A69CEEB5-C8C7-B25C-CA9D-A11F1FF5418E}"/>
-              </a:ext>
-            </a:extLst>
-          </p:cNvPr>
-          <p:cNvPicPr>
-            <a:picLocks noChangeAspect="1"/>
-          </p:cNvPicPr>
-          <p:nvPr/>
-        </p:nvPicPr>
-        <p:blipFill>
-          <a:blip r:embed="rId2"/>
-          <a:stretch>
-            <a:fillRect/>
-          </a:stretch>
-        </p:blipFill>
-        <p:spPr>
-          <a:xfrm>
-            <a:off x="1165122" y="2733368"/>
-            <a:ext cx="9151714" cy="3673530"/>
-          </a:xfrm>
-          <a:prstGeom prst="rect">
-            <a:avLst/>
-          </a:prstGeom>
-        </p:spPr>
-      </p:pic>
     </p:spTree>
     <p:extLst>
       <p:ext uri="{BB962C8B-B14F-4D97-AF65-F5344CB8AC3E}">
-        <p14:creationId xmlns:p14="http://schemas.microsoft.com/office/powerpoint/2010/main" val="1351978192"/>
+        <p14:creationId xmlns:p14="http://schemas.microsoft.com/office/powerpoint/2010/main" val="329621768"/>
       </p:ext>
     </p:extLst>
   </p:cSld>
@@ -29273,36 +31046,6 @@
           <a:chExt cx="0" cy="0"/>
         </a:xfrm>
       </p:grpSpPr>
-      <p:sp>
-        <p:nvSpPr>
-          <p:cNvPr id="8" name="Footer Placeholder 4"/>
-          <p:cNvSpPr>
-            <a:spLocks noGrp="1"/>
-          </p:cNvSpPr>
-          <p:nvPr>
-            <p:ph type="ftr" sz="quarter" idx="11"/>
-          </p:nvPr>
-        </p:nvSpPr>
-        <p:spPr/>
-        <p:txBody>
-          <a:bodyPr/>
-          <a:lstStyle/>
-          <a:p>
-            <a:r>
-              <a:rPr lang="en-US" dirty="0"/>
-              <a:t>Data analysis, Semester </a:t>
-            </a:r>
-            <a:r>
-              <a:rPr lang="en-150" dirty="0"/>
-              <a:t>2025-2</a:t>
-            </a:r>
-            <a:r>
-              <a:rPr lang="en-US" dirty="0"/>
-              <a:t>, Lecture 6</a:t>
-            </a:r>
-          </a:p>
-        </p:txBody>
-      </p:sp>
       <p:sp>
         <p:nvSpPr>
           <p:cNvPr id="9" name="Slide Number Placeholder 5"/>
@@ -29551,6 +31294,168 @@
 </p:sld>
 </file>
 
+<file path=ppt/slides/slide60.xml><?xml version="1.0" encoding="utf-8"?>
+<p:sld xmlns:a="http://schemas.openxmlformats.org/drawingml/2006/main" xmlns:r="http://schemas.openxmlformats.org/officeDocument/2006/relationships" xmlns:p="http://schemas.openxmlformats.org/presentationml/2006/main">
+  <p:cSld>
+    <p:spTree>
+      <p:nvGrpSpPr>
+        <p:cNvPr id="1" name="">
+          <a:extLst>
+            <a:ext uri="{FF2B5EF4-FFF2-40B4-BE49-F238E27FC236}">
+              <a16:creationId xmlns:a16="http://schemas.microsoft.com/office/drawing/2014/main" id="{08172FC2-DEF0-25DC-A752-C30C866F115F}"/>
+            </a:ext>
+          </a:extLst>
+        </p:cNvPr>
+        <p:cNvGrpSpPr/>
+        <p:nvPr/>
+      </p:nvGrpSpPr>
+      <p:grpSpPr>
+        <a:xfrm>
+          <a:off x="0" y="0"/>
+          <a:ext cx="0" cy="0"/>
+          <a:chOff x="0" y="0"/>
+          <a:chExt cx="0" cy="0"/>
+        </a:xfrm>
+      </p:grpSpPr>
+      <p:sp>
+        <p:nvSpPr>
+          <p:cNvPr id="2" name="Title 1">
+            <a:extLst>
+              <a:ext uri="{FF2B5EF4-FFF2-40B4-BE49-F238E27FC236}">
+                <a16:creationId xmlns:a16="http://schemas.microsoft.com/office/drawing/2014/main" id="{82486D9B-9BE2-2BB1-E0B6-D702E63185BD}"/>
+              </a:ext>
+            </a:extLst>
+          </p:cNvPr>
+          <p:cNvSpPr>
+            <a:spLocks noGrp="1"/>
+          </p:cNvSpPr>
+          <p:nvPr>
+            <p:ph type="title"/>
+          </p:nvPr>
+        </p:nvSpPr>
+        <p:spPr/>
+        <p:txBody>
+          <a:bodyPr/>
+          <a:lstStyle/>
+          <a:p>
+            <a:r>
+              <a:rPr lang="en-US" dirty="0"/>
+              <a:t>The prediction includes uncertainty</a:t>
+            </a:r>
+            <a:endParaRPr lang="en-IL" dirty="0"/>
+          </a:p>
+        </p:txBody>
+      </p:sp>
+      <p:sp>
+        <p:nvSpPr>
+          <p:cNvPr id="3" name="Content Placeholder 2">
+            <a:extLst>
+              <a:ext uri="{FF2B5EF4-FFF2-40B4-BE49-F238E27FC236}">
+                <a16:creationId xmlns:a16="http://schemas.microsoft.com/office/drawing/2014/main" id="{D40EBE1A-7780-0752-8CD3-D7C5700BE502}"/>
+              </a:ext>
+            </a:extLst>
+          </p:cNvPr>
+          <p:cNvSpPr>
+            <a:spLocks noGrp="1"/>
+          </p:cNvSpPr>
+          <p:nvPr>
+            <p:ph idx="1"/>
+          </p:nvPr>
+        </p:nvSpPr>
+        <p:spPr>
+          <a:xfrm>
+            <a:off x="838200" y="1491328"/>
+            <a:ext cx="10515600" cy="720930"/>
+          </a:xfrm>
+        </p:spPr>
+        <p:txBody>
+          <a:bodyPr/>
+          <a:lstStyle/>
+          <a:p>
+            <a:r>
+              <a:rPr lang="en-US" dirty="0"/>
+              <a:t>Compare posterior predictive with </a:t>
+            </a:r>
+            <a:r>
+              <a:rPr lang="en-US"/>
+              <a:t>actual data</a:t>
+            </a:r>
+            <a:endParaRPr lang="en-IL" dirty="0"/>
+          </a:p>
+        </p:txBody>
+      </p:sp>
+      <p:pic>
+        <p:nvPicPr>
+          <p:cNvPr id="4" name="Picture 3">
+            <a:extLst>
+              <a:ext uri="{FF2B5EF4-FFF2-40B4-BE49-F238E27FC236}">
+                <a16:creationId xmlns:a16="http://schemas.microsoft.com/office/drawing/2014/main" id="{A69CEEB5-C8C7-B25C-CA9D-A11F1FF5418E}"/>
+              </a:ext>
+            </a:extLst>
+          </p:cNvPr>
+          <p:cNvPicPr>
+            <a:picLocks noChangeAspect="1"/>
+          </p:cNvPicPr>
+          <p:nvPr/>
+        </p:nvPicPr>
+        <p:blipFill>
+          <a:blip r:embed="rId2"/>
+          <a:stretch>
+            <a:fillRect/>
+          </a:stretch>
+        </p:blipFill>
+        <p:spPr>
+          <a:xfrm>
+            <a:off x="1165122" y="2733368"/>
+            <a:ext cx="9151714" cy="3673530"/>
+          </a:xfrm>
+          <a:prstGeom prst="rect">
+            <a:avLst/>
+          </a:prstGeom>
+        </p:spPr>
+      </p:pic>
+      <p:sp>
+        <p:nvSpPr>
+          <p:cNvPr id="5" name="Slide Number Placeholder 4">
+            <a:extLst>
+              <a:ext uri="{FF2B5EF4-FFF2-40B4-BE49-F238E27FC236}">
+                <a16:creationId xmlns:a16="http://schemas.microsoft.com/office/drawing/2014/main" id="{A330C7CF-090B-AE8F-B0F8-CFA9925DCB85}"/>
+              </a:ext>
+            </a:extLst>
+          </p:cNvPr>
+          <p:cNvSpPr>
+            <a:spLocks noGrp="1"/>
+          </p:cNvSpPr>
+          <p:nvPr>
+            <p:ph type="sldNum" sz="quarter" idx="12"/>
+          </p:nvPr>
+        </p:nvSpPr>
+        <p:spPr/>
+        <p:txBody>
+          <a:bodyPr/>
+          <a:lstStyle/>
+          <a:p>
+            <a:fld id="{E0DC7AD3-7C2E-418B-8082-788996B615FB}" type="slidenum">
+              <a:rPr lang="en-GB" smtClean="0"/>
+              <a:t>60</a:t>
+            </a:fld>
+            <a:endParaRPr lang="en-GB"/>
+          </a:p>
+        </p:txBody>
+      </p:sp>
+    </p:spTree>
+    <p:extLst>
+      <p:ext uri="{BB962C8B-B14F-4D97-AF65-F5344CB8AC3E}">
+        <p14:creationId xmlns:p14="http://schemas.microsoft.com/office/powerpoint/2010/main" val="1351978192"/>
+      </p:ext>
+    </p:extLst>
+  </p:cSld>
+  <p:clrMapOvr>
+    <a:masterClrMapping/>
+  </p:clrMapOvr>
+</p:sld>
+</file>
+
 <file path=ppt/slides/slide7.xml><?xml version="1.0" encoding="utf-8"?>
 <p:sld xmlns:a="http://schemas.openxmlformats.org/drawingml/2006/main" xmlns:r="http://schemas.openxmlformats.org/officeDocument/2006/relationships" xmlns:p="http://schemas.openxmlformats.org/presentationml/2006/main">
   <p:cSld>
@@ -29671,6 +31576,35 @@
           </a:prstGeom>
         </p:spPr>
       </p:pic>
+      <p:sp>
+        <p:nvSpPr>
+          <p:cNvPr id="5" name="Slide Number Placeholder 4">
+            <a:extLst>
+              <a:ext uri="{FF2B5EF4-FFF2-40B4-BE49-F238E27FC236}">
+                <a16:creationId xmlns:a16="http://schemas.microsoft.com/office/drawing/2014/main" id="{22AA78A7-56EA-53E4-CB07-0630B8DA8795}"/>
+              </a:ext>
+            </a:extLst>
+          </p:cNvPr>
+          <p:cNvSpPr>
+            <a:spLocks noGrp="1"/>
+          </p:cNvSpPr>
+          <p:nvPr>
+            <p:ph type="sldNum" sz="quarter" idx="12"/>
+          </p:nvPr>
+        </p:nvSpPr>
+        <p:spPr/>
+        <p:txBody>
+          <a:bodyPr/>
+          <a:lstStyle/>
+          <a:p>
+            <a:fld id="{E0DC7AD3-7C2E-418B-8082-788996B615FB}" type="slidenum">
+              <a:rPr lang="en-GB" smtClean="0"/>
+              <a:t>7</a:t>
+            </a:fld>
+            <a:endParaRPr lang="en-GB"/>
+          </a:p>
+        </p:txBody>
+      </p:sp>
     </p:spTree>
     <p:extLst>
       <p:ext uri="{BB962C8B-B14F-4D97-AF65-F5344CB8AC3E}">
@@ -31524,6 +33458,35 @@
           </a:p>
         </p:txBody>
       </p:sp>
+      <p:sp>
+        <p:nvSpPr>
+          <p:cNvPr id="3" name="Slide Number Placeholder 2">
+            <a:extLst>
+              <a:ext uri="{FF2B5EF4-FFF2-40B4-BE49-F238E27FC236}">
+                <a16:creationId xmlns:a16="http://schemas.microsoft.com/office/drawing/2014/main" id="{A9B24729-D7F4-8C86-3E15-43FD33B52EAD}"/>
+              </a:ext>
+            </a:extLst>
+          </p:cNvPr>
+          <p:cNvSpPr>
+            <a:spLocks noGrp="1"/>
+          </p:cNvSpPr>
+          <p:nvPr>
+            <p:ph type="sldNum" sz="quarter" idx="12"/>
+          </p:nvPr>
+        </p:nvSpPr>
+        <p:spPr/>
+        <p:txBody>
+          <a:bodyPr/>
+          <a:lstStyle/>
+          <a:p>
+            <a:fld id="{E0DC7AD3-7C2E-418B-8082-788996B615FB}" type="slidenum">
+              <a:rPr lang="en-GB" smtClean="0"/>
+              <a:t>8</a:t>
+            </a:fld>
+            <a:endParaRPr lang="en-GB"/>
+          </a:p>
+        </p:txBody>
+      </p:sp>
     </p:spTree>
     <p:extLst>
       <p:ext uri="{BB962C8B-B14F-4D97-AF65-F5344CB8AC3E}">
@@ -32762,6 +34725,35 @@
               <a:t>Without a declared deterministic variable</a:t>
             </a:r>
             <a:endParaRPr lang="he-IL" dirty="0"/>
+          </a:p>
+        </p:txBody>
+      </p:sp>
+      <p:sp>
+        <p:nvSpPr>
+          <p:cNvPr id="4" name="Slide Number Placeholder 3">
+            <a:extLst>
+              <a:ext uri="{FF2B5EF4-FFF2-40B4-BE49-F238E27FC236}">
+                <a16:creationId xmlns:a16="http://schemas.microsoft.com/office/drawing/2014/main" id="{7A2B9F2C-B92F-4ECC-998C-5659EAF858F1}"/>
+              </a:ext>
+            </a:extLst>
+          </p:cNvPr>
+          <p:cNvSpPr>
+            <a:spLocks noGrp="1"/>
+          </p:cNvSpPr>
+          <p:nvPr>
+            <p:ph type="sldNum" sz="quarter" idx="12"/>
+          </p:nvPr>
+        </p:nvSpPr>
+        <p:spPr/>
+        <p:txBody>
+          <a:bodyPr/>
+          <a:lstStyle/>
+          <a:p>
+            <a:fld id="{E0DC7AD3-7C2E-418B-8082-788996B615FB}" type="slidenum">
+              <a:rPr lang="en-GB" smtClean="0"/>
+              <a:t>9</a:t>
+            </a:fld>
+            <a:endParaRPr lang="en-GB"/>
           </a:p>
         </p:txBody>
       </p:sp>

</xml_diff>